<commit_message>
Agregue el repositorio en la presentacion
</commit_message>
<xml_diff>
--- a/Presentacion_Burger_Rush_Final (1).pptx
+++ b/Presentacion_Burger_Rush_Final (1).pptx
@@ -6819,7 +6819,7 @@
           <a:noFill/>
           <a:extLst>
             <a:ext uri="{909E8E84-426E-40dd-AFC4-6F175D3DCCD1}">
-              <a14:hiddenFill xmlns="" xmlns:a14="http://schemas.microsoft.com/office/drawing/2010/main">
+              <a14:hiddenFill xmlns:a14="http://schemas.microsoft.com/office/drawing/2010/main" xmlns="">
                 <a:solidFill>
                   <a:srgbClr val="FFFFFF"/>
                 </a:solidFill>
@@ -6878,7 +6878,7 @@
             </a:ln>
             <a:extLst>
               <a:ext uri="{91240B29-F687-4f45-9708-019B960494DF}">
-                <a14:hiddenLine xmlns="" xmlns:a14="http://schemas.microsoft.com/office/drawing/2010/main" w="9525">
+                <a14:hiddenLine xmlns:a14="http://schemas.microsoft.com/office/drawing/2010/main" xmlns="" w="9525">
                   <a:solidFill>
                     <a:srgbClr val="000000"/>
                   </a:solidFill>
@@ -6968,7 +6968,7 @@
             </a:ln>
             <a:extLst>
               <a:ext uri="{91240B29-F687-4f45-9708-019B960494DF}">
-                <a14:hiddenLine xmlns="" xmlns:a14="http://schemas.microsoft.com/office/drawing/2010/main" w="9525">
+                <a14:hiddenLine xmlns:a14="http://schemas.microsoft.com/office/drawing/2010/main" xmlns="" w="9525">
                   <a:solidFill>
                     <a:srgbClr val="000000"/>
                   </a:solidFill>
@@ -7058,7 +7058,7 @@
             </a:ln>
             <a:extLst>
               <a:ext uri="{91240B29-F687-4f45-9708-019B960494DF}">
-                <a14:hiddenLine xmlns="" xmlns:a14="http://schemas.microsoft.com/office/drawing/2010/main" w="9525">
+                <a14:hiddenLine xmlns:a14="http://schemas.microsoft.com/office/drawing/2010/main" xmlns="" w="9525">
                   <a:solidFill>
                     <a:srgbClr val="000000"/>
                   </a:solidFill>
@@ -7092,7 +7092,7 @@
             </a:ln>
             <a:extLst>
               <a:ext uri="{91240B29-F687-4f45-9708-019B960494DF}">
-                <a14:hiddenLine xmlns="" xmlns:a14="http://schemas.microsoft.com/office/drawing/2010/main" w="9525">
+                <a14:hiddenLine xmlns:a14="http://schemas.microsoft.com/office/drawing/2010/main" xmlns="" w="9525">
                   <a:solidFill>
                     <a:srgbClr val="000000"/>
                   </a:solidFill>
@@ -7182,7 +7182,7 @@
             </a:ln>
             <a:extLst>
               <a:ext uri="{91240B29-F687-4f45-9708-019B960494DF}">
-                <a14:hiddenLine xmlns="" xmlns:a14="http://schemas.microsoft.com/office/drawing/2010/main" w="9525">
+                <a14:hiddenLine xmlns:a14="http://schemas.microsoft.com/office/drawing/2010/main" xmlns="" w="9525">
                   <a:solidFill>
                     <a:srgbClr val="000000"/>
                   </a:solidFill>
@@ -7244,7 +7244,7 @@
             </a:ln>
             <a:extLst>
               <a:ext uri="{91240B29-F687-4f45-9708-019B960494DF}">
-                <a14:hiddenLine xmlns="" xmlns:a14="http://schemas.microsoft.com/office/drawing/2010/main" w="9525">
+                <a14:hiddenLine xmlns:a14="http://schemas.microsoft.com/office/drawing/2010/main" xmlns="" w="9525">
                   <a:solidFill>
                     <a:srgbClr val="000000"/>
                   </a:solidFill>
@@ -7306,7 +7306,7 @@
             </a:ln>
             <a:extLst>
               <a:ext uri="{91240B29-F687-4f45-9708-019B960494DF}">
-                <a14:hiddenLine xmlns="" xmlns:a14="http://schemas.microsoft.com/office/drawing/2010/main" w="9525">
+                <a14:hiddenLine xmlns:a14="http://schemas.microsoft.com/office/drawing/2010/main" xmlns="" w="9525">
                   <a:solidFill>
                     <a:srgbClr val="000000"/>
                   </a:solidFill>
@@ -7396,7 +7396,7 @@
             </a:ln>
             <a:extLst>
               <a:ext uri="{91240B29-F687-4f45-9708-019B960494DF}">
-                <a14:hiddenLine xmlns="" xmlns:a14="http://schemas.microsoft.com/office/drawing/2010/main" w="9525">
+                <a14:hiddenLine xmlns:a14="http://schemas.microsoft.com/office/drawing/2010/main" xmlns="" w="9525">
                   <a:solidFill>
                     <a:srgbClr val="000000"/>
                   </a:solidFill>
@@ -7458,7 +7458,7 @@
             </a:ln>
             <a:extLst>
               <a:ext uri="{91240B29-F687-4f45-9708-019B960494DF}">
-                <a14:hiddenLine xmlns="" xmlns:a14="http://schemas.microsoft.com/office/drawing/2010/main" w="9525">
+                <a14:hiddenLine xmlns:a14="http://schemas.microsoft.com/office/drawing/2010/main" xmlns="" w="9525">
                   <a:solidFill>
                     <a:srgbClr val="000000"/>
                   </a:solidFill>
@@ -7520,7 +7520,7 @@
             </a:ln>
             <a:extLst>
               <a:ext uri="{91240B29-F687-4f45-9708-019B960494DF}">
-                <a14:hiddenLine xmlns="" xmlns:a14="http://schemas.microsoft.com/office/drawing/2010/main" w="9525">
+                <a14:hiddenLine xmlns:a14="http://schemas.microsoft.com/office/drawing/2010/main" xmlns="" w="9525">
                   <a:solidFill>
                     <a:srgbClr val="000000"/>
                   </a:solidFill>
@@ -7610,7 +7610,7 @@
             </a:ln>
             <a:extLst>
               <a:ext uri="{91240B29-F687-4f45-9708-019B960494DF}">
-                <a14:hiddenLine xmlns="" xmlns:a14="http://schemas.microsoft.com/office/drawing/2010/main" w="9525">
+                <a14:hiddenLine xmlns:a14="http://schemas.microsoft.com/office/drawing/2010/main" xmlns="" w="9525">
                   <a:solidFill>
                     <a:srgbClr val="000000"/>
                   </a:solidFill>
@@ -7700,7 +7700,7 @@
             </a:ln>
             <a:extLst>
               <a:ext uri="{91240B29-F687-4f45-9708-019B960494DF}">
-                <a14:hiddenLine xmlns="" xmlns:a14="http://schemas.microsoft.com/office/drawing/2010/main" w="9525">
+                <a14:hiddenLine xmlns:a14="http://schemas.microsoft.com/office/drawing/2010/main" xmlns="" w="9525">
                   <a:solidFill>
                     <a:srgbClr val="000000"/>
                   </a:solidFill>
@@ -7762,7 +7762,7 @@
             </a:ln>
             <a:extLst>
               <a:ext uri="{91240B29-F687-4f45-9708-019B960494DF}">
-                <a14:hiddenLine xmlns="" xmlns:a14="http://schemas.microsoft.com/office/drawing/2010/main" w="9525">
+                <a14:hiddenLine xmlns:a14="http://schemas.microsoft.com/office/drawing/2010/main" xmlns="" w="9525">
                   <a:solidFill>
                     <a:srgbClr val="000000"/>
                   </a:solidFill>
@@ -7872,7 +7872,7 @@
             </a:ln>
             <a:extLst>
               <a:ext uri="{91240B29-F687-4f45-9708-019B960494DF}">
-                <a14:hiddenLine xmlns="" xmlns:a14="http://schemas.microsoft.com/office/drawing/2010/main" w="9525">
+                <a14:hiddenLine xmlns:a14="http://schemas.microsoft.com/office/drawing/2010/main" xmlns="" w="9525">
                   <a:solidFill>
                     <a:srgbClr val="000000"/>
                   </a:solidFill>
@@ -7934,7 +7934,7 @@
             </a:ln>
             <a:extLst>
               <a:ext uri="{91240B29-F687-4f45-9708-019B960494DF}">
-                <a14:hiddenLine xmlns="" xmlns:a14="http://schemas.microsoft.com/office/drawing/2010/main" w="9525">
+                <a14:hiddenLine xmlns:a14="http://schemas.microsoft.com/office/drawing/2010/main" xmlns="" w="9525">
                   <a:solidFill>
                     <a:srgbClr val="000000"/>
                   </a:solidFill>
@@ -8024,7 +8024,7 @@
             </a:ln>
             <a:extLst>
               <a:ext uri="{91240B29-F687-4f45-9708-019B960494DF}">
-                <a14:hiddenLine xmlns="" xmlns:a14="http://schemas.microsoft.com/office/drawing/2010/main" w="9525">
+                <a14:hiddenLine xmlns:a14="http://schemas.microsoft.com/office/drawing/2010/main" xmlns="" w="9525">
                   <a:solidFill>
                     <a:srgbClr val="000000"/>
                   </a:solidFill>
@@ -8114,7 +8114,7 @@
             </a:ln>
             <a:extLst>
               <a:ext uri="{91240B29-F687-4f45-9708-019B960494DF}">
-                <a14:hiddenLine xmlns="" xmlns:a14="http://schemas.microsoft.com/office/drawing/2010/main" w="9525">
+                <a14:hiddenLine xmlns:a14="http://schemas.microsoft.com/office/drawing/2010/main" xmlns="" w="9525">
                   <a:solidFill>
                     <a:srgbClr val="000000"/>
                   </a:solidFill>
@@ -8176,7 +8176,7 @@
             </a:ln>
             <a:extLst>
               <a:ext uri="{91240B29-F687-4f45-9708-019B960494DF}">
-                <a14:hiddenLine xmlns="" xmlns:a14="http://schemas.microsoft.com/office/drawing/2010/main" w="9525">
+                <a14:hiddenLine xmlns:a14="http://schemas.microsoft.com/office/drawing/2010/main" xmlns="" w="9525">
                   <a:solidFill>
                     <a:srgbClr val="000000"/>
                   </a:solidFill>
@@ -8266,7 +8266,7 @@
             </a:ln>
             <a:extLst>
               <a:ext uri="{91240B29-F687-4f45-9708-019B960494DF}">
-                <a14:hiddenLine xmlns="" xmlns:a14="http://schemas.microsoft.com/office/drawing/2010/main" w="9525">
+                <a14:hiddenLine xmlns:a14="http://schemas.microsoft.com/office/drawing/2010/main" xmlns="" w="9525">
                   <a:solidFill>
                     <a:srgbClr val="000000"/>
                   </a:solidFill>
@@ -8356,7 +8356,7 @@
             </a:ln>
             <a:extLst>
               <a:ext uri="{91240B29-F687-4f45-9708-019B960494DF}">
-                <a14:hiddenLine xmlns="" xmlns:a14="http://schemas.microsoft.com/office/drawing/2010/main" w="9525">
+                <a14:hiddenLine xmlns:a14="http://schemas.microsoft.com/office/drawing/2010/main" xmlns="" w="9525">
                   <a:solidFill>
                     <a:srgbClr val="000000"/>
                   </a:solidFill>
@@ -8412,7 +8412,7 @@
             </a:ln>
             <a:extLst>
               <a:ext uri="{91240B29-F687-4f45-9708-019B960494DF}">
-                <a14:hiddenLine xmlns="" xmlns:a14="http://schemas.microsoft.com/office/drawing/2010/main" w="9525">
+                <a14:hiddenLine xmlns:a14="http://schemas.microsoft.com/office/drawing/2010/main" xmlns="" w="9525">
                   <a:solidFill>
                     <a:srgbClr val="000000"/>
                   </a:solidFill>
@@ -8502,7 +8502,7 @@
             </a:ln>
             <a:extLst>
               <a:ext uri="{91240B29-F687-4f45-9708-019B960494DF}">
-                <a14:hiddenLine xmlns="" xmlns:a14="http://schemas.microsoft.com/office/drawing/2010/main" w="9525">
+                <a14:hiddenLine xmlns:a14="http://schemas.microsoft.com/office/drawing/2010/main" xmlns="" w="9525">
                   <a:solidFill>
                     <a:srgbClr val="000000"/>
                   </a:solidFill>
@@ -8558,7 +8558,7 @@
             </a:ln>
             <a:extLst>
               <a:ext uri="{91240B29-F687-4f45-9708-019B960494DF}">
-                <a14:hiddenLine xmlns="" xmlns:a14="http://schemas.microsoft.com/office/drawing/2010/main" w="9525">
+                <a14:hiddenLine xmlns:a14="http://schemas.microsoft.com/office/drawing/2010/main" xmlns="" w="9525">
                   <a:solidFill>
                     <a:srgbClr val="000000"/>
                   </a:solidFill>
@@ -8648,7 +8648,7 @@
             </a:ln>
             <a:extLst>
               <a:ext uri="{91240B29-F687-4f45-9708-019B960494DF}">
-                <a14:hiddenLine xmlns="" xmlns:a14="http://schemas.microsoft.com/office/drawing/2010/main" w="9525">
+                <a14:hiddenLine xmlns:a14="http://schemas.microsoft.com/office/drawing/2010/main" xmlns="" w="9525">
                   <a:solidFill>
                     <a:srgbClr val="000000"/>
                   </a:solidFill>
@@ -8716,7 +8716,7 @@
             </a:ln>
             <a:extLst>
               <a:ext uri="{91240B29-F687-4f45-9708-019B960494DF}">
-                <a14:hiddenLine xmlns="" xmlns:a14="http://schemas.microsoft.com/office/drawing/2010/main" w="9525">
+                <a14:hiddenLine xmlns:a14="http://schemas.microsoft.com/office/drawing/2010/main" xmlns="" w="9525">
                   <a:solidFill>
                     <a:srgbClr val="000000"/>
                   </a:solidFill>
@@ -8806,7 +8806,7 @@
             </a:ln>
             <a:extLst>
               <a:ext uri="{91240B29-F687-4f45-9708-019B960494DF}">
-                <a14:hiddenLine xmlns="" xmlns:a14="http://schemas.microsoft.com/office/drawing/2010/main" w="9525">
+                <a14:hiddenLine xmlns:a14="http://schemas.microsoft.com/office/drawing/2010/main" xmlns="" w="9525">
                   <a:solidFill>
                     <a:srgbClr val="000000"/>
                   </a:solidFill>
@@ -8874,7 +8874,7 @@
             </a:ln>
             <a:extLst>
               <a:ext uri="{91240B29-F687-4f45-9708-019B960494DF}">
-                <a14:hiddenLine xmlns="" xmlns:a14="http://schemas.microsoft.com/office/drawing/2010/main" w="9525">
+                <a14:hiddenLine xmlns:a14="http://schemas.microsoft.com/office/drawing/2010/main" xmlns="" w="9525">
                   <a:solidFill>
                     <a:srgbClr val="000000"/>
                   </a:solidFill>
@@ -8964,7 +8964,7 @@
             </a:ln>
             <a:extLst>
               <a:ext uri="{91240B29-F687-4f45-9708-019B960494DF}">
-                <a14:hiddenLine xmlns="" xmlns:a14="http://schemas.microsoft.com/office/drawing/2010/main" w="9525">
+                <a14:hiddenLine xmlns:a14="http://schemas.microsoft.com/office/drawing/2010/main" xmlns="" w="9525">
                   <a:solidFill>
                     <a:srgbClr val="000000"/>
                   </a:solidFill>
@@ -8998,7 +8998,7 @@
             </a:ln>
             <a:extLst>
               <a:ext uri="{91240B29-F687-4f45-9708-019B960494DF}">
-                <a14:hiddenLine xmlns="" xmlns:a14="http://schemas.microsoft.com/office/drawing/2010/main" w="9525">
+                <a14:hiddenLine xmlns:a14="http://schemas.microsoft.com/office/drawing/2010/main" xmlns="" w="9525">
                   <a:solidFill>
                     <a:srgbClr val="000000"/>
                   </a:solidFill>
@@ -9088,7 +9088,7 @@
             </a:ln>
             <a:extLst>
               <a:ext uri="{91240B29-F687-4f45-9708-019B960494DF}">
-                <a14:hiddenLine xmlns="" xmlns:a14="http://schemas.microsoft.com/office/drawing/2010/main" w="9525">
+                <a14:hiddenLine xmlns:a14="http://schemas.microsoft.com/office/drawing/2010/main" xmlns="" w="9525">
                   <a:solidFill>
                     <a:srgbClr val="000000"/>
                   </a:solidFill>
@@ -9150,7 +9150,7 @@
             </a:ln>
             <a:extLst>
               <a:ext uri="{91240B29-F687-4f45-9708-019B960494DF}">
-                <a14:hiddenLine xmlns="" xmlns:a14="http://schemas.microsoft.com/office/drawing/2010/main" w="9525">
+                <a14:hiddenLine xmlns:a14="http://schemas.microsoft.com/office/drawing/2010/main" xmlns="" w="9525">
                   <a:solidFill>
                     <a:srgbClr val="000000"/>
                   </a:solidFill>
@@ -9212,7 +9212,7 @@
             </a:ln>
             <a:extLst>
               <a:ext uri="{91240B29-F687-4f45-9708-019B960494DF}">
-                <a14:hiddenLine xmlns="" xmlns:a14="http://schemas.microsoft.com/office/drawing/2010/main" w="9525">
+                <a14:hiddenLine xmlns:a14="http://schemas.microsoft.com/office/drawing/2010/main" xmlns="" w="9525">
                   <a:solidFill>
                     <a:srgbClr val="000000"/>
                   </a:solidFill>
@@ -9302,7 +9302,7 @@
             </a:ln>
             <a:extLst>
               <a:ext uri="{91240B29-F687-4f45-9708-019B960494DF}">
-                <a14:hiddenLine xmlns="" xmlns:a14="http://schemas.microsoft.com/office/drawing/2010/main" w="9525">
+                <a14:hiddenLine xmlns:a14="http://schemas.microsoft.com/office/drawing/2010/main" xmlns="" w="9525">
                   <a:solidFill>
                     <a:srgbClr val="000000"/>
                   </a:solidFill>
@@ -9370,7 +9370,7 @@
             </a:ln>
             <a:extLst>
               <a:ext uri="{91240B29-F687-4f45-9708-019B960494DF}">
-                <a14:hiddenLine xmlns="" xmlns:a14="http://schemas.microsoft.com/office/drawing/2010/main" w="9525">
+                <a14:hiddenLine xmlns:a14="http://schemas.microsoft.com/office/drawing/2010/main" xmlns="" w="9525">
                   <a:solidFill>
                     <a:srgbClr val="000000"/>
                   </a:solidFill>
@@ -9432,7 +9432,7 @@
             </a:ln>
             <a:extLst>
               <a:ext uri="{91240B29-F687-4f45-9708-019B960494DF}">
-                <a14:hiddenLine xmlns="" xmlns:a14="http://schemas.microsoft.com/office/drawing/2010/main" w="9525">
+                <a14:hiddenLine xmlns:a14="http://schemas.microsoft.com/office/drawing/2010/main" xmlns="" w="9525">
                   <a:solidFill>
                     <a:srgbClr val="000000"/>
                   </a:solidFill>
@@ -9522,7 +9522,7 @@
             </a:ln>
             <a:extLst>
               <a:ext uri="{91240B29-F687-4f45-9708-019B960494DF}">
-                <a14:hiddenLine xmlns="" xmlns:a14="http://schemas.microsoft.com/office/drawing/2010/main" w="9525">
+                <a14:hiddenLine xmlns:a14="http://schemas.microsoft.com/office/drawing/2010/main" xmlns="" w="9525">
                   <a:solidFill>
                     <a:srgbClr val="000000"/>
                   </a:solidFill>
@@ -9584,7 +9584,7 @@
             </a:ln>
             <a:extLst>
               <a:ext uri="{91240B29-F687-4f45-9708-019B960494DF}">
-                <a14:hiddenLine xmlns="" xmlns:a14="http://schemas.microsoft.com/office/drawing/2010/main" w="9525">
+                <a14:hiddenLine xmlns:a14="http://schemas.microsoft.com/office/drawing/2010/main" xmlns="" w="9525">
                   <a:solidFill>
                     <a:srgbClr val="000000"/>
                   </a:solidFill>
@@ -9674,7 +9674,7 @@
             </a:ln>
             <a:extLst>
               <a:ext uri="{91240B29-F687-4f45-9708-019B960494DF}">
-                <a14:hiddenLine xmlns="" xmlns:a14="http://schemas.microsoft.com/office/drawing/2010/main" w="9525">
+                <a14:hiddenLine xmlns:a14="http://schemas.microsoft.com/office/drawing/2010/main" xmlns="" w="9525">
                   <a:solidFill>
                     <a:srgbClr val="000000"/>
                   </a:solidFill>
@@ -9736,7 +9736,7 @@
             </a:ln>
             <a:extLst>
               <a:ext uri="{91240B29-F687-4f45-9708-019B960494DF}">
-                <a14:hiddenLine xmlns="" xmlns:a14="http://schemas.microsoft.com/office/drawing/2010/main" w="9525">
+                <a14:hiddenLine xmlns:a14="http://schemas.microsoft.com/office/drawing/2010/main" xmlns="" w="9525">
                   <a:solidFill>
                     <a:srgbClr val="000000"/>
                   </a:solidFill>
@@ -9826,7 +9826,7 @@
             </a:ln>
             <a:extLst>
               <a:ext uri="{91240B29-F687-4f45-9708-019B960494DF}">
-                <a14:hiddenLine xmlns="" xmlns:a14="http://schemas.microsoft.com/office/drawing/2010/main" w="9525">
+                <a14:hiddenLine xmlns:a14="http://schemas.microsoft.com/office/drawing/2010/main" xmlns="" w="9525">
                   <a:solidFill>
                     <a:srgbClr val="000000"/>
                   </a:solidFill>
@@ -9860,7 +9860,7 @@
             </a:ln>
             <a:extLst>
               <a:ext uri="{91240B29-F687-4f45-9708-019B960494DF}">
-                <a14:hiddenLine xmlns="" xmlns:a14="http://schemas.microsoft.com/office/drawing/2010/main" w="9525">
+                <a14:hiddenLine xmlns:a14="http://schemas.microsoft.com/office/drawing/2010/main" xmlns="" w="9525">
                   <a:solidFill>
                     <a:srgbClr val="000000"/>
                   </a:solidFill>
@@ -9925,7 +9925,7 @@
             </a:ln>
             <a:extLst>
               <a:ext uri="{91240B29-F687-4f45-9708-019B960494DF}">
-                <a14:hiddenLine xmlns="" xmlns:a14="http://schemas.microsoft.com/office/drawing/2010/main" w="9525">
+                <a14:hiddenLine xmlns:a14="http://schemas.microsoft.com/office/drawing/2010/main" xmlns="" w="9525">
                   <a:solidFill>
                     <a:srgbClr val="000000"/>
                   </a:solidFill>
@@ -10015,7 +10015,7 @@
             </a:ln>
             <a:extLst>
               <a:ext uri="{91240B29-F687-4f45-9708-019B960494DF}">
-                <a14:hiddenLine xmlns="" xmlns:a14="http://schemas.microsoft.com/office/drawing/2010/main" w="9525">
+                <a14:hiddenLine xmlns:a14="http://schemas.microsoft.com/office/drawing/2010/main" xmlns="" w="9525">
                   <a:solidFill>
                     <a:srgbClr val="000000"/>
                   </a:solidFill>
@@ -10077,7 +10077,7 @@
             </a:ln>
             <a:extLst>
               <a:ext uri="{91240B29-F687-4f45-9708-019B960494DF}">
-                <a14:hiddenLine xmlns="" xmlns:a14="http://schemas.microsoft.com/office/drawing/2010/main" w="9525">
+                <a14:hiddenLine xmlns:a14="http://schemas.microsoft.com/office/drawing/2010/main" xmlns="" w="9525">
                   <a:solidFill>
                     <a:srgbClr val="000000"/>
                   </a:solidFill>
@@ -10167,7 +10167,7 @@
             </a:ln>
             <a:extLst>
               <a:ext uri="{91240B29-F687-4f45-9708-019B960494DF}">
-                <a14:hiddenLine xmlns="" xmlns:a14="http://schemas.microsoft.com/office/drawing/2010/main" w="9525">
+                <a14:hiddenLine xmlns:a14="http://schemas.microsoft.com/office/drawing/2010/main" xmlns="" w="9525">
                   <a:solidFill>
                     <a:srgbClr val="000000"/>
                   </a:solidFill>
@@ -10257,7 +10257,7 @@
             </a:ln>
             <a:extLst>
               <a:ext uri="{91240B29-F687-4f45-9708-019B960494DF}">
-                <a14:hiddenLine xmlns="" xmlns:a14="http://schemas.microsoft.com/office/drawing/2010/main" w="9525">
+                <a14:hiddenLine xmlns:a14="http://schemas.microsoft.com/office/drawing/2010/main" xmlns="" w="9525">
                   <a:solidFill>
                     <a:srgbClr val="000000"/>
                   </a:solidFill>
@@ -10322,7 +10322,7 @@
             </a:ln>
             <a:extLst>
               <a:ext uri="{91240B29-F687-4f45-9708-019B960494DF}">
-                <a14:hiddenLine xmlns="" xmlns:a14="http://schemas.microsoft.com/office/drawing/2010/main" w="9525">
+                <a14:hiddenLine xmlns:a14="http://schemas.microsoft.com/office/drawing/2010/main" xmlns="" w="9525">
                   <a:solidFill>
                     <a:srgbClr val="000000"/>
                   </a:solidFill>
@@ -10384,7 +10384,7 @@
             </a:ln>
             <a:extLst>
               <a:ext uri="{91240B29-F687-4f45-9708-019B960494DF}">
-                <a14:hiddenLine xmlns="" xmlns:a14="http://schemas.microsoft.com/office/drawing/2010/main" w="9525">
+                <a14:hiddenLine xmlns:a14="http://schemas.microsoft.com/office/drawing/2010/main" xmlns="" w="9525">
                   <a:solidFill>
                     <a:srgbClr val="000000"/>
                   </a:solidFill>
@@ -10474,7 +10474,7 @@
             </a:ln>
             <a:extLst>
               <a:ext uri="{91240B29-F687-4f45-9708-019B960494DF}">
-                <a14:hiddenLine xmlns="" xmlns:a14="http://schemas.microsoft.com/office/drawing/2010/main" w="9525">
+                <a14:hiddenLine xmlns:a14="http://schemas.microsoft.com/office/drawing/2010/main" xmlns="" w="9525">
                   <a:solidFill>
                     <a:srgbClr val="000000"/>
                   </a:solidFill>
@@ -10564,7 +10564,7 @@
             </a:ln>
             <a:extLst>
               <a:ext uri="{91240B29-F687-4f45-9708-019B960494DF}">
-                <a14:hiddenLine xmlns="" xmlns:a14="http://schemas.microsoft.com/office/drawing/2010/main" w="9525">
+                <a14:hiddenLine xmlns:a14="http://schemas.microsoft.com/office/drawing/2010/main" xmlns="" w="9525">
                   <a:solidFill>
                     <a:srgbClr val="000000"/>
                   </a:solidFill>
@@ -10626,7 +10626,7 @@
             </a:ln>
             <a:extLst>
               <a:ext uri="{91240B29-F687-4f45-9708-019B960494DF}">
-                <a14:hiddenLine xmlns="" xmlns:a14="http://schemas.microsoft.com/office/drawing/2010/main" w="9525">
+                <a14:hiddenLine xmlns:a14="http://schemas.microsoft.com/office/drawing/2010/main" xmlns="" w="9525">
                   <a:solidFill>
                     <a:srgbClr val="000000"/>
                   </a:solidFill>
@@ -10746,7 +10746,7 @@
             </a:ln>
             <a:extLst>
               <a:ext uri="{91240B29-F687-4f45-9708-019B960494DF}">
-                <a14:hiddenLine xmlns="" xmlns:a14="http://schemas.microsoft.com/office/drawing/2010/main" w="9525">
+                <a14:hiddenLine xmlns:a14="http://schemas.microsoft.com/office/drawing/2010/main" xmlns="" w="9525">
                   <a:solidFill>
                     <a:srgbClr val="000000"/>
                   </a:solidFill>
@@ -10814,7 +10814,7 @@
             </a:ln>
             <a:extLst>
               <a:ext uri="{91240B29-F687-4f45-9708-019B960494DF}">
-                <a14:hiddenLine xmlns="" xmlns:a14="http://schemas.microsoft.com/office/drawing/2010/main" w="9525">
+                <a14:hiddenLine xmlns:a14="http://schemas.microsoft.com/office/drawing/2010/main" xmlns="" w="9525">
                   <a:solidFill>
                     <a:srgbClr val="000000"/>
                   </a:solidFill>
@@ -10904,7 +10904,7 @@
             </a:ln>
             <a:extLst>
               <a:ext uri="{91240B29-F687-4f45-9708-019B960494DF}">
-                <a14:hiddenLine xmlns="" xmlns:a14="http://schemas.microsoft.com/office/drawing/2010/main" w="9525">
+                <a14:hiddenLine xmlns:a14="http://schemas.microsoft.com/office/drawing/2010/main" xmlns="" w="9525">
                   <a:solidFill>
                     <a:srgbClr val="000000"/>
                   </a:solidFill>
@@ -11044,7 +11044,7 @@
           <a:p>
             <a:fld id="{5BCAD085-E8A6-8845-BD4E-CB4CCA059FC4}" type="datetimeFigureOut">
               <a:rPr lang="en-US" smtClean="0"/>
-              <a:t>5/19/2025</a:t>
+              <a:t>5/20/2025</a:t>
             </a:fld>
             <a:endParaRPr lang="en-US"/>
           </a:p>
@@ -11311,7 +11311,7 @@
           <a:p>
             <a:fld id="{5BCAD085-E8A6-8845-BD4E-CB4CCA059FC4}" type="datetimeFigureOut">
               <a:rPr lang="en-US" smtClean="0"/>
-              <a:t>5/19/2025</a:t>
+              <a:t>5/20/2025</a:t>
             </a:fld>
             <a:endParaRPr lang="en-US"/>
           </a:p>
@@ -11507,7 +11507,7 @@
           <a:p>
             <a:fld id="{5BCAD085-E8A6-8845-BD4E-CB4CCA059FC4}" type="datetimeFigureOut">
               <a:rPr lang="en-US" smtClean="0"/>
-              <a:t>5/19/2025</a:t>
+              <a:t>5/20/2025</a:t>
             </a:fld>
             <a:endParaRPr lang="en-US"/>
           </a:p>
@@ -11770,7 +11770,7 @@
           <a:p>
             <a:fld id="{5BCAD085-E8A6-8845-BD4E-CB4CCA059FC4}" type="datetimeFigureOut">
               <a:rPr lang="en-US" smtClean="0"/>
-              <a:t>5/19/2025</a:t>
+              <a:t>5/20/2025</a:t>
             </a:fld>
             <a:endParaRPr lang="en-US"/>
           </a:p>
@@ -12204,7 +12204,7 @@
           <a:p>
             <a:fld id="{5BCAD085-E8A6-8845-BD4E-CB4CCA059FC4}" type="datetimeFigureOut">
               <a:rPr lang="en-US" smtClean="0"/>
-              <a:t>5/19/2025</a:t>
+              <a:t>5/20/2025</a:t>
             </a:fld>
             <a:endParaRPr lang="en-US"/>
           </a:p>
@@ -12750,7 +12750,7 @@
           <a:p>
             <a:fld id="{5BCAD085-E8A6-8845-BD4E-CB4CCA059FC4}" type="datetimeFigureOut">
               <a:rPr lang="en-US" smtClean="0"/>
-              <a:t>5/19/2025</a:t>
+              <a:t>5/20/2025</a:t>
             </a:fld>
             <a:endParaRPr lang="en-US"/>
           </a:p>
@@ -13470,7 +13470,7 @@
           <a:p>
             <a:fld id="{5BCAD085-E8A6-8845-BD4E-CB4CCA059FC4}" type="datetimeFigureOut">
               <a:rPr lang="en-US" smtClean="0"/>
-              <a:t>5/19/2025</a:t>
+              <a:t>5/20/2025</a:t>
             </a:fld>
             <a:endParaRPr lang="en-US"/>
           </a:p>
@@ -13644,7 +13644,7 @@
           <a:p>
             <a:fld id="{5BCAD085-E8A6-8845-BD4E-CB4CCA059FC4}" type="datetimeFigureOut">
               <a:rPr lang="en-US" smtClean="0"/>
-              <a:t>5/19/2025</a:t>
+              <a:t>5/20/2025</a:t>
             </a:fld>
             <a:endParaRPr lang="en-US"/>
           </a:p>
@@ -13824,7 +13824,7 @@
           <a:p>
             <a:fld id="{5BCAD085-E8A6-8845-BD4E-CB4CCA059FC4}" type="datetimeFigureOut">
               <a:rPr lang="en-US" smtClean="0"/>
-              <a:t>5/19/2025</a:t>
+              <a:t>5/20/2025</a:t>
             </a:fld>
             <a:endParaRPr lang="en-US"/>
           </a:p>
@@ -14009,7 +14009,7 @@
           <a:p>
             <a:fld id="{5BCAD085-E8A6-8845-BD4E-CB4CCA059FC4}" type="datetimeFigureOut">
               <a:rPr lang="en-US" smtClean="0"/>
-              <a:t>5/19/2025</a:t>
+              <a:t>5/20/2025</a:t>
             </a:fld>
             <a:endParaRPr lang="en-US"/>
           </a:p>
@@ -14269,7 +14269,7 @@
           <a:p>
             <a:fld id="{5BCAD085-E8A6-8845-BD4E-CB4CCA059FC4}" type="datetimeFigureOut">
               <a:rPr lang="en-US" smtClean="0"/>
-              <a:t>5/19/2025</a:t>
+              <a:t>5/20/2025</a:t>
             </a:fld>
             <a:endParaRPr lang="en-US"/>
           </a:p>
@@ -14501,7 +14501,7 @@
           <a:p>
             <a:fld id="{5BCAD085-E8A6-8845-BD4E-CB4CCA059FC4}" type="datetimeFigureOut">
               <a:rPr lang="en-US" smtClean="0"/>
-              <a:t>5/19/2025</a:t>
+              <a:t>5/20/2025</a:t>
             </a:fld>
             <a:endParaRPr lang="en-US"/>
           </a:p>
@@ -14882,7 +14882,7 @@
           <a:p>
             <a:fld id="{5BCAD085-E8A6-8845-BD4E-CB4CCA059FC4}" type="datetimeFigureOut">
               <a:rPr lang="en-US" smtClean="0"/>
-              <a:t>5/19/2025</a:t>
+              <a:t>5/20/2025</a:t>
             </a:fld>
             <a:endParaRPr lang="en-US"/>
           </a:p>
@@ -15000,7 +15000,7 @@
           <a:p>
             <a:fld id="{5BCAD085-E8A6-8845-BD4E-CB4CCA059FC4}" type="datetimeFigureOut">
               <a:rPr lang="en-US" smtClean="0"/>
-              <a:t>5/19/2025</a:t>
+              <a:t>5/20/2025</a:t>
             </a:fld>
             <a:endParaRPr lang="en-US"/>
           </a:p>
@@ -15095,7 +15095,7 @@
           <a:p>
             <a:fld id="{5BCAD085-E8A6-8845-BD4E-CB4CCA059FC4}" type="datetimeFigureOut">
               <a:rPr lang="en-US" smtClean="0"/>
-              <a:t>5/19/2025</a:t>
+              <a:t>5/20/2025</a:t>
             </a:fld>
             <a:endParaRPr lang="en-US"/>
           </a:p>
@@ -15344,7 +15344,7 @@
           <a:p>
             <a:fld id="{5BCAD085-E8A6-8845-BD4E-CB4CCA059FC4}" type="datetimeFigureOut">
               <a:rPr lang="en-US" smtClean="0"/>
-              <a:t>5/19/2025</a:t>
+              <a:t>5/20/2025</a:t>
             </a:fld>
             <a:endParaRPr lang="en-US"/>
           </a:p>
@@ -15596,7 +15596,7 @@
           <a:p>
             <a:fld id="{5BCAD085-E8A6-8845-BD4E-CB4CCA059FC4}" type="datetimeFigureOut">
               <a:rPr lang="en-US" smtClean="0"/>
-              <a:t>5/19/2025</a:t>
+              <a:t>5/20/2025</a:t>
             </a:fld>
             <a:endParaRPr lang="en-US"/>
           </a:p>
@@ -15719,7 +15719,7 @@
           <a:noFill/>
           <a:extLst>
             <a:ext uri="{909E8E84-426E-40dd-AFC4-6F175D3DCCD1}">
-              <a14:hiddenFill xmlns="" xmlns:a14="http://schemas.microsoft.com/office/drawing/2010/main">
+              <a14:hiddenFill xmlns:a14="http://schemas.microsoft.com/office/drawing/2010/main" xmlns="">
                 <a:solidFill>
                   <a:srgbClr val="FFFFFF"/>
                 </a:solidFill>
@@ -15793,7 +15793,7 @@
               </a:ln>
               <a:extLst>
                 <a:ext uri="{91240B29-F687-4f45-9708-019B960494DF}">
-                  <a14:hiddenLine xmlns="" xmlns:a14="http://schemas.microsoft.com/office/drawing/2010/main" w="9525">
+                  <a14:hiddenLine xmlns:a14="http://schemas.microsoft.com/office/drawing/2010/main" xmlns="" w="9525">
                     <a:solidFill>
                       <a:srgbClr val="000000"/>
                     </a:solidFill>
@@ -15883,7 +15883,7 @@
               </a:ln>
               <a:extLst>
                 <a:ext uri="{91240B29-F687-4f45-9708-019B960494DF}">
-                  <a14:hiddenLine xmlns="" xmlns:a14="http://schemas.microsoft.com/office/drawing/2010/main" w="9525">
+                  <a14:hiddenLine xmlns:a14="http://schemas.microsoft.com/office/drawing/2010/main" xmlns="" w="9525">
                     <a:solidFill>
                       <a:srgbClr val="000000"/>
                     </a:solidFill>
@@ -15973,7 +15973,7 @@
               </a:ln>
               <a:extLst>
                 <a:ext uri="{91240B29-F687-4f45-9708-019B960494DF}">
-                  <a14:hiddenLine xmlns="" xmlns:a14="http://schemas.microsoft.com/office/drawing/2010/main" w="9525">
+                  <a14:hiddenLine xmlns:a14="http://schemas.microsoft.com/office/drawing/2010/main" xmlns="" w="9525">
                     <a:solidFill>
                       <a:srgbClr val="000000"/>
                     </a:solidFill>
@@ -16035,7 +16035,7 @@
               </a:ln>
               <a:extLst>
                 <a:ext uri="{91240B29-F687-4f45-9708-019B960494DF}">
-                  <a14:hiddenLine xmlns="" xmlns:a14="http://schemas.microsoft.com/office/drawing/2010/main" w="9525">
+                  <a14:hiddenLine xmlns:a14="http://schemas.microsoft.com/office/drawing/2010/main" xmlns="" w="9525">
                     <a:solidFill>
                       <a:srgbClr val="000000"/>
                     </a:solidFill>
@@ -16125,7 +16125,7 @@
               </a:ln>
               <a:extLst>
                 <a:ext uri="{91240B29-F687-4f45-9708-019B960494DF}">
-                  <a14:hiddenLine xmlns="" xmlns:a14="http://schemas.microsoft.com/office/drawing/2010/main" w="9525">
+                  <a14:hiddenLine xmlns:a14="http://schemas.microsoft.com/office/drawing/2010/main" xmlns="" w="9525">
                     <a:solidFill>
                       <a:srgbClr val="000000"/>
                     </a:solidFill>
@@ -16187,7 +16187,7 @@
               </a:ln>
               <a:extLst>
                 <a:ext uri="{91240B29-F687-4f45-9708-019B960494DF}">
-                  <a14:hiddenLine xmlns="" xmlns:a14="http://schemas.microsoft.com/office/drawing/2010/main" w="9525">
+                  <a14:hiddenLine xmlns:a14="http://schemas.microsoft.com/office/drawing/2010/main" xmlns="" w="9525">
                     <a:solidFill>
                       <a:srgbClr val="000000"/>
                     </a:solidFill>
@@ -16249,7 +16249,7 @@
               </a:ln>
               <a:extLst>
                 <a:ext uri="{91240B29-F687-4f45-9708-019B960494DF}">
-                  <a14:hiddenLine xmlns="" xmlns:a14="http://schemas.microsoft.com/office/drawing/2010/main" w="9525">
+                  <a14:hiddenLine xmlns:a14="http://schemas.microsoft.com/office/drawing/2010/main" xmlns="" w="9525">
                     <a:solidFill>
                       <a:srgbClr val="000000"/>
                     </a:solidFill>
@@ -16339,7 +16339,7 @@
               </a:ln>
               <a:extLst>
                 <a:ext uri="{91240B29-F687-4f45-9708-019B960494DF}">
-                  <a14:hiddenLine xmlns="" xmlns:a14="http://schemas.microsoft.com/office/drawing/2010/main" w="9525">
+                  <a14:hiddenLine xmlns:a14="http://schemas.microsoft.com/office/drawing/2010/main" xmlns="" w="9525">
                     <a:solidFill>
                       <a:srgbClr val="000000"/>
                     </a:solidFill>
@@ -16429,7 +16429,7 @@
               </a:ln>
               <a:extLst>
                 <a:ext uri="{91240B29-F687-4f45-9708-019B960494DF}">
-                  <a14:hiddenLine xmlns="" xmlns:a14="http://schemas.microsoft.com/office/drawing/2010/main" w="9525">
+                  <a14:hiddenLine xmlns:a14="http://schemas.microsoft.com/office/drawing/2010/main" xmlns="" w="9525">
                     <a:solidFill>
                       <a:srgbClr val="000000"/>
                     </a:solidFill>
@@ -16491,7 +16491,7 @@
               </a:ln>
               <a:extLst>
                 <a:ext uri="{91240B29-F687-4f45-9708-019B960494DF}">
-                  <a14:hiddenLine xmlns="" xmlns:a14="http://schemas.microsoft.com/office/drawing/2010/main" w="9525">
+                  <a14:hiddenLine xmlns:a14="http://schemas.microsoft.com/office/drawing/2010/main" xmlns="" w="9525">
                     <a:solidFill>
                       <a:srgbClr val="000000"/>
                     </a:solidFill>
@@ -16601,7 +16601,7 @@
               </a:ln>
               <a:extLst>
                 <a:ext uri="{91240B29-F687-4f45-9708-019B960494DF}">
-                  <a14:hiddenLine xmlns="" xmlns:a14="http://schemas.microsoft.com/office/drawing/2010/main" w="9525">
+                  <a14:hiddenLine xmlns:a14="http://schemas.microsoft.com/office/drawing/2010/main" xmlns="" w="9525">
                     <a:solidFill>
                       <a:srgbClr val="000000"/>
                     </a:solidFill>
@@ -16685,7 +16685,7 @@
               </a:ln>
               <a:extLst>
                 <a:ext uri="{91240B29-F687-4f45-9708-019B960494DF}">
-                  <a14:hiddenLine xmlns="" xmlns:a14="http://schemas.microsoft.com/office/drawing/2010/main" w="9525">
+                  <a14:hiddenLine xmlns:a14="http://schemas.microsoft.com/office/drawing/2010/main" xmlns="" w="9525">
                     <a:solidFill>
                       <a:srgbClr val="000000"/>
                     </a:solidFill>
@@ -16747,7 +16747,7 @@
               </a:ln>
               <a:extLst>
                 <a:ext uri="{91240B29-F687-4f45-9708-019B960494DF}">
-                  <a14:hiddenLine xmlns="" xmlns:a14="http://schemas.microsoft.com/office/drawing/2010/main" w="9525">
+                  <a14:hiddenLine xmlns:a14="http://schemas.microsoft.com/office/drawing/2010/main" xmlns="" w="9525">
                     <a:solidFill>
                       <a:srgbClr val="000000"/>
                     </a:solidFill>
@@ -16809,7 +16809,7 @@
               </a:ln>
               <a:extLst>
                 <a:ext uri="{91240B29-F687-4f45-9708-019B960494DF}">
-                  <a14:hiddenLine xmlns="" xmlns:a14="http://schemas.microsoft.com/office/drawing/2010/main" w="9525">
+                  <a14:hiddenLine xmlns:a14="http://schemas.microsoft.com/office/drawing/2010/main" xmlns="" w="9525">
                     <a:solidFill>
                       <a:srgbClr val="000000"/>
                     </a:solidFill>
@@ -16899,7 +16899,7 @@
               </a:ln>
               <a:extLst>
                 <a:ext uri="{91240B29-F687-4f45-9708-019B960494DF}">
-                  <a14:hiddenLine xmlns="" xmlns:a14="http://schemas.microsoft.com/office/drawing/2010/main" w="9525">
+                  <a14:hiddenLine xmlns:a14="http://schemas.microsoft.com/office/drawing/2010/main" xmlns="" w="9525">
                     <a:solidFill>
                       <a:srgbClr val="000000"/>
                     </a:solidFill>
@@ -16933,7 +16933,7 @@
               </a:ln>
               <a:extLst>
                 <a:ext uri="{91240B29-F687-4f45-9708-019B960494DF}">
-                  <a14:hiddenLine xmlns="" xmlns:a14="http://schemas.microsoft.com/office/drawing/2010/main" w="9525">
+                  <a14:hiddenLine xmlns:a14="http://schemas.microsoft.com/office/drawing/2010/main" xmlns="" w="9525">
                     <a:solidFill>
                       <a:srgbClr val="000000"/>
                     </a:solidFill>
@@ -16998,7 +16998,7 @@
               </a:ln>
               <a:extLst>
                 <a:ext uri="{91240B29-F687-4f45-9708-019B960494DF}">
-                  <a14:hiddenLine xmlns="" xmlns:a14="http://schemas.microsoft.com/office/drawing/2010/main" w="9525">
+                  <a14:hiddenLine xmlns:a14="http://schemas.microsoft.com/office/drawing/2010/main" xmlns="" w="9525">
                     <a:solidFill>
                       <a:srgbClr val="000000"/>
                     </a:solidFill>
@@ -17088,7 +17088,7 @@
               </a:ln>
               <a:extLst>
                 <a:ext uri="{91240B29-F687-4f45-9708-019B960494DF}">
-                  <a14:hiddenLine xmlns="" xmlns:a14="http://schemas.microsoft.com/office/drawing/2010/main" w="9525">
+                  <a14:hiddenLine xmlns:a14="http://schemas.microsoft.com/office/drawing/2010/main" xmlns="" w="9525">
                     <a:solidFill>
                       <a:srgbClr val="000000"/>
                     </a:solidFill>
@@ -17150,7 +17150,7 @@
               </a:ln>
               <a:extLst>
                 <a:ext uri="{91240B29-F687-4f45-9708-019B960494DF}">
-                  <a14:hiddenLine xmlns="" xmlns:a14="http://schemas.microsoft.com/office/drawing/2010/main" w="9525">
+                  <a14:hiddenLine xmlns:a14="http://schemas.microsoft.com/office/drawing/2010/main" xmlns="" w="9525">
                     <a:solidFill>
                       <a:srgbClr val="000000"/>
                     </a:solidFill>
@@ -17240,7 +17240,7 @@
               </a:ln>
               <a:extLst>
                 <a:ext uri="{91240B29-F687-4f45-9708-019B960494DF}">
-                  <a14:hiddenLine xmlns="" xmlns:a14="http://schemas.microsoft.com/office/drawing/2010/main" w="9525">
+                  <a14:hiddenLine xmlns:a14="http://schemas.microsoft.com/office/drawing/2010/main" xmlns="" w="9525">
                     <a:solidFill>
                       <a:srgbClr val="000000"/>
                     </a:solidFill>
@@ -17305,7 +17305,7 @@
               </a:ln>
               <a:extLst>
                 <a:ext uri="{91240B29-F687-4f45-9708-019B960494DF}">
-                  <a14:hiddenLine xmlns="" xmlns:a14="http://schemas.microsoft.com/office/drawing/2010/main" w="9525">
+                  <a14:hiddenLine xmlns:a14="http://schemas.microsoft.com/office/drawing/2010/main" xmlns="" w="9525">
                     <a:solidFill>
                       <a:srgbClr val="000000"/>
                     </a:solidFill>
@@ -17367,7 +17367,7 @@
               </a:ln>
               <a:extLst>
                 <a:ext uri="{91240B29-F687-4f45-9708-019B960494DF}">
-                  <a14:hiddenLine xmlns="" xmlns:a14="http://schemas.microsoft.com/office/drawing/2010/main" w="9525">
+                  <a14:hiddenLine xmlns:a14="http://schemas.microsoft.com/office/drawing/2010/main" xmlns="" w="9525">
                     <a:solidFill>
                       <a:srgbClr val="000000"/>
                     </a:solidFill>
@@ -17457,7 +17457,7 @@
               </a:ln>
               <a:extLst>
                 <a:ext uri="{91240B29-F687-4f45-9708-019B960494DF}">
-                  <a14:hiddenLine xmlns="" xmlns:a14="http://schemas.microsoft.com/office/drawing/2010/main" w="9525">
+                  <a14:hiddenLine xmlns:a14="http://schemas.microsoft.com/office/drawing/2010/main" xmlns="" w="9525">
                     <a:solidFill>
                       <a:srgbClr val="000000"/>
                     </a:solidFill>
@@ -17547,7 +17547,7 @@
               </a:ln>
               <a:extLst>
                 <a:ext uri="{91240B29-F687-4f45-9708-019B960494DF}">
-                  <a14:hiddenLine xmlns="" xmlns:a14="http://schemas.microsoft.com/office/drawing/2010/main" w="9525">
+                  <a14:hiddenLine xmlns:a14="http://schemas.microsoft.com/office/drawing/2010/main" xmlns="" w="9525">
                     <a:solidFill>
                       <a:srgbClr val="000000"/>
                     </a:solidFill>
@@ -17612,7 +17612,7 @@
               </a:ln>
               <a:extLst>
                 <a:ext uri="{91240B29-F687-4f45-9708-019B960494DF}">
-                  <a14:hiddenLine xmlns="" xmlns:a14="http://schemas.microsoft.com/office/drawing/2010/main" w="9525">
+                  <a14:hiddenLine xmlns:a14="http://schemas.microsoft.com/office/drawing/2010/main" xmlns="" w="9525">
                     <a:solidFill>
                       <a:srgbClr val="000000"/>
                     </a:solidFill>
@@ -17732,7 +17732,7 @@
               </a:ln>
               <a:extLst>
                 <a:ext uri="{91240B29-F687-4f45-9708-019B960494DF}">
-                  <a14:hiddenLine xmlns="" xmlns:a14="http://schemas.microsoft.com/office/drawing/2010/main" w="9525">
+                  <a14:hiddenLine xmlns:a14="http://schemas.microsoft.com/office/drawing/2010/main" xmlns="" w="9525">
                     <a:solidFill>
                       <a:srgbClr val="000000"/>
                     </a:solidFill>
@@ -17813,7 +17813,7 @@
               </a:ln>
               <a:extLst>
                 <a:ext uri="{91240B29-F687-4f45-9708-019B960494DF}">
-                  <a14:hiddenLine xmlns="" xmlns:a14="http://schemas.microsoft.com/office/drawing/2010/main" w="9525">
+                  <a14:hiddenLine xmlns:a14="http://schemas.microsoft.com/office/drawing/2010/main" xmlns="" w="9525">
                     <a:solidFill>
                       <a:srgbClr val="000000"/>
                     </a:solidFill>
@@ -17928,7 +17928,7 @@
               </a:ln>
               <a:extLst>
                 <a:ext uri="{91240B29-F687-4f45-9708-019B960494DF}">
-                  <a14:hiddenLine xmlns="" xmlns:a14="http://schemas.microsoft.com/office/drawing/2010/main" w="9525">
+                  <a14:hiddenLine xmlns:a14="http://schemas.microsoft.com/office/drawing/2010/main" xmlns="" w="9525">
                     <a:solidFill>
                       <a:srgbClr val="000000"/>
                     </a:solidFill>
@@ -18018,7 +18018,7 @@
               </a:ln>
               <a:extLst>
                 <a:ext uri="{91240B29-F687-4f45-9708-019B960494DF}">
-                  <a14:hiddenLine xmlns="" xmlns:a14="http://schemas.microsoft.com/office/drawing/2010/main" w="9525">
+                  <a14:hiddenLine xmlns:a14="http://schemas.microsoft.com/office/drawing/2010/main" xmlns="" w="9525">
                     <a:solidFill>
                       <a:srgbClr val="000000"/>
                     </a:solidFill>
@@ -18083,7 +18083,7 @@
               </a:ln>
               <a:extLst>
                 <a:ext uri="{91240B29-F687-4f45-9708-019B960494DF}">
-                  <a14:hiddenLine xmlns="" xmlns:a14="http://schemas.microsoft.com/office/drawing/2010/main" w="9525">
+                  <a14:hiddenLine xmlns:a14="http://schemas.microsoft.com/office/drawing/2010/main" xmlns="" w="9525">
                     <a:solidFill>
                       <a:srgbClr val="000000"/>
                     </a:solidFill>
@@ -18173,7 +18173,7 @@
               </a:ln>
               <a:extLst>
                 <a:ext uri="{91240B29-F687-4f45-9708-019B960494DF}">
-                  <a14:hiddenLine xmlns="" xmlns:a14="http://schemas.microsoft.com/office/drawing/2010/main" w="9525">
+                  <a14:hiddenLine xmlns:a14="http://schemas.microsoft.com/office/drawing/2010/main" xmlns="" w="9525">
                     <a:solidFill>
                       <a:srgbClr val="000000"/>
                     </a:solidFill>
@@ -18241,7 +18241,7 @@
               </a:ln>
               <a:extLst>
                 <a:ext uri="{91240B29-F687-4f45-9708-019B960494DF}">
-                  <a14:hiddenLine xmlns="" xmlns:a14="http://schemas.microsoft.com/office/drawing/2010/main" w="9525">
+                  <a14:hiddenLine xmlns:a14="http://schemas.microsoft.com/office/drawing/2010/main" xmlns="" w="9525">
                     <a:solidFill>
                       <a:srgbClr val="000000"/>
                     </a:solidFill>
@@ -18331,7 +18331,7 @@
               </a:ln>
               <a:extLst>
                 <a:ext uri="{91240B29-F687-4f45-9708-019B960494DF}">
-                  <a14:hiddenLine xmlns="" xmlns:a14="http://schemas.microsoft.com/office/drawing/2010/main" w="9525">
+                  <a14:hiddenLine xmlns:a14="http://schemas.microsoft.com/office/drawing/2010/main" xmlns="" w="9525">
                     <a:solidFill>
                       <a:srgbClr val="000000"/>
                     </a:solidFill>
@@ -18399,7 +18399,7 @@
               </a:ln>
               <a:extLst>
                 <a:ext uri="{91240B29-F687-4f45-9708-019B960494DF}">
-                  <a14:hiddenLine xmlns="" xmlns:a14="http://schemas.microsoft.com/office/drawing/2010/main" w="9525">
+                  <a14:hiddenLine xmlns:a14="http://schemas.microsoft.com/office/drawing/2010/main" xmlns="" w="9525">
                     <a:solidFill>
                       <a:srgbClr val="000000"/>
                     </a:solidFill>
@@ -18489,7 +18489,7 @@
               </a:ln>
               <a:extLst>
                 <a:ext uri="{91240B29-F687-4f45-9708-019B960494DF}">
-                  <a14:hiddenLine xmlns="" xmlns:a14="http://schemas.microsoft.com/office/drawing/2010/main" w="9525">
+                  <a14:hiddenLine xmlns:a14="http://schemas.microsoft.com/office/drawing/2010/main" xmlns="" w="9525">
                     <a:solidFill>
                       <a:srgbClr val="000000"/>
                     </a:solidFill>
@@ -18523,7 +18523,7 @@
               </a:ln>
               <a:extLst>
                 <a:ext uri="{91240B29-F687-4f45-9708-019B960494DF}">
-                  <a14:hiddenLine xmlns="" xmlns:a14="http://schemas.microsoft.com/office/drawing/2010/main" w="9525">
+                  <a14:hiddenLine xmlns:a14="http://schemas.microsoft.com/office/drawing/2010/main" xmlns="" w="9525">
                     <a:solidFill>
                       <a:srgbClr val="000000"/>
                     </a:solidFill>
@@ -18663,7 +18663,7 @@
           <a:p>
             <a:fld id="{5BCAD085-E8A6-8845-BD4E-CB4CCA059FC4}" type="datetimeFigureOut">
               <a:rPr lang="en-US" smtClean="0"/>
-              <a:t>5/19/2025</a:t>
+              <a:t>5/20/2025</a:t>
             </a:fld>
             <a:endParaRPr lang="en-US"/>
           </a:p>
@@ -19139,7 +19139,7 @@
           <a:noFill/>
           <a:extLst>
             <a:ext uri="{909E8E84-426E-40dd-AFC4-6F175D3DCCD1}">
-              <a14:hiddenFill xmlns="" xmlns:a16="http://schemas.microsoft.com/office/drawing/2014/main" xmlns:a14="http://schemas.microsoft.com/office/drawing/2010/main">
+              <a14:hiddenFill xmlns:a14="http://schemas.microsoft.com/office/drawing/2010/main" xmlns:a16="http://schemas.microsoft.com/office/drawing/2014/main" xmlns="">
                 <a:solidFill>
                   <a:srgbClr val="FFFFFF"/>
                 </a:solidFill>
@@ -19260,7 +19260,7 @@
               </a:ln>
               <a:extLst>
                 <a:ext uri="{91240B29-F687-4f45-9708-019B960494DF}">
-                  <a14:hiddenLine xmlns="" xmlns:a16="http://schemas.microsoft.com/office/drawing/2014/main" xmlns:a14="http://schemas.microsoft.com/office/drawing/2010/main" w="9525">
+                  <a14:hiddenLine xmlns:a14="http://schemas.microsoft.com/office/drawing/2010/main" xmlns:a16="http://schemas.microsoft.com/office/drawing/2014/main" xmlns="" w="9525">
                     <a:solidFill>
                       <a:srgbClr val="000000"/>
                     </a:solidFill>
@@ -19372,7 +19372,7 @@
               </a:ln>
               <a:extLst>
                 <a:ext uri="{91240B29-F687-4f45-9708-019B960494DF}">
-                  <a14:hiddenLine xmlns="" xmlns:a16="http://schemas.microsoft.com/office/drawing/2014/main" xmlns:a14="http://schemas.microsoft.com/office/drawing/2010/main" w="9525">
+                  <a14:hiddenLine xmlns:a14="http://schemas.microsoft.com/office/drawing/2010/main" xmlns:a16="http://schemas.microsoft.com/office/drawing/2014/main" xmlns="" w="9525">
                     <a:solidFill>
                       <a:srgbClr val="000000"/>
                     </a:solidFill>
@@ -19484,7 +19484,7 @@
               </a:ln>
               <a:extLst>
                 <a:ext uri="{91240B29-F687-4f45-9708-019B960494DF}">
-                  <a14:hiddenLine xmlns="" xmlns:a16="http://schemas.microsoft.com/office/drawing/2014/main" xmlns:a14="http://schemas.microsoft.com/office/drawing/2010/main" w="9525">
+                  <a14:hiddenLine xmlns:a14="http://schemas.microsoft.com/office/drawing/2010/main" xmlns:a16="http://schemas.microsoft.com/office/drawing/2014/main" xmlns="" w="9525">
                     <a:solidFill>
                       <a:srgbClr val="000000"/>
                     </a:solidFill>
@@ -19568,7 +19568,7 @@
               </a:ln>
               <a:extLst>
                 <a:ext uri="{91240B29-F687-4f45-9708-019B960494DF}">
-                  <a14:hiddenLine xmlns="" xmlns:a16="http://schemas.microsoft.com/office/drawing/2014/main" xmlns:a14="http://schemas.microsoft.com/office/drawing/2010/main" w="9525">
+                  <a14:hiddenLine xmlns:a14="http://schemas.microsoft.com/office/drawing/2010/main" xmlns:a16="http://schemas.microsoft.com/office/drawing/2014/main" xmlns="" w="9525">
                     <a:solidFill>
                       <a:srgbClr val="000000"/>
                     </a:solidFill>
@@ -19680,7 +19680,7 @@
               </a:ln>
               <a:extLst>
                 <a:ext uri="{91240B29-F687-4f45-9708-019B960494DF}">
-                  <a14:hiddenLine xmlns="" xmlns:a16="http://schemas.microsoft.com/office/drawing/2014/main" xmlns:a14="http://schemas.microsoft.com/office/drawing/2010/main" w="9525">
+                  <a14:hiddenLine xmlns:a14="http://schemas.microsoft.com/office/drawing/2010/main" xmlns:a16="http://schemas.microsoft.com/office/drawing/2014/main" xmlns="" w="9525">
                     <a:solidFill>
                       <a:srgbClr val="000000"/>
                     </a:solidFill>
@@ -19764,7 +19764,7 @@
               </a:ln>
               <a:extLst>
                 <a:ext uri="{91240B29-F687-4f45-9708-019B960494DF}">
-                  <a14:hiddenLine xmlns="" xmlns:a16="http://schemas.microsoft.com/office/drawing/2014/main" xmlns:a14="http://schemas.microsoft.com/office/drawing/2010/main" w="9525">
+                  <a14:hiddenLine xmlns:a14="http://schemas.microsoft.com/office/drawing/2010/main" xmlns:a16="http://schemas.microsoft.com/office/drawing/2014/main" xmlns="" w="9525">
                     <a:solidFill>
                       <a:srgbClr val="000000"/>
                     </a:solidFill>
@@ -19848,7 +19848,7 @@
               </a:ln>
               <a:extLst>
                 <a:ext uri="{91240B29-F687-4f45-9708-019B960494DF}">
-                  <a14:hiddenLine xmlns="" xmlns:a16="http://schemas.microsoft.com/office/drawing/2014/main" xmlns:a14="http://schemas.microsoft.com/office/drawing/2010/main" w="9525">
+                  <a14:hiddenLine xmlns:a14="http://schemas.microsoft.com/office/drawing/2010/main" xmlns:a16="http://schemas.microsoft.com/office/drawing/2014/main" xmlns="" w="9525">
                     <a:solidFill>
                       <a:srgbClr val="000000"/>
                     </a:solidFill>
@@ -19960,7 +19960,7 @@
               </a:ln>
               <a:extLst>
                 <a:ext uri="{91240B29-F687-4f45-9708-019B960494DF}">
-                  <a14:hiddenLine xmlns="" xmlns:a16="http://schemas.microsoft.com/office/drawing/2014/main" xmlns:a14="http://schemas.microsoft.com/office/drawing/2010/main" w="9525">
+                  <a14:hiddenLine xmlns:a14="http://schemas.microsoft.com/office/drawing/2010/main" xmlns:a16="http://schemas.microsoft.com/office/drawing/2014/main" xmlns="" w="9525">
                     <a:solidFill>
                       <a:srgbClr val="000000"/>
                     </a:solidFill>
@@ -20072,7 +20072,7 @@
               </a:ln>
               <a:extLst>
                 <a:ext uri="{91240B29-F687-4f45-9708-019B960494DF}">
-                  <a14:hiddenLine xmlns="" xmlns:a16="http://schemas.microsoft.com/office/drawing/2014/main" xmlns:a14="http://schemas.microsoft.com/office/drawing/2010/main" w="9525">
+                  <a14:hiddenLine xmlns:a14="http://schemas.microsoft.com/office/drawing/2010/main" xmlns:a16="http://schemas.microsoft.com/office/drawing/2014/main" xmlns="" w="9525">
                     <a:solidFill>
                       <a:srgbClr val="000000"/>
                     </a:solidFill>
@@ -20156,7 +20156,7 @@
               </a:ln>
               <a:extLst>
                 <a:ext uri="{91240B29-F687-4f45-9708-019B960494DF}">
-                  <a14:hiddenLine xmlns="" xmlns:a16="http://schemas.microsoft.com/office/drawing/2014/main" xmlns:a14="http://schemas.microsoft.com/office/drawing/2010/main" w="9525">
+                  <a14:hiddenLine xmlns:a14="http://schemas.microsoft.com/office/drawing/2010/main" xmlns:a16="http://schemas.microsoft.com/office/drawing/2014/main" xmlns="" w="9525">
                     <a:solidFill>
                       <a:srgbClr val="000000"/>
                     </a:solidFill>
@@ -20288,7 +20288,7 @@
               </a:ln>
               <a:extLst>
                 <a:ext uri="{91240B29-F687-4f45-9708-019B960494DF}">
-                  <a14:hiddenLine xmlns="" xmlns:a16="http://schemas.microsoft.com/office/drawing/2014/main" xmlns:a14="http://schemas.microsoft.com/office/drawing/2010/main" w="9525">
+                  <a14:hiddenLine xmlns:a14="http://schemas.microsoft.com/office/drawing/2010/main" xmlns:a16="http://schemas.microsoft.com/office/drawing/2014/main" xmlns="" w="9525">
                     <a:solidFill>
                       <a:srgbClr val="000000"/>
                     </a:solidFill>
@@ -20416,7 +20416,7 @@
               </a:ln>
               <a:extLst>
                 <a:ext uri="{91240B29-F687-4f45-9708-019B960494DF}">
-                  <a14:hiddenLine xmlns="" xmlns:a16="http://schemas.microsoft.com/office/drawing/2014/main" xmlns:a14="http://schemas.microsoft.com/office/drawing/2010/main" w="9525">
+                  <a14:hiddenLine xmlns:a14="http://schemas.microsoft.com/office/drawing/2010/main" xmlns:a16="http://schemas.microsoft.com/office/drawing/2014/main" xmlns="" w="9525">
                     <a:solidFill>
                       <a:srgbClr val="000000"/>
                     </a:solidFill>
@@ -20500,7 +20500,7 @@
               </a:ln>
               <a:extLst>
                 <a:ext uri="{91240B29-F687-4f45-9708-019B960494DF}">
-                  <a14:hiddenLine xmlns="" xmlns:a16="http://schemas.microsoft.com/office/drawing/2014/main" xmlns:a14="http://schemas.microsoft.com/office/drawing/2010/main" w="9525">
+                  <a14:hiddenLine xmlns:a14="http://schemas.microsoft.com/office/drawing/2010/main" xmlns:a16="http://schemas.microsoft.com/office/drawing/2014/main" xmlns="" w="9525">
                     <a:solidFill>
                       <a:srgbClr val="000000"/>
                     </a:solidFill>
@@ -20584,7 +20584,7 @@
               </a:ln>
               <a:extLst>
                 <a:ext uri="{91240B29-F687-4f45-9708-019B960494DF}">
-                  <a14:hiddenLine xmlns="" xmlns:a16="http://schemas.microsoft.com/office/drawing/2014/main" xmlns:a14="http://schemas.microsoft.com/office/drawing/2010/main" w="9525">
+                  <a14:hiddenLine xmlns:a14="http://schemas.microsoft.com/office/drawing/2010/main" xmlns:a16="http://schemas.microsoft.com/office/drawing/2014/main" xmlns="" w="9525">
                     <a:solidFill>
                       <a:srgbClr val="000000"/>
                     </a:solidFill>
@@ -20696,7 +20696,7 @@
               </a:ln>
               <a:extLst>
                 <a:ext uri="{91240B29-F687-4f45-9708-019B960494DF}">
-                  <a14:hiddenLine xmlns="" xmlns:a16="http://schemas.microsoft.com/office/drawing/2014/main" xmlns:a14="http://schemas.microsoft.com/office/drawing/2010/main" w="9525">
+                  <a14:hiddenLine xmlns:a14="http://schemas.microsoft.com/office/drawing/2010/main" xmlns:a16="http://schemas.microsoft.com/office/drawing/2014/main" xmlns="" w="9525">
                     <a:solidFill>
                       <a:srgbClr val="000000"/>
                     </a:solidFill>
@@ -20752,7 +20752,7 @@
               </a:ln>
               <a:extLst>
                 <a:ext uri="{91240B29-F687-4f45-9708-019B960494DF}">
-                  <a14:hiddenLine xmlns="" xmlns:a16="http://schemas.microsoft.com/office/drawing/2014/main" xmlns:a14="http://schemas.microsoft.com/office/drawing/2010/main" w="9525">
+                  <a14:hiddenLine xmlns:a14="http://schemas.microsoft.com/office/drawing/2010/main" xmlns:a16="http://schemas.microsoft.com/office/drawing/2014/main" xmlns="" w="9525">
                     <a:solidFill>
                       <a:srgbClr val="000000"/>
                     </a:solidFill>
@@ -20839,7 +20839,7 @@
               </a:ln>
               <a:extLst>
                 <a:ext uri="{91240B29-F687-4f45-9708-019B960494DF}">
-                  <a14:hiddenLine xmlns="" xmlns:a16="http://schemas.microsoft.com/office/drawing/2014/main" xmlns:a14="http://schemas.microsoft.com/office/drawing/2010/main" w="9525">
+                  <a14:hiddenLine xmlns:a14="http://schemas.microsoft.com/office/drawing/2010/main" xmlns:a16="http://schemas.microsoft.com/office/drawing/2014/main" xmlns="" w="9525">
                     <a:solidFill>
                       <a:srgbClr val="000000"/>
                     </a:solidFill>
@@ -20951,7 +20951,7 @@
               </a:ln>
               <a:extLst>
                 <a:ext uri="{91240B29-F687-4f45-9708-019B960494DF}">
-                  <a14:hiddenLine xmlns="" xmlns:a16="http://schemas.microsoft.com/office/drawing/2014/main" xmlns:a14="http://schemas.microsoft.com/office/drawing/2010/main" w="9525">
+                  <a14:hiddenLine xmlns:a14="http://schemas.microsoft.com/office/drawing/2010/main" xmlns:a16="http://schemas.microsoft.com/office/drawing/2014/main" xmlns="" w="9525">
                     <a:solidFill>
                       <a:srgbClr val="000000"/>
                     </a:solidFill>
@@ -21035,7 +21035,7 @@
               </a:ln>
               <a:extLst>
                 <a:ext uri="{91240B29-F687-4f45-9708-019B960494DF}">
-                  <a14:hiddenLine xmlns="" xmlns:a16="http://schemas.microsoft.com/office/drawing/2014/main" xmlns:a14="http://schemas.microsoft.com/office/drawing/2010/main" w="9525">
+                  <a14:hiddenLine xmlns:a14="http://schemas.microsoft.com/office/drawing/2010/main" xmlns:a16="http://schemas.microsoft.com/office/drawing/2014/main" xmlns="" w="9525">
                     <a:solidFill>
                       <a:srgbClr val="000000"/>
                     </a:solidFill>
@@ -21147,7 +21147,7 @@
               </a:ln>
               <a:extLst>
                 <a:ext uri="{91240B29-F687-4f45-9708-019B960494DF}">
-                  <a14:hiddenLine xmlns="" xmlns:a16="http://schemas.microsoft.com/office/drawing/2014/main" xmlns:a14="http://schemas.microsoft.com/office/drawing/2010/main" w="9525">
+                  <a14:hiddenLine xmlns:a14="http://schemas.microsoft.com/office/drawing/2010/main" xmlns:a16="http://schemas.microsoft.com/office/drawing/2014/main" xmlns="" w="9525">
                     <a:solidFill>
                       <a:srgbClr val="000000"/>
                     </a:solidFill>
@@ -21234,7 +21234,7 @@
               </a:ln>
               <a:extLst>
                 <a:ext uri="{91240B29-F687-4f45-9708-019B960494DF}">
-                  <a14:hiddenLine xmlns="" xmlns:a16="http://schemas.microsoft.com/office/drawing/2014/main" xmlns:a14="http://schemas.microsoft.com/office/drawing/2010/main" w="9525">
+                  <a14:hiddenLine xmlns:a14="http://schemas.microsoft.com/office/drawing/2010/main" xmlns:a16="http://schemas.microsoft.com/office/drawing/2014/main" xmlns="" w="9525">
                     <a:solidFill>
                       <a:srgbClr val="000000"/>
                     </a:solidFill>
@@ -21318,7 +21318,7 @@
               </a:ln>
               <a:extLst>
                 <a:ext uri="{91240B29-F687-4f45-9708-019B960494DF}">
-                  <a14:hiddenLine xmlns="" xmlns:a16="http://schemas.microsoft.com/office/drawing/2014/main" xmlns:a14="http://schemas.microsoft.com/office/drawing/2010/main" w="9525">
+                  <a14:hiddenLine xmlns:a14="http://schemas.microsoft.com/office/drawing/2010/main" xmlns:a16="http://schemas.microsoft.com/office/drawing/2014/main" xmlns="" w="9525">
                     <a:solidFill>
                       <a:srgbClr val="000000"/>
                     </a:solidFill>
@@ -21430,7 +21430,7 @@
               </a:ln>
               <a:extLst>
                 <a:ext uri="{91240B29-F687-4f45-9708-019B960494DF}">
-                  <a14:hiddenLine xmlns="" xmlns:a16="http://schemas.microsoft.com/office/drawing/2014/main" xmlns:a14="http://schemas.microsoft.com/office/drawing/2010/main" w="9525">
+                  <a14:hiddenLine xmlns:a14="http://schemas.microsoft.com/office/drawing/2010/main" xmlns:a16="http://schemas.microsoft.com/office/drawing/2014/main" xmlns="" w="9525">
                     <a:solidFill>
                       <a:srgbClr val="000000"/>
                     </a:solidFill>
@@ -21542,7 +21542,7 @@
               </a:ln>
               <a:extLst>
                 <a:ext uri="{91240B29-F687-4f45-9708-019B960494DF}">
-                  <a14:hiddenLine xmlns="" xmlns:a16="http://schemas.microsoft.com/office/drawing/2014/main" xmlns:a14="http://schemas.microsoft.com/office/drawing/2010/main" w="9525">
+                  <a14:hiddenLine xmlns:a14="http://schemas.microsoft.com/office/drawing/2010/main" xmlns:a16="http://schemas.microsoft.com/office/drawing/2014/main" xmlns="" w="9525">
                     <a:solidFill>
                       <a:srgbClr val="000000"/>
                     </a:solidFill>
@@ -21629,7 +21629,7 @@
               </a:ln>
               <a:extLst>
                 <a:ext uri="{91240B29-F687-4f45-9708-019B960494DF}">
-                  <a14:hiddenLine xmlns="" xmlns:a16="http://schemas.microsoft.com/office/drawing/2014/main" xmlns:a14="http://schemas.microsoft.com/office/drawing/2010/main" w="9525">
+                  <a14:hiddenLine xmlns:a14="http://schemas.microsoft.com/office/drawing/2010/main" xmlns:a16="http://schemas.microsoft.com/office/drawing/2014/main" xmlns="" w="9525">
                     <a:solidFill>
                       <a:srgbClr val="000000"/>
                     </a:solidFill>
@@ -21771,7 +21771,7 @@
               </a:ln>
               <a:extLst>
                 <a:ext uri="{91240B29-F687-4f45-9708-019B960494DF}">
-                  <a14:hiddenLine xmlns="" xmlns:a16="http://schemas.microsoft.com/office/drawing/2014/main" xmlns:a14="http://schemas.microsoft.com/office/drawing/2010/main" w="9525">
+                  <a14:hiddenLine xmlns:a14="http://schemas.microsoft.com/office/drawing/2010/main" xmlns:a16="http://schemas.microsoft.com/office/drawing/2014/main" xmlns="" w="9525">
                     <a:solidFill>
                       <a:srgbClr val="000000"/>
                     </a:solidFill>
@@ -21906,7 +21906,7 @@
               </a:ln>
               <a:extLst>
                 <a:ext uri="{91240B29-F687-4f45-9708-019B960494DF}">
-                  <a14:hiddenLine xmlns="" xmlns:a16="http://schemas.microsoft.com/office/drawing/2014/main" xmlns:a14="http://schemas.microsoft.com/office/drawing/2010/main" w="9525">
+                  <a14:hiddenLine xmlns:a14="http://schemas.microsoft.com/office/drawing/2010/main" xmlns:a16="http://schemas.microsoft.com/office/drawing/2014/main" xmlns="" w="9525">
                     <a:solidFill>
                       <a:srgbClr val="000000"/>
                     </a:solidFill>
@@ -22043,7 +22043,7 @@
               </a:ln>
               <a:extLst>
                 <a:ext uri="{91240B29-F687-4f45-9708-019B960494DF}">
-                  <a14:hiddenLine xmlns="" xmlns:a16="http://schemas.microsoft.com/office/drawing/2014/main" xmlns:a14="http://schemas.microsoft.com/office/drawing/2010/main" w="9525">
+                  <a14:hiddenLine xmlns:a14="http://schemas.microsoft.com/office/drawing/2010/main" xmlns:a16="http://schemas.microsoft.com/office/drawing/2014/main" xmlns="" w="9525">
                     <a:solidFill>
                       <a:srgbClr val="000000"/>
                     </a:solidFill>
@@ -22155,7 +22155,7 @@
               </a:ln>
               <a:extLst>
                 <a:ext uri="{91240B29-F687-4f45-9708-019B960494DF}">
-                  <a14:hiddenLine xmlns="" xmlns:a16="http://schemas.microsoft.com/office/drawing/2014/main" xmlns:a14="http://schemas.microsoft.com/office/drawing/2010/main" w="9525">
+                  <a14:hiddenLine xmlns:a14="http://schemas.microsoft.com/office/drawing/2010/main" xmlns:a16="http://schemas.microsoft.com/office/drawing/2014/main" xmlns="" w="9525">
                     <a:solidFill>
                       <a:srgbClr val="000000"/>
                     </a:solidFill>
@@ -22242,7 +22242,7 @@
               </a:ln>
               <a:extLst>
                 <a:ext uri="{91240B29-F687-4f45-9708-019B960494DF}">
-                  <a14:hiddenLine xmlns="" xmlns:a16="http://schemas.microsoft.com/office/drawing/2014/main" xmlns:a14="http://schemas.microsoft.com/office/drawing/2010/main" w="9525">
+                  <a14:hiddenLine xmlns:a14="http://schemas.microsoft.com/office/drawing/2010/main" xmlns:a16="http://schemas.microsoft.com/office/drawing/2014/main" xmlns="" w="9525">
                     <a:solidFill>
                       <a:srgbClr val="000000"/>
                     </a:solidFill>
@@ -22354,7 +22354,7 @@
               </a:ln>
               <a:extLst>
                 <a:ext uri="{91240B29-F687-4f45-9708-019B960494DF}">
-                  <a14:hiddenLine xmlns="" xmlns:a16="http://schemas.microsoft.com/office/drawing/2014/main" xmlns:a14="http://schemas.microsoft.com/office/drawing/2010/main" w="9525">
+                  <a14:hiddenLine xmlns:a14="http://schemas.microsoft.com/office/drawing/2010/main" xmlns:a16="http://schemas.microsoft.com/office/drawing/2014/main" xmlns="" w="9525">
                     <a:solidFill>
                       <a:srgbClr val="000000"/>
                     </a:solidFill>
@@ -22444,7 +22444,7 @@
               </a:ln>
               <a:extLst>
                 <a:ext uri="{91240B29-F687-4f45-9708-019B960494DF}">
-                  <a14:hiddenLine xmlns="" xmlns:a16="http://schemas.microsoft.com/office/drawing/2014/main" xmlns:a14="http://schemas.microsoft.com/office/drawing/2010/main" w="9525">
+                  <a14:hiddenLine xmlns:a14="http://schemas.microsoft.com/office/drawing/2010/main" xmlns:a16="http://schemas.microsoft.com/office/drawing/2014/main" xmlns="" w="9525">
                     <a:solidFill>
                       <a:srgbClr val="000000"/>
                     </a:solidFill>
@@ -22556,7 +22556,7 @@
               </a:ln>
               <a:extLst>
                 <a:ext uri="{91240B29-F687-4f45-9708-019B960494DF}">
-                  <a14:hiddenLine xmlns="" xmlns:a16="http://schemas.microsoft.com/office/drawing/2014/main" xmlns:a14="http://schemas.microsoft.com/office/drawing/2010/main" w="9525">
+                  <a14:hiddenLine xmlns:a14="http://schemas.microsoft.com/office/drawing/2010/main" xmlns:a16="http://schemas.microsoft.com/office/drawing/2014/main" xmlns="" w="9525">
                     <a:solidFill>
                       <a:srgbClr val="000000"/>
                     </a:solidFill>
@@ -22646,7 +22646,7 @@
               </a:ln>
               <a:extLst>
                 <a:ext uri="{91240B29-F687-4f45-9708-019B960494DF}">
-                  <a14:hiddenLine xmlns="" xmlns:a16="http://schemas.microsoft.com/office/drawing/2014/main" xmlns:a14="http://schemas.microsoft.com/office/drawing/2010/main" w="9525">
+                  <a14:hiddenLine xmlns:a14="http://schemas.microsoft.com/office/drawing/2010/main" xmlns:a16="http://schemas.microsoft.com/office/drawing/2014/main" xmlns="" w="9525">
                     <a:solidFill>
                       <a:srgbClr val="000000"/>
                     </a:solidFill>
@@ -22758,7 +22758,7 @@
               </a:ln>
               <a:extLst>
                 <a:ext uri="{91240B29-F687-4f45-9708-019B960494DF}">
-                  <a14:hiddenLine xmlns="" xmlns:a16="http://schemas.microsoft.com/office/drawing/2014/main" xmlns:a14="http://schemas.microsoft.com/office/drawing/2010/main" w="9525">
+                  <a14:hiddenLine xmlns:a14="http://schemas.microsoft.com/office/drawing/2010/main" xmlns:a16="http://schemas.microsoft.com/office/drawing/2014/main" xmlns="" w="9525">
                     <a:solidFill>
                       <a:srgbClr val="000000"/>
                     </a:solidFill>
@@ -22814,7 +22814,7 @@
               </a:ln>
               <a:extLst>
                 <a:ext uri="{91240B29-F687-4f45-9708-019B960494DF}">
-                  <a14:hiddenLine xmlns="" xmlns:a16="http://schemas.microsoft.com/office/drawing/2014/main" xmlns:a14="http://schemas.microsoft.com/office/drawing/2010/main" w="9525">
+                  <a14:hiddenLine xmlns:a14="http://schemas.microsoft.com/office/drawing/2010/main" xmlns:a16="http://schemas.microsoft.com/office/drawing/2014/main" xmlns="" w="9525">
                     <a:solidFill>
                       <a:srgbClr val="000000"/>
                     </a:solidFill>
@@ -22976,7 +22976,7 @@
             </a:ln>
             <a:extLst>
               <a:ext uri="{91240B29-F687-4f45-9708-019B960494DF}">
-                <a14:hiddenLine xmlns="" xmlns:a16="http://schemas.microsoft.com/office/drawing/2014/main" xmlns:p14="http://schemas.microsoft.com/office/powerpoint/2010/main" xmlns:a14="http://schemas.microsoft.com/office/drawing/2010/main" w="9525">
+                <a14:hiddenLine xmlns:a14="http://schemas.microsoft.com/office/drawing/2010/main" xmlns:p14="http://schemas.microsoft.com/office/powerpoint/2010/main" xmlns:a16="http://schemas.microsoft.com/office/drawing/2014/main" xmlns="" w="9525">
                   <a:solidFill>
                     <a:srgbClr val="000000"/>
                   </a:solidFill>
@@ -23088,7 +23088,7 @@
             </a:ln>
             <a:extLst>
               <a:ext uri="{91240B29-F687-4f45-9708-019B960494DF}">
-                <a14:hiddenLine xmlns="" xmlns:a16="http://schemas.microsoft.com/office/drawing/2014/main" xmlns:p14="http://schemas.microsoft.com/office/powerpoint/2010/main" xmlns:a14="http://schemas.microsoft.com/office/drawing/2010/main" w="9525">
+                <a14:hiddenLine xmlns:a14="http://schemas.microsoft.com/office/drawing/2010/main" xmlns:p14="http://schemas.microsoft.com/office/powerpoint/2010/main" xmlns:a16="http://schemas.microsoft.com/office/drawing/2014/main" xmlns="" w="9525">
                   <a:solidFill>
                     <a:srgbClr val="000000"/>
                   </a:solidFill>
@@ -23200,7 +23200,7 @@
             </a:ln>
             <a:extLst>
               <a:ext uri="{91240B29-F687-4f45-9708-019B960494DF}">
-                <a14:hiddenLine xmlns="" xmlns:a16="http://schemas.microsoft.com/office/drawing/2014/main" xmlns:p14="http://schemas.microsoft.com/office/powerpoint/2010/main" xmlns:a14="http://schemas.microsoft.com/office/drawing/2010/main" w="9525">
+                <a14:hiddenLine xmlns:a14="http://schemas.microsoft.com/office/drawing/2010/main" xmlns:p14="http://schemas.microsoft.com/office/powerpoint/2010/main" xmlns:a16="http://schemas.microsoft.com/office/drawing/2014/main" xmlns="" w="9525">
                   <a:solidFill>
                     <a:srgbClr val="000000"/>
                   </a:solidFill>
@@ -23284,7 +23284,7 @@
             </a:ln>
             <a:extLst>
               <a:ext uri="{91240B29-F687-4f45-9708-019B960494DF}">
-                <a14:hiddenLine xmlns="" xmlns:a16="http://schemas.microsoft.com/office/drawing/2014/main" xmlns:p14="http://schemas.microsoft.com/office/powerpoint/2010/main" xmlns:a14="http://schemas.microsoft.com/office/drawing/2010/main" w="9525">
+                <a14:hiddenLine xmlns:a14="http://schemas.microsoft.com/office/drawing/2010/main" xmlns:p14="http://schemas.microsoft.com/office/powerpoint/2010/main" xmlns:a16="http://schemas.microsoft.com/office/drawing/2014/main" xmlns="" w="9525">
                   <a:solidFill>
                     <a:srgbClr val="000000"/>
                   </a:solidFill>
@@ -23396,7 +23396,7 @@
             </a:ln>
             <a:extLst>
               <a:ext uri="{91240B29-F687-4f45-9708-019B960494DF}">
-                <a14:hiddenLine xmlns="" xmlns:a16="http://schemas.microsoft.com/office/drawing/2014/main" xmlns:p14="http://schemas.microsoft.com/office/powerpoint/2010/main" xmlns:a14="http://schemas.microsoft.com/office/drawing/2010/main" w="9525">
+                <a14:hiddenLine xmlns:a14="http://schemas.microsoft.com/office/drawing/2010/main" xmlns:p14="http://schemas.microsoft.com/office/powerpoint/2010/main" xmlns:a16="http://schemas.microsoft.com/office/drawing/2014/main" xmlns="" w="9525">
                   <a:solidFill>
                     <a:srgbClr val="000000"/>
                   </a:solidFill>
@@ -23480,7 +23480,7 @@
             </a:ln>
             <a:extLst>
               <a:ext uri="{91240B29-F687-4f45-9708-019B960494DF}">
-                <a14:hiddenLine xmlns="" xmlns:a16="http://schemas.microsoft.com/office/drawing/2014/main" xmlns:p14="http://schemas.microsoft.com/office/powerpoint/2010/main" xmlns:a14="http://schemas.microsoft.com/office/drawing/2010/main" w="9525">
+                <a14:hiddenLine xmlns:a14="http://schemas.microsoft.com/office/drawing/2010/main" xmlns:p14="http://schemas.microsoft.com/office/powerpoint/2010/main" xmlns:a16="http://schemas.microsoft.com/office/drawing/2014/main" xmlns="" w="9525">
                   <a:solidFill>
                     <a:srgbClr val="000000"/>
                   </a:solidFill>
@@ -23564,7 +23564,7 @@
             </a:ln>
             <a:extLst>
               <a:ext uri="{91240B29-F687-4f45-9708-019B960494DF}">
-                <a14:hiddenLine xmlns="" xmlns:a16="http://schemas.microsoft.com/office/drawing/2014/main" xmlns:p14="http://schemas.microsoft.com/office/powerpoint/2010/main" xmlns:a14="http://schemas.microsoft.com/office/drawing/2010/main" w="9525">
+                <a14:hiddenLine xmlns:a14="http://schemas.microsoft.com/office/drawing/2010/main" xmlns:p14="http://schemas.microsoft.com/office/powerpoint/2010/main" xmlns:a16="http://schemas.microsoft.com/office/drawing/2014/main" xmlns="" w="9525">
                   <a:solidFill>
                     <a:srgbClr val="000000"/>
                   </a:solidFill>
@@ -23676,7 +23676,7 @@
             </a:ln>
             <a:extLst>
               <a:ext uri="{91240B29-F687-4f45-9708-019B960494DF}">
-                <a14:hiddenLine xmlns="" xmlns:a16="http://schemas.microsoft.com/office/drawing/2014/main" xmlns:p14="http://schemas.microsoft.com/office/powerpoint/2010/main" xmlns:a14="http://schemas.microsoft.com/office/drawing/2010/main" w="9525">
+                <a14:hiddenLine xmlns:a14="http://schemas.microsoft.com/office/drawing/2010/main" xmlns:p14="http://schemas.microsoft.com/office/powerpoint/2010/main" xmlns:a16="http://schemas.microsoft.com/office/drawing/2014/main" xmlns="" w="9525">
                   <a:solidFill>
                     <a:srgbClr val="000000"/>
                   </a:solidFill>
@@ -23788,7 +23788,7 @@
             </a:ln>
             <a:extLst>
               <a:ext uri="{91240B29-F687-4f45-9708-019B960494DF}">
-                <a14:hiddenLine xmlns="" xmlns:a16="http://schemas.microsoft.com/office/drawing/2014/main" xmlns:p14="http://schemas.microsoft.com/office/powerpoint/2010/main" xmlns:a14="http://schemas.microsoft.com/office/drawing/2010/main" w="9525">
+                <a14:hiddenLine xmlns:a14="http://schemas.microsoft.com/office/drawing/2010/main" xmlns:p14="http://schemas.microsoft.com/office/powerpoint/2010/main" xmlns:a16="http://schemas.microsoft.com/office/drawing/2014/main" xmlns="" w="9525">
                   <a:solidFill>
                     <a:srgbClr val="000000"/>
                   </a:solidFill>
@@ -23872,7 +23872,7 @@
             </a:ln>
             <a:extLst>
               <a:ext uri="{91240B29-F687-4f45-9708-019B960494DF}">
-                <a14:hiddenLine xmlns="" xmlns:a16="http://schemas.microsoft.com/office/drawing/2014/main" xmlns:p14="http://schemas.microsoft.com/office/powerpoint/2010/main" xmlns:a14="http://schemas.microsoft.com/office/drawing/2010/main" w="9525">
+                <a14:hiddenLine xmlns:a14="http://schemas.microsoft.com/office/drawing/2010/main" xmlns:p14="http://schemas.microsoft.com/office/powerpoint/2010/main" xmlns:a16="http://schemas.microsoft.com/office/drawing/2014/main" xmlns="" w="9525">
                   <a:solidFill>
                     <a:srgbClr val="000000"/>
                   </a:solidFill>
@@ -24004,7 +24004,7 @@
             </a:ln>
             <a:extLst>
               <a:ext uri="{91240B29-F687-4f45-9708-019B960494DF}">
-                <a14:hiddenLine xmlns="" xmlns:a16="http://schemas.microsoft.com/office/drawing/2014/main" xmlns:p14="http://schemas.microsoft.com/office/powerpoint/2010/main" xmlns:a14="http://schemas.microsoft.com/office/drawing/2010/main" w="9525">
+                <a14:hiddenLine xmlns:a14="http://schemas.microsoft.com/office/drawing/2010/main" xmlns:p14="http://schemas.microsoft.com/office/powerpoint/2010/main" xmlns:a16="http://schemas.microsoft.com/office/drawing/2014/main" xmlns="" w="9525">
                   <a:solidFill>
                     <a:srgbClr val="000000"/>
                   </a:solidFill>
@@ -24132,7 +24132,7 @@
             </a:ln>
             <a:extLst>
               <a:ext uri="{91240B29-F687-4f45-9708-019B960494DF}">
-                <a14:hiddenLine xmlns="" xmlns:a16="http://schemas.microsoft.com/office/drawing/2014/main" xmlns:p14="http://schemas.microsoft.com/office/powerpoint/2010/main" xmlns:a14="http://schemas.microsoft.com/office/drawing/2010/main" w="9525">
+                <a14:hiddenLine xmlns:a14="http://schemas.microsoft.com/office/drawing/2010/main" xmlns:p14="http://schemas.microsoft.com/office/powerpoint/2010/main" xmlns:a16="http://schemas.microsoft.com/office/drawing/2014/main" xmlns="" w="9525">
                   <a:solidFill>
                     <a:srgbClr val="000000"/>
                   </a:solidFill>
@@ -24216,7 +24216,7 @@
             </a:ln>
             <a:extLst>
               <a:ext uri="{91240B29-F687-4f45-9708-019B960494DF}">
-                <a14:hiddenLine xmlns="" xmlns:a16="http://schemas.microsoft.com/office/drawing/2014/main" xmlns:p14="http://schemas.microsoft.com/office/powerpoint/2010/main" xmlns:a14="http://schemas.microsoft.com/office/drawing/2010/main" w="9525">
+                <a14:hiddenLine xmlns:a14="http://schemas.microsoft.com/office/drawing/2010/main" xmlns:p14="http://schemas.microsoft.com/office/powerpoint/2010/main" xmlns:a16="http://schemas.microsoft.com/office/drawing/2014/main" xmlns="" w="9525">
                   <a:solidFill>
                     <a:srgbClr val="000000"/>
                   </a:solidFill>
@@ -24300,7 +24300,7 @@
             </a:ln>
             <a:extLst>
               <a:ext uri="{91240B29-F687-4f45-9708-019B960494DF}">
-                <a14:hiddenLine xmlns="" xmlns:a16="http://schemas.microsoft.com/office/drawing/2014/main" xmlns:p14="http://schemas.microsoft.com/office/powerpoint/2010/main" xmlns:a14="http://schemas.microsoft.com/office/drawing/2010/main" w="9525">
+                <a14:hiddenLine xmlns:a14="http://schemas.microsoft.com/office/drawing/2010/main" xmlns:p14="http://schemas.microsoft.com/office/powerpoint/2010/main" xmlns:a16="http://schemas.microsoft.com/office/drawing/2014/main" xmlns="" w="9525">
                   <a:solidFill>
                     <a:srgbClr val="000000"/>
                   </a:solidFill>
@@ -24412,7 +24412,7 @@
             </a:ln>
             <a:extLst>
               <a:ext uri="{91240B29-F687-4f45-9708-019B960494DF}">
-                <a14:hiddenLine xmlns="" xmlns:a16="http://schemas.microsoft.com/office/drawing/2014/main" xmlns:p14="http://schemas.microsoft.com/office/powerpoint/2010/main" xmlns:a14="http://schemas.microsoft.com/office/drawing/2010/main" w="9525">
+                <a14:hiddenLine xmlns:a14="http://schemas.microsoft.com/office/drawing/2010/main" xmlns:p14="http://schemas.microsoft.com/office/powerpoint/2010/main" xmlns:a16="http://schemas.microsoft.com/office/drawing/2014/main" xmlns="" w="9525">
                   <a:solidFill>
                     <a:srgbClr val="000000"/>
                   </a:solidFill>
@@ -24468,7 +24468,7 @@
             </a:ln>
             <a:extLst>
               <a:ext uri="{91240B29-F687-4f45-9708-019B960494DF}">
-                <a14:hiddenLine xmlns="" xmlns:a16="http://schemas.microsoft.com/office/drawing/2014/main" xmlns:p14="http://schemas.microsoft.com/office/powerpoint/2010/main" xmlns:a14="http://schemas.microsoft.com/office/drawing/2010/main" w="9525">
+                <a14:hiddenLine xmlns:a14="http://schemas.microsoft.com/office/drawing/2010/main" xmlns:p14="http://schemas.microsoft.com/office/powerpoint/2010/main" xmlns:a16="http://schemas.microsoft.com/office/drawing/2014/main" xmlns="" w="9525">
                   <a:solidFill>
                     <a:srgbClr val="000000"/>
                   </a:solidFill>
@@ -24555,7 +24555,7 @@
             </a:ln>
             <a:extLst>
               <a:ext uri="{91240B29-F687-4f45-9708-019B960494DF}">
-                <a14:hiddenLine xmlns="" xmlns:a16="http://schemas.microsoft.com/office/drawing/2014/main" xmlns:p14="http://schemas.microsoft.com/office/powerpoint/2010/main" xmlns:a14="http://schemas.microsoft.com/office/drawing/2010/main" w="9525">
+                <a14:hiddenLine xmlns:a14="http://schemas.microsoft.com/office/drawing/2010/main" xmlns:p14="http://schemas.microsoft.com/office/powerpoint/2010/main" xmlns:a16="http://schemas.microsoft.com/office/drawing/2014/main" xmlns="" w="9525">
                   <a:solidFill>
                     <a:srgbClr val="000000"/>
                   </a:solidFill>
@@ -24667,7 +24667,7 @@
             </a:ln>
             <a:extLst>
               <a:ext uri="{91240B29-F687-4f45-9708-019B960494DF}">
-                <a14:hiddenLine xmlns="" xmlns:a16="http://schemas.microsoft.com/office/drawing/2014/main" xmlns:p14="http://schemas.microsoft.com/office/powerpoint/2010/main" xmlns:a14="http://schemas.microsoft.com/office/drawing/2010/main" w="9525">
+                <a14:hiddenLine xmlns:a14="http://schemas.microsoft.com/office/drawing/2010/main" xmlns:p14="http://schemas.microsoft.com/office/powerpoint/2010/main" xmlns:a16="http://schemas.microsoft.com/office/drawing/2014/main" xmlns="" w="9525">
                   <a:solidFill>
                     <a:srgbClr val="000000"/>
                   </a:solidFill>
@@ -24751,7 +24751,7 @@
             </a:ln>
             <a:extLst>
               <a:ext uri="{91240B29-F687-4f45-9708-019B960494DF}">
-                <a14:hiddenLine xmlns="" xmlns:a16="http://schemas.microsoft.com/office/drawing/2014/main" xmlns:p14="http://schemas.microsoft.com/office/powerpoint/2010/main" xmlns:a14="http://schemas.microsoft.com/office/drawing/2010/main" w="9525">
+                <a14:hiddenLine xmlns:a14="http://schemas.microsoft.com/office/drawing/2010/main" xmlns:p14="http://schemas.microsoft.com/office/powerpoint/2010/main" xmlns:a16="http://schemas.microsoft.com/office/drawing/2014/main" xmlns="" w="9525">
                   <a:solidFill>
                     <a:srgbClr val="000000"/>
                   </a:solidFill>
@@ -24863,7 +24863,7 @@
             </a:ln>
             <a:extLst>
               <a:ext uri="{91240B29-F687-4f45-9708-019B960494DF}">
-                <a14:hiddenLine xmlns="" xmlns:a16="http://schemas.microsoft.com/office/drawing/2014/main" xmlns:p14="http://schemas.microsoft.com/office/powerpoint/2010/main" xmlns:a14="http://schemas.microsoft.com/office/drawing/2010/main" w="9525">
+                <a14:hiddenLine xmlns:a14="http://schemas.microsoft.com/office/drawing/2010/main" xmlns:p14="http://schemas.microsoft.com/office/powerpoint/2010/main" xmlns:a16="http://schemas.microsoft.com/office/drawing/2014/main" xmlns="" w="9525">
                   <a:solidFill>
                     <a:srgbClr val="000000"/>
                   </a:solidFill>
@@ -24950,7 +24950,7 @@
             </a:ln>
             <a:extLst>
               <a:ext uri="{91240B29-F687-4f45-9708-019B960494DF}">
-                <a14:hiddenLine xmlns="" xmlns:a16="http://schemas.microsoft.com/office/drawing/2014/main" xmlns:p14="http://schemas.microsoft.com/office/powerpoint/2010/main" xmlns:a14="http://schemas.microsoft.com/office/drawing/2010/main" w="9525">
+                <a14:hiddenLine xmlns:a14="http://schemas.microsoft.com/office/drawing/2010/main" xmlns:p14="http://schemas.microsoft.com/office/powerpoint/2010/main" xmlns:a16="http://schemas.microsoft.com/office/drawing/2014/main" xmlns="" w="9525">
                   <a:solidFill>
                     <a:srgbClr val="000000"/>
                   </a:solidFill>
@@ -25034,7 +25034,7 @@
             </a:ln>
             <a:extLst>
               <a:ext uri="{91240B29-F687-4f45-9708-019B960494DF}">
-                <a14:hiddenLine xmlns="" xmlns:a16="http://schemas.microsoft.com/office/drawing/2014/main" xmlns:p14="http://schemas.microsoft.com/office/powerpoint/2010/main" xmlns:a14="http://schemas.microsoft.com/office/drawing/2010/main" w="9525">
+                <a14:hiddenLine xmlns:a14="http://schemas.microsoft.com/office/drawing/2010/main" xmlns:p14="http://schemas.microsoft.com/office/powerpoint/2010/main" xmlns:a16="http://schemas.microsoft.com/office/drawing/2014/main" xmlns="" w="9525">
                   <a:solidFill>
                     <a:srgbClr val="000000"/>
                   </a:solidFill>
@@ -25146,7 +25146,7 @@
             </a:ln>
             <a:extLst>
               <a:ext uri="{91240B29-F687-4f45-9708-019B960494DF}">
-                <a14:hiddenLine xmlns="" xmlns:a16="http://schemas.microsoft.com/office/drawing/2014/main" xmlns:p14="http://schemas.microsoft.com/office/powerpoint/2010/main" xmlns:a14="http://schemas.microsoft.com/office/drawing/2010/main" w="9525">
+                <a14:hiddenLine xmlns:a14="http://schemas.microsoft.com/office/drawing/2010/main" xmlns:p14="http://schemas.microsoft.com/office/powerpoint/2010/main" xmlns:a16="http://schemas.microsoft.com/office/drawing/2014/main" xmlns="" w="9525">
                   <a:solidFill>
                     <a:srgbClr val="000000"/>
                   </a:solidFill>
@@ -25258,7 +25258,7 @@
             </a:ln>
             <a:extLst>
               <a:ext uri="{91240B29-F687-4f45-9708-019B960494DF}">
-                <a14:hiddenLine xmlns="" xmlns:a16="http://schemas.microsoft.com/office/drawing/2014/main" xmlns:p14="http://schemas.microsoft.com/office/powerpoint/2010/main" xmlns:a14="http://schemas.microsoft.com/office/drawing/2010/main" w="9525">
+                <a14:hiddenLine xmlns:a14="http://schemas.microsoft.com/office/drawing/2010/main" xmlns:p14="http://schemas.microsoft.com/office/powerpoint/2010/main" xmlns:a16="http://schemas.microsoft.com/office/drawing/2014/main" xmlns="" w="9525">
                   <a:solidFill>
                     <a:srgbClr val="000000"/>
                   </a:solidFill>
@@ -25345,7 +25345,7 @@
             </a:ln>
             <a:extLst>
               <a:ext uri="{91240B29-F687-4f45-9708-019B960494DF}">
-                <a14:hiddenLine xmlns="" xmlns:a16="http://schemas.microsoft.com/office/drawing/2014/main" xmlns:p14="http://schemas.microsoft.com/office/powerpoint/2010/main" xmlns:a14="http://schemas.microsoft.com/office/drawing/2010/main" w="9525">
+                <a14:hiddenLine xmlns:a14="http://schemas.microsoft.com/office/drawing/2010/main" xmlns:p14="http://schemas.microsoft.com/office/powerpoint/2010/main" xmlns:a16="http://schemas.microsoft.com/office/drawing/2014/main" xmlns="" w="9525">
                   <a:solidFill>
                     <a:srgbClr val="000000"/>
                   </a:solidFill>
@@ -25487,7 +25487,7 @@
             </a:ln>
             <a:extLst>
               <a:ext uri="{91240B29-F687-4f45-9708-019B960494DF}">
-                <a14:hiddenLine xmlns="" xmlns:a16="http://schemas.microsoft.com/office/drawing/2014/main" xmlns:p14="http://schemas.microsoft.com/office/powerpoint/2010/main" xmlns:a14="http://schemas.microsoft.com/office/drawing/2010/main" w="9525">
+                <a14:hiddenLine xmlns:a14="http://schemas.microsoft.com/office/drawing/2010/main" xmlns:p14="http://schemas.microsoft.com/office/powerpoint/2010/main" xmlns:a16="http://schemas.microsoft.com/office/drawing/2014/main" xmlns="" w="9525">
                   <a:solidFill>
                     <a:srgbClr val="000000"/>
                   </a:solidFill>
@@ -25793,7 +25793,7 @@
         </p:spPr>
         <p:txBody>
           <a:bodyPr>
-            <a:normAutofit fontScale="70000" lnSpcReduction="20000"/>
+            <a:normAutofit fontScale="62500" lnSpcReduction="20000"/>
           </a:bodyPr>
           <a:lstStyle/>
           <a:p>
@@ -26092,6 +26092,34 @@
             <a:pPr marL="0" indent="0">
               <a:buNone/>
             </a:pPr>
+            <a:r>
+              <a:rPr lang="en-US" dirty="0" err="1">
+                <a:latin typeface="Arial" panose="020B0604020202020204" pitchFamily="34" charset="0"/>
+                <a:cs typeface="Arial" panose="020B0604020202020204" pitchFamily="34" charset="0"/>
+              </a:rPr>
+              <a:t>Repositorio</a:t>
+            </a:r>
+            <a:r>
+              <a:rPr lang="en-US" dirty="0">
+                <a:latin typeface="Arial" panose="020B0604020202020204" pitchFamily="34" charset="0"/>
+                <a:cs typeface="Arial" panose="020B0604020202020204" pitchFamily="34" charset="0"/>
+              </a:rPr>
+              <a:t> de </a:t>
+            </a:r>
+            <a:r>
+              <a:rPr lang="en-US" dirty="0" err="1">
+                <a:latin typeface="Arial" panose="020B0604020202020204" pitchFamily="34" charset="0"/>
+                <a:cs typeface="Arial" panose="020B0604020202020204" pitchFamily="34" charset="0"/>
+              </a:rPr>
+              <a:t>Github</a:t>
+            </a:r>
+            <a:r>
+              <a:rPr lang="en-US">
+                <a:latin typeface="Arial" panose="020B0604020202020204" pitchFamily="34" charset="0"/>
+                <a:cs typeface="Arial" panose="020B0604020202020204" pitchFamily="34" charset="0"/>
+              </a:rPr>
+              <a:t>: https://github.com/RyogaAqua/Restaurante</a:t>
+            </a:r>
             <a:endParaRPr dirty="0">
               <a:latin typeface="Arial" panose="020B0604020202020204" pitchFamily="34" charset="0"/>
               <a:cs typeface="Arial" panose="020B0604020202020204" pitchFamily="34" charset="0"/>
@@ -26612,7 +26640,7 @@
             </a:ln>
             <a:extLst>
               <a:ext uri="{91240B29-F687-4f45-9708-019B960494DF}">
-                <a14:hiddenLine xmlns="" xmlns:a16="http://schemas.microsoft.com/office/drawing/2014/main" xmlns:p14="http://schemas.microsoft.com/office/powerpoint/2010/main" xmlns:a14="http://schemas.microsoft.com/office/drawing/2010/main" w="9525">
+                <a14:hiddenLine xmlns:a14="http://schemas.microsoft.com/office/drawing/2010/main" xmlns:p14="http://schemas.microsoft.com/office/powerpoint/2010/main" xmlns:a16="http://schemas.microsoft.com/office/drawing/2014/main" xmlns="" w="9525">
                   <a:solidFill>
                     <a:srgbClr val="000000"/>
                   </a:solidFill>
@@ -26724,7 +26752,7 @@
             </a:ln>
             <a:extLst>
               <a:ext uri="{91240B29-F687-4f45-9708-019B960494DF}">
-                <a14:hiddenLine xmlns="" xmlns:a16="http://schemas.microsoft.com/office/drawing/2014/main" xmlns:p14="http://schemas.microsoft.com/office/powerpoint/2010/main" xmlns:a14="http://schemas.microsoft.com/office/drawing/2010/main" w="9525">
+                <a14:hiddenLine xmlns:a14="http://schemas.microsoft.com/office/drawing/2010/main" xmlns:p14="http://schemas.microsoft.com/office/powerpoint/2010/main" xmlns:a16="http://schemas.microsoft.com/office/drawing/2014/main" xmlns="" w="9525">
                   <a:solidFill>
                     <a:srgbClr val="000000"/>
                   </a:solidFill>
@@ -26836,7 +26864,7 @@
             </a:ln>
             <a:extLst>
               <a:ext uri="{91240B29-F687-4f45-9708-019B960494DF}">
-                <a14:hiddenLine xmlns="" xmlns:a16="http://schemas.microsoft.com/office/drawing/2014/main" xmlns:p14="http://schemas.microsoft.com/office/powerpoint/2010/main" xmlns:a14="http://schemas.microsoft.com/office/drawing/2010/main" w="9525">
+                <a14:hiddenLine xmlns:a14="http://schemas.microsoft.com/office/drawing/2010/main" xmlns:p14="http://schemas.microsoft.com/office/powerpoint/2010/main" xmlns:a16="http://schemas.microsoft.com/office/drawing/2014/main" xmlns="" w="9525">
                   <a:solidFill>
                     <a:srgbClr val="000000"/>
                   </a:solidFill>
@@ -26920,7 +26948,7 @@
             </a:ln>
             <a:extLst>
               <a:ext uri="{91240B29-F687-4f45-9708-019B960494DF}">
-                <a14:hiddenLine xmlns="" xmlns:a16="http://schemas.microsoft.com/office/drawing/2014/main" xmlns:p14="http://schemas.microsoft.com/office/powerpoint/2010/main" xmlns:a14="http://schemas.microsoft.com/office/drawing/2010/main" w="9525">
+                <a14:hiddenLine xmlns:a14="http://schemas.microsoft.com/office/drawing/2010/main" xmlns:p14="http://schemas.microsoft.com/office/powerpoint/2010/main" xmlns:a16="http://schemas.microsoft.com/office/drawing/2014/main" xmlns="" w="9525">
                   <a:solidFill>
                     <a:srgbClr val="000000"/>
                   </a:solidFill>
@@ -27032,7 +27060,7 @@
             </a:ln>
             <a:extLst>
               <a:ext uri="{91240B29-F687-4f45-9708-019B960494DF}">
-                <a14:hiddenLine xmlns="" xmlns:a16="http://schemas.microsoft.com/office/drawing/2014/main" xmlns:p14="http://schemas.microsoft.com/office/powerpoint/2010/main" xmlns:a14="http://schemas.microsoft.com/office/drawing/2010/main" w="9525">
+                <a14:hiddenLine xmlns:a14="http://schemas.microsoft.com/office/drawing/2010/main" xmlns:p14="http://schemas.microsoft.com/office/powerpoint/2010/main" xmlns:a16="http://schemas.microsoft.com/office/drawing/2014/main" xmlns="" w="9525">
                   <a:solidFill>
                     <a:srgbClr val="000000"/>
                   </a:solidFill>
@@ -27116,7 +27144,7 @@
             </a:ln>
             <a:extLst>
               <a:ext uri="{91240B29-F687-4f45-9708-019B960494DF}">
-                <a14:hiddenLine xmlns="" xmlns:a16="http://schemas.microsoft.com/office/drawing/2014/main" xmlns:p14="http://schemas.microsoft.com/office/powerpoint/2010/main" xmlns:a14="http://schemas.microsoft.com/office/drawing/2010/main" w="9525">
+                <a14:hiddenLine xmlns:a14="http://schemas.microsoft.com/office/drawing/2010/main" xmlns:p14="http://schemas.microsoft.com/office/powerpoint/2010/main" xmlns:a16="http://schemas.microsoft.com/office/drawing/2014/main" xmlns="" w="9525">
                   <a:solidFill>
                     <a:srgbClr val="000000"/>
                   </a:solidFill>
@@ -27200,7 +27228,7 @@
             </a:ln>
             <a:extLst>
               <a:ext uri="{91240B29-F687-4f45-9708-019B960494DF}">
-                <a14:hiddenLine xmlns="" xmlns:a16="http://schemas.microsoft.com/office/drawing/2014/main" xmlns:p14="http://schemas.microsoft.com/office/powerpoint/2010/main" xmlns:a14="http://schemas.microsoft.com/office/drawing/2010/main" w="9525">
+                <a14:hiddenLine xmlns:a14="http://schemas.microsoft.com/office/drawing/2010/main" xmlns:p14="http://schemas.microsoft.com/office/powerpoint/2010/main" xmlns:a16="http://schemas.microsoft.com/office/drawing/2014/main" xmlns="" w="9525">
                   <a:solidFill>
                     <a:srgbClr val="000000"/>
                   </a:solidFill>
@@ -27312,7 +27340,7 @@
             </a:ln>
             <a:extLst>
               <a:ext uri="{91240B29-F687-4f45-9708-019B960494DF}">
-                <a14:hiddenLine xmlns="" xmlns:a16="http://schemas.microsoft.com/office/drawing/2014/main" xmlns:p14="http://schemas.microsoft.com/office/powerpoint/2010/main" xmlns:a14="http://schemas.microsoft.com/office/drawing/2010/main" w="9525">
+                <a14:hiddenLine xmlns:a14="http://schemas.microsoft.com/office/drawing/2010/main" xmlns:p14="http://schemas.microsoft.com/office/powerpoint/2010/main" xmlns:a16="http://schemas.microsoft.com/office/drawing/2014/main" xmlns="" w="9525">
                   <a:solidFill>
                     <a:srgbClr val="000000"/>
                   </a:solidFill>
@@ -27424,7 +27452,7 @@
             </a:ln>
             <a:extLst>
               <a:ext uri="{91240B29-F687-4f45-9708-019B960494DF}">
-                <a14:hiddenLine xmlns="" xmlns:a16="http://schemas.microsoft.com/office/drawing/2014/main" xmlns:p14="http://schemas.microsoft.com/office/powerpoint/2010/main" xmlns:a14="http://schemas.microsoft.com/office/drawing/2010/main" w="9525">
+                <a14:hiddenLine xmlns:a14="http://schemas.microsoft.com/office/drawing/2010/main" xmlns:p14="http://schemas.microsoft.com/office/powerpoint/2010/main" xmlns:a16="http://schemas.microsoft.com/office/drawing/2014/main" xmlns="" w="9525">
                   <a:solidFill>
                     <a:srgbClr val="000000"/>
                   </a:solidFill>
@@ -27508,7 +27536,7 @@
             </a:ln>
             <a:extLst>
               <a:ext uri="{91240B29-F687-4f45-9708-019B960494DF}">
-                <a14:hiddenLine xmlns="" xmlns:a16="http://schemas.microsoft.com/office/drawing/2014/main" xmlns:p14="http://schemas.microsoft.com/office/powerpoint/2010/main" xmlns:a14="http://schemas.microsoft.com/office/drawing/2010/main" w="9525">
+                <a14:hiddenLine xmlns:a14="http://schemas.microsoft.com/office/drawing/2010/main" xmlns:p14="http://schemas.microsoft.com/office/powerpoint/2010/main" xmlns:a16="http://schemas.microsoft.com/office/drawing/2014/main" xmlns="" w="9525">
                   <a:solidFill>
                     <a:srgbClr val="000000"/>
                   </a:solidFill>
@@ -27640,7 +27668,7 @@
             </a:ln>
             <a:extLst>
               <a:ext uri="{91240B29-F687-4f45-9708-019B960494DF}">
-                <a14:hiddenLine xmlns="" xmlns:a16="http://schemas.microsoft.com/office/drawing/2014/main" xmlns:p14="http://schemas.microsoft.com/office/powerpoint/2010/main" xmlns:a14="http://schemas.microsoft.com/office/drawing/2010/main" w="9525">
+                <a14:hiddenLine xmlns:a14="http://schemas.microsoft.com/office/drawing/2010/main" xmlns:p14="http://schemas.microsoft.com/office/powerpoint/2010/main" xmlns:a16="http://schemas.microsoft.com/office/drawing/2014/main" xmlns="" w="9525">
                   <a:solidFill>
                     <a:srgbClr val="000000"/>
                   </a:solidFill>
@@ -27768,7 +27796,7 @@
             </a:ln>
             <a:extLst>
               <a:ext uri="{91240B29-F687-4f45-9708-019B960494DF}">
-                <a14:hiddenLine xmlns="" xmlns:a16="http://schemas.microsoft.com/office/drawing/2014/main" xmlns:p14="http://schemas.microsoft.com/office/powerpoint/2010/main" xmlns:a14="http://schemas.microsoft.com/office/drawing/2010/main" w="9525">
+                <a14:hiddenLine xmlns:a14="http://schemas.microsoft.com/office/drawing/2010/main" xmlns:p14="http://schemas.microsoft.com/office/powerpoint/2010/main" xmlns:a16="http://schemas.microsoft.com/office/drawing/2014/main" xmlns="" w="9525">
                   <a:solidFill>
                     <a:srgbClr val="000000"/>
                   </a:solidFill>
@@ -27852,7 +27880,7 @@
             </a:ln>
             <a:extLst>
               <a:ext uri="{91240B29-F687-4f45-9708-019B960494DF}">
-                <a14:hiddenLine xmlns="" xmlns:a16="http://schemas.microsoft.com/office/drawing/2014/main" xmlns:p14="http://schemas.microsoft.com/office/powerpoint/2010/main" xmlns:a14="http://schemas.microsoft.com/office/drawing/2010/main" w="9525">
+                <a14:hiddenLine xmlns:a14="http://schemas.microsoft.com/office/drawing/2010/main" xmlns:p14="http://schemas.microsoft.com/office/powerpoint/2010/main" xmlns:a16="http://schemas.microsoft.com/office/drawing/2014/main" xmlns="" w="9525">
                   <a:solidFill>
                     <a:srgbClr val="000000"/>
                   </a:solidFill>
@@ -27936,7 +27964,7 @@
             </a:ln>
             <a:extLst>
               <a:ext uri="{91240B29-F687-4f45-9708-019B960494DF}">
-                <a14:hiddenLine xmlns="" xmlns:a16="http://schemas.microsoft.com/office/drawing/2014/main" xmlns:p14="http://schemas.microsoft.com/office/powerpoint/2010/main" xmlns:a14="http://schemas.microsoft.com/office/drawing/2010/main" w="9525">
+                <a14:hiddenLine xmlns:a14="http://schemas.microsoft.com/office/drawing/2010/main" xmlns:p14="http://schemas.microsoft.com/office/powerpoint/2010/main" xmlns:a16="http://schemas.microsoft.com/office/drawing/2014/main" xmlns="" w="9525">
                   <a:solidFill>
                     <a:srgbClr val="000000"/>
                   </a:solidFill>
@@ -28048,7 +28076,7 @@
             </a:ln>
             <a:extLst>
               <a:ext uri="{91240B29-F687-4f45-9708-019B960494DF}">
-                <a14:hiddenLine xmlns="" xmlns:a16="http://schemas.microsoft.com/office/drawing/2014/main" xmlns:p14="http://schemas.microsoft.com/office/powerpoint/2010/main" xmlns:a14="http://schemas.microsoft.com/office/drawing/2010/main" w="9525">
+                <a14:hiddenLine xmlns:a14="http://schemas.microsoft.com/office/drawing/2010/main" xmlns:p14="http://schemas.microsoft.com/office/powerpoint/2010/main" xmlns:a16="http://schemas.microsoft.com/office/drawing/2014/main" xmlns="" w="9525">
                   <a:solidFill>
                     <a:srgbClr val="000000"/>
                   </a:solidFill>
@@ -28104,7 +28132,7 @@
             </a:ln>
             <a:extLst>
               <a:ext uri="{91240B29-F687-4f45-9708-019B960494DF}">
-                <a14:hiddenLine xmlns="" xmlns:a16="http://schemas.microsoft.com/office/drawing/2014/main" xmlns:p14="http://schemas.microsoft.com/office/powerpoint/2010/main" xmlns:a14="http://schemas.microsoft.com/office/drawing/2010/main" w="9525">
+                <a14:hiddenLine xmlns:a14="http://schemas.microsoft.com/office/drawing/2010/main" xmlns:p14="http://schemas.microsoft.com/office/powerpoint/2010/main" xmlns:a16="http://schemas.microsoft.com/office/drawing/2014/main" xmlns="" w="9525">
                   <a:solidFill>
                     <a:srgbClr val="000000"/>
                   </a:solidFill>
@@ -28191,7 +28219,7 @@
             </a:ln>
             <a:extLst>
               <a:ext uri="{91240B29-F687-4f45-9708-019B960494DF}">
-                <a14:hiddenLine xmlns="" xmlns:a16="http://schemas.microsoft.com/office/drawing/2014/main" xmlns:p14="http://schemas.microsoft.com/office/powerpoint/2010/main" xmlns:a14="http://schemas.microsoft.com/office/drawing/2010/main" w="9525">
+                <a14:hiddenLine xmlns:a14="http://schemas.microsoft.com/office/drawing/2010/main" xmlns:p14="http://schemas.microsoft.com/office/powerpoint/2010/main" xmlns:a16="http://schemas.microsoft.com/office/drawing/2014/main" xmlns="" w="9525">
                   <a:solidFill>
                     <a:srgbClr val="000000"/>
                   </a:solidFill>
@@ -28303,7 +28331,7 @@
             </a:ln>
             <a:extLst>
               <a:ext uri="{91240B29-F687-4f45-9708-019B960494DF}">
-                <a14:hiddenLine xmlns="" xmlns:a16="http://schemas.microsoft.com/office/drawing/2014/main" xmlns:p14="http://schemas.microsoft.com/office/powerpoint/2010/main" xmlns:a14="http://schemas.microsoft.com/office/drawing/2010/main" w="9525">
+                <a14:hiddenLine xmlns:a14="http://schemas.microsoft.com/office/drawing/2010/main" xmlns:p14="http://schemas.microsoft.com/office/powerpoint/2010/main" xmlns:a16="http://schemas.microsoft.com/office/drawing/2014/main" xmlns="" w="9525">
                   <a:solidFill>
                     <a:srgbClr val="000000"/>
                   </a:solidFill>
@@ -28387,7 +28415,7 @@
             </a:ln>
             <a:extLst>
               <a:ext uri="{91240B29-F687-4f45-9708-019B960494DF}">
-                <a14:hiddenLine xmlns="" xmlns:a16="http://schemas.microsoft.com/office/drawing/2014/main" xmlns:p14="http://schemas.microsoft.com/office/powerpoint/2010/main" xmlns:a14="http://schemas.microsoft.com/office/drawing/2010/main" w="9525">
+                <a14:hiddenLine xmlns:a14="http://schemas.microsoft.com/office/drawing/2010/main" xmlns:p14="http://schemas.microsoft.com/office/powerpoint/2010/main" xmlns:a16="http://schemas.microsoft.com/office/drawing/2014/main" xmlns="" w="9525">
                   <a:solidFill>
                     <a:srgbClr val="000000"/>
                   </a:solidFill>
@@ -28499,7 +28527,7 @@
             </a:ln>
             <a:extLst>
               <a:ext uri="{91240B29-F687-4f45-9708-019B960494DF}">
-                <a14:hiddenLine xmlns="" xmlns:a16="http://schemas.microsoft.com/office/drawing/2014/main" xmlns:p14="http://schemas.microsoft.com/office/powerpoint/2010/main" xmlns:a14="http://schemas.microsoft.com/office/drawing/2010/main" w="9525">
+                <a14:hiddenLine xmlns:a14="http://schemas.microsoft.com/office/drawing/2010/main" xmlns:p14="http://schemas.microsoft.com/office/powerpoint/2010/main" xmlns:a16="http://schemas.microsoft.com/office/drawing/2014/main" xmlns="" w="9525">
                   <a:solidFill>
                     <a:srgbClr val="000000"/>
                   </a:solidFill>
@@ -28586,7 +28614,7 @@
             </a:ln>
             <a:extLst>
               <a:ext uri="{91240B29-F687-4f45-9708-019B960494DF}">
-                <a14:hiddenLine xmlns="" xmlns:a16="http://schemas.microsoft.com/office/drawing/2014/main" xmlns:p14="http://schemas.microsoft.com/office/powerpoint/2010/main" xmlns:a14="http://schemas.microsoft.com/office/drawing/2010/main" w="9525">
+                <a14:hiddenLine xmlns:a14="http://schemas.microsoft.com/office/drawing/2010/main" xmlns:p14="http://schemas.microsoft.com/office/powerpoint/2010/main" xmlns:a16="http://schemas.microsoft.com/office/drawing/2014/main" xmlns="" w="9525">
                   <a:solidFill>
                     <a:srgbClr val="000000"/>
                   </a:solidFill>
@@ -28670,7 +28698,7 @@
             </a:ln>
             <a:extLst>
               <a:ext uri="{91240B29-F687-4f45-9708-019B960494DF}">
-                <a14:hiddenLine xmlns="" xmlns:a16="http://schemas.microsoft.com/office/drawing/2014/main" xmlns:p14="http://schemas.microsoft.com/office/powerpoint/2010/main" xmlns:a14="http://schemas.microsoft.com/office/drawing/2010/main" w="9525">
+                <a14:hiddenLine xmlns:a14="http://schemas.microsoft.com/office/drawing/2010/main" xmlns:p14="http://schemas.microsoft.com/office/powerpoint/2010/main" xmlns:a16="http://schemas.microsoft.com/office/drawing/2014/main" xmlns="" w="9525">
                   <a:solidFill>
                     <a:srgbClr val="000000"/>
                   </a:solidFill>
@@ -28782,7 +28810,7 @@
             </a:ln>
             <a:extLst>
               <a:ext uri="{91240B29-F687-4f45-9708-019B960494DF}">
-                <a14:hiddenLine xmlns="" xmlns:a16="http://schemas.microsoft.com/office/drawing/2014/main" xmlns:p14="http://schemas.microsoft.com/office/powerpoint/2010/main" xmlns:a14="http://schemas.microsoft.com/office/drawing/2010/main" w="9525">
+                <a14:hiddenLine xmlns:a14="http://schemas.microsoft.com/office/drawing/2010/main" xmlns:p14="http://schemas.microsoft.com/office/powerpoint/2010/main" xmlns:a16="http://schemas.microsoft.com/office/drawing/2014/main" xmlns="" w="9525">
                   <a:solidFill>
                     <a:srgbClr val="000000"/>
                   </a:solidFill>
@@ -28894,7 +28922,7 @@
             </a:ln>
             <a:extLst>
               <a:ext uri="{91240B29-F687-4f45-9708-019B960494DF}">
-                <a14:hiddenLine xmlns="" xmlns:a16="http://schemas.microsoft.com/office/drawing/2014/main" xmlns:p14="http://schemas.microsoft.com/office/powerpoint/2010/main" xmlns:a14="http://schemas.microsoft.com/office/drawing/2010/main" w="9525">
+                <a14:hiddenLine xmlns:a14="http://schemas.microsoft.com/office/drawing/2010/main" xmlns:p14="http://schemas.microsoft.com/office/powerpoint/2010/main" xmlns:a16="http://schemas.microsoft.com/office/drawing/2014/main" xmlns="" w="9525">
                   <a:solidFill>
                     <a:srgbClr val="000000"/>
                   </a:solidFill>
@@ -28981,7 +29009,7 @@
             </a:ln>
             <a:extLst>
               <a:ext uri="{91240B29-F687-4f45-9708-019B960494DF}">
-                <a14:hiddenLine xmlns="" xmlns:a16="http://schemas.microsoft.com/office/drawing/2014/main" xmlns:p14="http://schemas.microsoft.com/office/powerpoint/2010/main" xmlns:a14="http://schemas.microsoft.com/office/drawing/2010/main" w="9525">
+                <a14:hiddenLine xmlns:a14="http://schemas.microsoft.com/office/drawing/2010/main" xmlns:p14="http://schemas.microsoft.com/office/powerpoint/2010/main" xmlns:a16="http://schemas.microsoft.com/office/drawing/2014/main" xmlns="" w="9525">
                   <a:solidFill>
                     <a:srgbClr val="000000"/>
                   </a:solidFill>
@@ -29123,7 +29151,7 @@
             </a:ln>
             <a:extLst>
               <a:ext uri="{91240B29-F687-4f45-9708-019B960494DF}">
-                <a14:hiddenLine xmlns="" xmlns:a16="http://schemas.microsoft.com/office/drawing/2014/main" xmlns:p14="http://schemas.microsoft.com/office/powerpoint/2010/main" xmlns:a14="http://schemas.microsoft.com/office/drawing/2010/main" w="9525">
+                <a14:hiddenLine xmlns:a14="http://schemas.microsoft.com/office/drawing/2010/main" xmlns:p14="http://schemas.microsoft.com/office/powerpoint/2010/main" xmlns:a16="http://schemas.microsoft.com/office/drawing/2014/main" xmlns="" w="9525">
                   <a:solidFill>
                     <a:srgbClr val="000000"/>
                   </a:solidFill>

</xml_diff>

<commit_message>
Escribi los nombres completo en el README
</commit_message>
<xml_diff>
--- a/Presentacion_Burger_Rush_Final (1).pptx
+++ b/Presentacion_Burger_Rush_Final (1).pptx
@@ -6819,7 +6819,7 @@
           <a:noFill/>
           <a:extLst>
             <a:ext uri="{909E8E84-426E-40dd-AFC4-6F175D3DCCD1}">
-              <a14:hiddenFill xmlns:a14="http://schemas.microsoft.com/office/drawing/2010/main" xmlns="">
+              <a14:hiddenFill xmlns="" xmlns:a14="http://schemas.microsoft.com/office/drawing/2010/main">
                 <a:solidFill>
                   <a:srgbClr val="FFFFFF"/>
                 </a:solidFill>
@@ -6878,7 +6878,7 @@
             </a:ln>
             <a:extLst>
               <a:ext uri="{91240B29-F687-4f45-9708-019B960494DF}">
-                <a14:hiddenLine xmlns:a14="http://schemas.microsoft.com/office/drawing/2010/main" xmlns="" w="9525">
+                <a14:hiddenLine xmlns="" xmlns:a14="http://schemas.microsoft.com/office/drawing/2010/main" w="9525">
                   <a:solidFill>
                     <a:srgbClr val="000000"/>
                   </a:solidFill>
@@ -6968,7 +6968,7 @@
             </a:ln>
             <a:extLst>
               <a:ext uri="{91240B29-F687-4f45-9708-019B960494DF}">
-                <a14:hiddenLine xmlns:a14="http://schemas.microsoft.com/office/drawing/2010/main" xmlns="" w="9525">
+                <a14:hiddenLine xmlns="" xmlns:a14="http://schemas.microsoft.com/office/drawing/2010/main" w="9525">
                   <a:solidFill>
                     <a:srgbClr val="000000"/>
                   </a:solidFill>
@@ -7058,7 +7058,7 @@
             </a:ln>
             <a:extLst>
               <a:ext uri="{91240B29-F687-4f45-9708-019B960494DF}">
-                <a14:hiddenLine xmlns:a14="http://schemas.microsoft.com/office/drawing/2010/main" xmlns="" w="9525">
+                <a14:hiddenLine xmlns="" xmlns:a14="http://schemas.microsoft.com/office/drawing/2010/main" w="9525">
                   <a:solidFill>
                     <a:srgbClr val="000000"/>
                   </a:solidFill>
@@ -7092,7 +7092,7 @@
             </a:ln>
             <a:extLst>
               <a:ext uri="{91240B29-F687-4f45-9708-019B960494DF}">
-                <a14:hiddenLine xmlns:a14="http://schemas.microsoft.com/office/drawing/2010/main" xmlns="" w="9525">
+                <a14:hiddenLine xmlns="" xmlns:a14="http://schemas.microsoft.com/office/drawing/2010/main" w="9525">
                   <a:solidFill>
                     <a:srgbClr val="000000"/>
                   </a:solidFill>
@@ -7182,7 +7182,7 @@
             </a:ln>
             <a:extLst>
               <a:ext uri="{91240B29-F687-4f45-9708-019B960494DF}">
-                <a14:hiddenLine xmlns:a14="http://schemas.microsoft.com/office/drawing/2010/main" xmlns="" w="9525">
+                <a14:hiddenLine xmlns="" xmlns:a14="http://schemas.microsoft.com/office/drawing/2010/main" w="9525">
                   <a:solidFill>
                     <a:srgbClr val="000000"/>
                   </a:solidFill>
@@ -7244,7 +7244,7 @@
             </a:ln>
             <a:extLst>
               <a:ext uri="{91240B29-F687-4f45-9708-019B960494DF}">
-                <a14:hiddenLine xmlns:a14="http://schemas.microsoft.com/office/drawing/2010/main" xmlns="" w="9525">
+                <a14:hiddenLine xmlns="" xmlns:a14="http://schemas.microsoft.com/office/drawing/2010/main" w="9525">
                   <a:solidFill>
                     <a:srgbClr val="000000"/>
                   </a:solidFill>
@@ -7306,7 +7306,7 @@
             </a:ln>
             <a:extLst>
               <a:ext uri="{91240B29-F687-4f45-9708-019B960494DF}">
-                <a14:hiddenLine xmlns:a14="http://schemas.microsoft.com/office/drawing/2010/main" xmlns="" w="9525">
+                <a14:hiddenLine xmlns="" xmlns:a14="http://schemas.microsoft.com/office/drawing/2010/main" w="9525">
                   <a:solidFill>
                     <a:srgbClr val="000000"/>
                   </a:solidFill>
@@ -7396,7 +7396,7 @@
             </a:ln>
             <a:extLst>
               <a:ext uri="{91240B29-F687-4f45-9708-019B960494DF}">
-                <a14:hiddenLine xmlns:a14="http://schemas.microsoft.com/office/drawing/2010/main" xmlns="" w="9525">
+                <a14:hiddenLine xmlns="" xmlns:a14="http://schemas.microsoft.com/office/drawing/2010/main" w="9525">
                   <a:solidFill>
                     <a:srgbClr val="000000"/>
                   </a:solidFill>
@@ -7458,7 +7458,7 @@
             </a:ln>
             <a:extLst>
               <a:ext uri="{91240B29-F687-4f45-9708-019B960494DF}">
-                <a14:hiddenLine xmlns:a14="http://schemas.microsoft.com/office/drawing/2010/main" xmlns="" w="9525">
+                <a14:hiddenLine xmlns="" xmlns:a14="http://schemas.microsoft.com/office/drawing/2010/main" w="9525">
                   <a:solidFill>
                     <a:srgbClr val="000000"/>
                   </a:solidFill>
@@ -7520,7 +7520,7 @@
             </a:ln>
             <a:extLst>
               <a:ext uri="{91240B29-F687-4f45-9708-019B960494DF}">
-                <a14:hiddenLine xmlns:a14="http://schemas.microsoft.com/office/drawing/2010/main" xmlns="" w="9525">
+                <a14:hiddenLine xmlns="" xmlns:a14="http://schemas.microsoft.com/office/drawing/2010/main" w="9525">
                   <a:solidFill>
                     <a:srgbClr val="000000"/>
                   </a:solidFill>
@@ -7610,7 +7610,7 @@
             </a:ln>
             <a:extLst>
               <a:ext uri="{91240B29-F687-4f45-9708-019B960494DF}">
-                <a14:hiddenLine xmlns:a14="http://schemas.microsoft.com/office/drawing/2010/main" xmlns="" w="9525">
+                <a14:hiddenLine xmlns="" xmlns:a14="http://schemas.microsoft.com/office/drawing/2010/main" w="9525">
                   <a:solidFill>
                     <a:srgbClr val="000000"/>
                   </a:solidFill>
@@ -7700,7 +7700,7 @@
             </a:ln>
             <a:extLst>
               <a:ext uri="{91240B29-F687-4f45-9708-019B960494DF}">
-                <a14:hiddenLine xmlns:a14="http://schemas.microsoft.com/office/drawing/2010/main" xmlns="" w="9525">
+                <a14:hiddenLine xmlns="" xmlns:a14="http://schemas.microsoft.com/office/drawing/2010/main" w="9525">
                   <a:solidFill>
                     <a:srgbClr val="000000"/>
                   </a:solidFill>
@@ -7762,7 +7762,7 @@
             </a:ln>
             <a:extLst>
               <a:ext uri="{91240B29-F687-4f45-9708-019B960494DF}">
-                <a14:hiddenLine xmlns:a14="http://schemas.microsoft.com/office/drawing/2010/main" xmlns="" w="9525">
+                <a14:hiddenLine xmlns="" xmlns:a14="http://schemas.microsoft.com/office/drawing/2010/main" w="9525">
                   <a:solidFill>
                     <a:srgbClr val="000000"/>
                   </a:solidFill>
@@ -7872,7 +7872,7 @@
             </a:ln>
             <a:extLst>
               <a:ext uri="{91240B29-F687-4f45-9708-019B960494DF}">
-                <a14:hiddenLine xmlns:a14="http://schemas.microsoft.com/office/drawing/2010/main" xmlns="" w="9525">
+                <a14:hiddenLine xmlns="" xmlns:a14="http://schemas.microsoft.com/office/drawing/2010/main" w="9525">
                   <a:solidFill>
                     <a:srgbClr val="000000"/>
                   </a:solidFill>
@@ -7934,7 +7934,7 @@
             </a:ln>
             <a:extLst>
               <a:ext uri="{91240B29-F687-4f45-9708-019B960494DF}">
-                <a14:hiddenLine xmlns:a14="http://schemas.microsoft.com/office/drawing/2010/main" xmlns="" w="9525">
+                <a14:hiddenLine xmlns="" xmlns:a14="http://schemas.microsoft.com/office/drawing/2010/main" w="9525">
                   <a:solidFill>
                     <a:srgbClr val="000000"/>
                   </a:solidFill>
@@ -8024,7 +8024,7 @@
             </a:ln>
             <a:extLst>
               <a:ext uri="{91240B29-F687-4f45-9708-019B960494DF}">
-                <a14:hiddenLine xmlns:a14="http://schemas.microsoft.com/office/drawing/2010/main" xmlns="" w="9525">
+                <a14:hiddenLine xmlns="" xmlns:a14="http://schemas.microsoft.com/office/drawing/2010/main" w="9525">
                   <a:solidFill>
                     <a:srgbClr val="000000"/>
                   </a:solidFill>
@@ -8114,7 +8114,7 @@
             </a:ln>
             <a:extLst>
               <a:ext uri="{91240B29-F687-4f45-9708-019B960494DF}">
-                <a14:hiddenLine xmlns:a14="http://schemas.microsoft.com/office/drawing/2010/main" xmlns="" w="9525">
+                <a14:hiddenLine xmlns="" xmlns:a14="http://schemas.microsoft.com/office/drawing/2010/main" w="9525">
                   <a:solidFill>
                     <a:srgbClr val="000000"/>
                   </a:solidFill>
@@ -8176,7 +8176,7 @@
             </a:ln>
             <a:extLst>
               <a:ext uri="{91240B29-F687-4f45-9708-019B960494DF}">
-                <a14:hiddenLine xmlns:a14="http://schemas.microsoft.com/office/drawing/2010/main" xmlns="" w="9525">
+                <a14:hiddenLine xmlns="" xmlns:a14="http://schemas.microsoft.com/office/drawing/2010/main" w="9525">
                   <a:solidFill>
                     <a:srgbClr val="000000"/>
                   </a:solidFill>
@@ -8266,7 +8266,7 @@
             </a:ln>
             <a:extLst>
               <a:ext uri="{91240B29-F687-4f45-9708-019B960494DF}">
-                <a14:hiddenLine xmlns:a14="http://schemas.microsoft.com/office/drawing/2010/main" xmlns="" w="9525">
+                <a14:hiddenLine xmlns="" xmlns:a14="http://schemas.microsoft.com/office/drawing/2010/main" w="9525">
                   <a:solidFill>
                     <a:srgbClr val="000000"/>
                   </a:solidFill>
@@ -8356,7 +8356,7 @@
             </a:ln>
             <a:extLst>
               <a:ext uri="{91240B29-F687-4f45-9708-019B960494DF}">
-                <a14:hiddenLine xmlns:a14="http://schemas.microsoft.com/office/drawing/2010/main" xmlns="" w="9525">
+                <a14:hiddenLine xmlns="" xmlns:a14="http://schemas.microsoft.com/office/drawing/2010/main" w="9525">
                   <a:solidFill>
                     <a:srgbClr val="000000"/>
                   </a:solidFill>
@@ -8412,7 +8412,7 @@
             </a:ln>
             <a:extLst>
               <a:ext uri="{91240B29-F687-4f45-9708-019B960494DF}">
-                <a14:hiddenLine xmlns:a14="http://schemas.microsoft.com/office/drawing/2010/main" xmlns="" w="9525">
+                <a14:hiddenLine xmlns="" xmlns:a14="http://schemas.microsoft.com/office/drawing/2010/main" w="9525">
                   <a:solidFill>
                     <a:srgbClr val="000000"/>
                   </a:solidFill>
@@ -8502,7 +8502,7 @@
             </a:ln>
             <a:extLst>
               <a:ext uri="{91240B29-F687-4f45-9708-019B960494DF}">
-                <a14:hiddenLine xmlns:a14="http://schemas.microsoft.com/office/drawing/2010/main" xmlns="" w="9525">
+                <a14:hiddenLine xmlns="" xmlns:a14="http://schemas.microsoft.com/office/drawing/2010/main" w="9525">
                   <a:solidFill>
                     <a:srgbClr val="000000"/>
                   </a:solidFill>
@@ -8558,7 +8558,7 @@
             </a:ln>
             <a:extLst>
               <a:ext uri="{91240B29-F687-4f45-9708-019B960494DF}">
-                <a14:hiddenLine xmlns:a14="http://schemas.microsoft.com/office/drawing/2010/main" xmlns="" w="9525">
+                <a14:hiddenLine xmlns="" xmlns:a14="http://schemas.microsoft.com/office/drawing/2010/main" w="9525">
                   <a:solidFill>
                     <a:srgbClr val="000000"/>
                   </a:solidFill>
@@ -8648,7 +8648,7 @@
             </a:ln>
             <a:extLst>
               <a:ext uri="{91240B29-F687-4f45-9708-019B960494DF}">
-                <a14:hiddenLine xmlns:a14="http://schemas.microsoft.com/office/drawing/2010/main" xmlns="" w="9525">
+                <a14:hiddenLine xmlns="" xmlns:a14="http://schemas.microsoft.com/office/drawing/2010/main" w="9525">
                   <a:solidFill>
                     <a:srgbClr val="000000"/>
                   </a:solidFill>
@@ -8716,7 +8716,7 @@
             </a:ln>
             <a:extLst>
               <a:ext uri="{91240B29-F687-4f45-9708-019B960494DF}">
-                <a14:hiddenLine xmlns:a14="http://schemas.microsoft.com/office/drawing/2010/main" xmlns="" w="9525">
+                <a14:hiddenLine xmlns="" xmlns:a14="http://schemas.microsoft.com/office/drawing/2010/main" w="9525">
                   <a:solidFill>
                     <a:srgbClr val="000000"/>
                   </a:solidFill>
@@ -8806,7 +8806,7 @@
             </a:ln>
             <a:extLst>
               <a:ext uri="{91240B29-F687-4f45-9708-019B960494DF}">
-                <a14:hiddenLine xmlns:a14="http://schemas.microsoft.com/office/drawing/2010/main" xmlns="" w="9525">
+                <a14:hiddenLine xmlns="" xmlns:a14="http://schemas.microsoft.com/office/drawing/2010/main" w="9525">
                   <a:solidFill>
                     <a:srgbClr val="000000"/>
                   </a:solidFill>
@@ -8874,7 +8874,7 @@
             </a:ln>
             <a:extLst>
               <a:ext uri="{91240B29-F687-4f45-9708-019B960494DF}">
-                <a14:hiddenLine xmlns:a14="http://schemas.microsoft.com/office/drawing/2010/main" xmlns="" w="9525">
+                <a14:hiddenLine xmlns="" xmlns:a14="http://schemas.microsoft.com/office/drawing/2010/main" w="9525">
                   <a:solidFill>
                     <a:srgbClr val="000000"/>
                   </a:solidFill>
@@ -8964,7 +8964,7 @@
             </a:ln>
             <a:extLst>
               <a:ext uri="{91240B29-F687-4f45-9708-019B960494DF}">
-                <a14:hiddenLine xmlns:a14="http://schemas.microsoft.com/office/drawing/2010/main" xmlns="" w="9525">
+                <a14:hiddenLine xmlns="" xmlns:a14="http://schemas.microsoft.com/office/drawing/2010/main" w="9525">
                   <a:solidFill>
                     <a:srgbClr val="000000"/>
                   </a:solidFill>
@@ -8998,7 +8998,7 @@
             </a:ln>
             <a:extLst>
               <a:ext uri="{91240B29-F687-4f45-9708-019B960494DF}">
-                <a14:hiddenLine xmlns:a14="http://schemas.microsoft.com/office/drawing/2010/main" xmlns="" w="9525">
+                <a14:hiddenLine xmlns="" xmlns:a14="http://schemas.microsoft.com/office/drawing/2010/main" w="9525">
                   <a:solidFill>
                     <a:srgbClr val="000000"/>
                   </a:solidFill>
@@ -9088,7 +9088,7 @@
             </a:ln>
             <a:extLst>
               <a:ext uri="{91240B29-F687-4f45-9708-019B960494DF}">
-                <a14:hiddenLine xmlns:a14="http://schemas.microsoft.com/office/drawing/2010/main" xmlns="" w="9525">
+                <a14:hiddenLine xmlns="" xmlns:a14="http://schemas.microsoft.com/office/drawing/2010/main" w="9525">
                   <a:solidFill>
                     <a:srgbClr val="000000"/>
                   </a:solidFill>
@@ -9150,7 +9150,7 @@
             </a:ln>
             <a:extLst>
               <a:ext uri="{91240B29-F687-4f45-9708-019B960494DF}">
-                <a14:hiddenLine xmlns:a14="http://schemas.microsoft.com/office/drawing/2010/main" xmlns="" w="9525">
+                <a14:hiddenLine xmlns="" xmlns:a14="http://schemas.microsoft.com/office/drawing/2010/main" w="9525">
                   <a:solidFill>
                     <a:srgbClr val="000000"/>
                   </a:solidFill>
@@ -9212,7 +9212,7 @@
             </a:ln>
             <a:extLst>
               <a:ext uri="{91240B29-F687-4f45-9708-019B960494DF}">
-                <a14:hiddenLine xmlns:a14="http://schemas.microsoft.com/office/drawing/2010/main" xmlns="" w="9525">
+                <a14:hiddenLine xmlns="" xmlns:a14="http://schemas.microsoft.com/office/drawing/2010/main" w="9525">
                   <a:solidFill>
                     <a:srgbClr val="000000"/>
                   </a:solidFill>
@@ -9302,7 +9302,7 @@
             </a:ln>
             <a:extLst>
               <a:ext uri="{91240B29-F687-4f45-9708-019B960494DF}">
-                <a14:hiddenLine xmlns:a14="http://schemas.microsoft.com/office/drawing/2010/main" xmlns="" w="9525">
+                <a14:hiddenLine xmlns="" xmlns:a14="http://schemas.microsoft.com/office/drawing/2010/main" w="9525">
                   <a:solidFill>
                     <a:srgbClr val="000000"/>
                   </a:solidFill>
@@ -9370,7 +9370,7 @@
             </a:ln>
             <a:extLst>
               <a:ext uri="{91240B29-F687-4f45-9708-019B960494DF}">
-                <a14:hiddenLine xmlns:a14="http://schemas.microsoft.com/office/drawing/2010/main" xmlns="" w="9525">
+                <a14:hiddenLine xmlns="" xmlns:a14="http://schemas.microsoft.com/office/drawing/2010/main" w="9525">
                   <a:solidFill>
                     <a:srgbClr val="000000"/>
                   </a:solidFill>
@@ -9432,7 +9432,7 @@
             </a:ln>
             <a:extLst>
               <a:ext uri="{91240B29-F687-4f45-9708-019B960494DF}">
-                <a14:hiddenLine xmlns:a14="http://schemas.microsoft.com/office/drawing/2010/main" xmlns="" w="9525">
+                <a14:hiddenLine xmlns="" xmlns:a14="http://schemas.microsoft.com/office/drawing/2010/main" w="9525">
                   <a:solidFill>
                     <a:srgbClr val="000000"/>
                   </a:solidFill>
@@ -9522,7 +9522,7 @@
             </a:ln>
             <a:extLst>
               <a:ext uri="{91240B29-F687-4f45-9708-019B960494DF}">
-                <a14:hiddenLine xmlns:a14="http://schemas.microsoft.com/office/drawing/2010/main" xmlns="" w="9525">
+                <a14:hiddenLine xmlns="" xmlns:a14="http://schemas.microsoft.com/office/drawing/2010/main" w="9525">
                   <a:solidFill>
                     <a:srgbClr val="000000"/>
                   </a:solidFill>
@@ -9584,7 +9584,7 @@
             </a:ln>
             <a:extLst>
               <a:ext uri="{91240B29-F687-4f45-9708-019B960494DF}">
-                <a14:hiddenLine xmlns:a14="http://schemas.microsoft.com/office/drawing/2010/main" xmlns="" w="9525">
+                <a14:hiddenLine xmlns="" xmlns:a14="http://schemas.microsoft.com/office/drawing/2010/main" w="9525">
                   <a:solidFill>
                     <a:srgbClr val="000000"/>
                   </a:solidFill>
@@ -9674,7 +9674,7 @@
             </a:ln>
             <a:extLst>
               <a:ext uri="{91240B29-F687-4f45-9708-019B960494DF}">
-                <a14:hiddenLine xmlns:a14="http://schemas.microsoft.com/office/drawing/2010/main" xmlns="" w="9525">
+                <a14:hiddenLine xmlns="" xmlns:a14="http://schemas.microsoft.com/office/drawing/2010/main" w="9525">
                   <a:solidFill>
                     <a:srgbClr val="000000"/>
                   </a:solidFill>
@@ -9736,7 +9736,7 @@
             </a:ln>
             <a:extLst>
               <a:ext uri="{91240B29-F687-4f45-9708-019B960494DF}">
-                <a14:hiddenLine xmlns:a14="http://schemas.microsoft.com/office/drawing/2010/main" xmlns="" w="9525">
+                <a14:hiddenLine xmlns="" xmlns:a14="http://schemas.microsoft.com/office/drawing/2010/main" w="9525">
                   <a:solidFill>
                     <a:srgbClr val="000000"/>
                   </a:solidFill>
@@ -9826,7 +9826,7 @@
             </a:ln>
             <a:extLst>
               <a:ext uri="{91240B29-F687-4f45-9708-019B960494DF}">
-                <a14:hiddenLine xmlns:a14="http://schemas.microsoft.com/office/drawing/2010/main" xmlns="" w="9525">
+                <a14:hiddenLine xmlns="" xmlns:a14="http://schemas.microsoft.com/office/drawing/2010/main" w="9525">
                   <a:solidFill>
                     <a:srgbClr val="000000"/>
                   </a:solidFill>
@@ -9860,7 +9860,7 @@
             </a:ln>
             <a:extLst>
               <a:ext uri="{91240B29-F687-4f45-9708-019B960494DF}">
-                <a14:hiddenLine xmlns:a14="http://schemas.microsoft.com/office/drawing/2010/main" xmlns="" w="9525">
+                <a14:hiddenLine xmlns="" xmlns:a14="http://schemas.microsoft.com/office/drawing/2010/main" w="9525">
                   <a:solidFill>
                     <a:srgbClr val="000000"/>
                   </a:solidFill>
@@ -9925,7 +9925,7 @@
             </a:ln>
             <a:extLst>
               <a:ext uri="{91240B29-F687-4f45-9708-019B960494DF}">
-                <a14:hiddenLine xmlns:a14="http://schemas.microsoft.com/office/drawing/2010/main" xmlns="" w="9525">
+                <a14:hiddenLine xmlns="" xmlns:a14="http://schemas.microsoft.com/office/drawing/2010/main" w="9525">
                   <a:solidFill>
                     <a:srgbClr val="000000"/>
                   </a:solidFill>
@@ -10015,7 +10015,7 @@
             </a:ln>
             <a:extLst>
               <a:ext uri="{91240B29-F687-4f45-9708-019B960494DF}">
-                <a14:hiddenLine xmlns:a14="http://schemas.microsoft.com/office/drawing/2010/main" xmlns="" w="9525">
+                <a14:hiddenLine xmlns="" xmlns:a14="http://schemas.microsoft.com/office/drawing/2010/main" w="9525">
                   <a:solidFill>
                     <a:srgbClr val="000000"/>
                   </a:solidFill>
@@ -10077,7 +10077,7 @@
             </a:ln>
             <a:extLst>
               <a:ext uri="{91240B29-F687-4f45-9708-019B960494DF}">
-                <a14:hiddenLine xmlns:a14="http://schemas.microsoft.com/office/drawing/2010/main" xmlns="" w="9525">
+                <a14:hiddenLine xmlns="" xmlns:a14="http://schemas.microsoft.com/office/drawing/2010/main" w="9525">
                   <a:solidFill>
                     <a:srgbClr val="000000"/>
                   </a:solidFill>
@@ -10167,7 +10167,7 @@
             </a:ln>
             <a:extLst>
               <a:ext uri="{91240B29-F687-4f45-9708-019B960494DF}">
-                <a14:hiddenLine xmlns:a14="http://schemas.microsoft.com/office/drawing/2010/main" xmlns="" w="9525">
+                <a14:hiddenLine xmlns="" xmlns:a14="http://schemas.microsoft.com/office/drawing/2010/main" w="9525">
                   <a:solidFill>
                     <a:srgbClr val="000000"/>
                   </a:solidFill>
@@ -10257,7 +10257,7 @@
             </a:ln>
             <a:extLst>
               <a:ext uri="{91240B29-F687-4f45-9708-019B960494DF}">
-                <a14:hiddenLine xmlns:a14="http://schemas.microsoft.com/office/drawing/2010/main" xmlns="" w="9525">
+                <a14:hiddenLine xmlns="" xmlns:a14="http://schemas.microsoft.com/office/drawing/2010/main" w="9525">
                   <a:solidFill>
                     <a:srgbClr val="000000"/>
                   </a:solidFill>
@@ -10322,7 +10322,7 @@
             </a:ln>
             <a:extLst>
               <a:ext uri="{91240B29-F687-4f45-9708-019B960494DF}">
-                <a14:hiddenLine xmlns:a14="http://schemas.microsoft.com/office/drawing/2010/main" xmlns="" w="9525">
+                <a14:hiddenLine xmlns="" xmlns:a14="http://schemas.microsoft.com/office/drawing/2010/main" w="9525">
                   <a:solidFill>
                     <a:srgbClr val="000000"/>
                   </a:solidFill>
@@ -10384,7 +10384,7 @@
             </a:ln>
             <a:extLst>
               <a:ext uri="{91240B29-F687-4f45-9708-019B960494DF}">
-                <a14:hiddenLine xmlns:a14="http://schemas.microsoft.com/office/drawing/2010/main" xmlns="" w="9525">
+                <a14:hiddenLine xmlns="" xmlns:a14="http://schemas.microsoft.com/office/drawing/2010/main" w="9525">
                   <a:solidFill>
                     <a:srgbClr val="000000"/>
                   </a:solidFill>
@@ -10474,7 +10474,7 @@
             </a:ln>
             <a:extLst>
               <a:ext uri="{91240B29-F687-4f45-9708-019B960494DF}">
-                <a14:hiddenLine xmlns:a14="http://schemas.microsoft.com/office/drawing/2010/main" xmlns="" w="9525">
+                <a14:hiddenLine xmlns="" xmlns:a14="http://schemas.microsoft.com/office/drawing/2010/main" w="9525">
                   <a:solidFill>
                     <a:srgbClr val="000000"/>
                   </a:solidFill>
@@ -10564,7 +10564,7 @@
             </a:ln>
             <a:extLst>
               <a:ext uri="{91240B29-F687-4f45-9708-019B960494DF}">
-                <a14:hiddenLine xmlns:a14="http://schemas.microsoft.com/office/drawing/2010/main" xmlns="" w="9525">
+                <a14:hiddenLine xmlns="" xmlns:a14="http://schemas.microsoft.com/office/drawing/2010/main" w="9525">
                   <a:solidFill>
                     <a:srgbClr val="000000"/>
                   </a:solidFill>
@@ -10626,7 +10626,7 @@
             </a:ln>
             <a:extLst>
               <a:ext uri="{91240B29-F687-4f45-9708-019B960494DF}">
-                <a14:hiddenLine xmlns:a14="http://schemas.microsoft.com/office/drawing/2010/main" xmlns="" w="9525">
+                <a14:hiddenLine xmlns="" xmlns:a14="http://schemas.microsoft.com/office/drawing/2010/main" w="9525">
                   <a:solidFill>
                     <a:srgbClr val="000000"/>
                   </a:solidFill>
@@ -10746,7 +10746,7 @@
             </a:ln>
             <a:extLst>
               <a:ext uri="{91240B29-F687-4f45-9708-019B960494DF}">
-                <a14:hiddenLine xmlns:a14="http://schemas.microsoft.com/office/drawing/2010/main" xmlns="" w="9525">
+                <a14:hiddenLine xmlns="" xmlns:a14="http://schemas.microsoft.com/office/drawing/2010/main" w="9525">
                   <a:solidFill>
                     <a:srgbClr val="000000"/>
                   </a:solidFill>
@@ -10814,7 +10814,7 @@
             </a:ln>
             <a:extLst>
               <a:ext uri="{91240B29-F687-4f45-9708-019B960494DF}">
-                <a14:hiddenLine xmlns:a14="http://schemas.microsoft.com/office/drawing/2010/main" xmlns="" w="9525">
+                <a14:hiddenLine xmlns="" xmlns:a14="http://schemas.microsoft.com/office/drawing/2010/main" w="9525">
                   <a:solidFill>
                     <a:srgbClr val="000000"/>
                   </a:solidFill>
@@ -10904,7 +10904,7 @@
             </a:ln>
             <a:extLst>
               <a:ext uri="{91240B29-F687-4f45-9708-019B960494DF}">
-                <a14:hiddenLine xmlns:a14="http://schemas.microsoft.com/office/drawing/2010/main" xmlns="" w="9525">
+                <a14:hiddenLine xmlns="" xmlns:a14="http://schemas.microsoft.com/office/drawing/2010/main" w="9525">
                   <a:solidFill>
                     <a:srgbClr val="000000"/>
                   </a:solidFill>
@@ -15719,7 +15719,7 @@
           <a:noFill/>
           <a:extLst>
             <a:ext uri="{909E8E84-426E-40dd-AFC4-6F175D3DCCD1}">
-              <a14:hiddenFill xmlns:a14="http://schemas.microsoft.com/office/drawing/2010/main" xmlns="">
+              <a14:hiddenFill xmlns="" xmlns:a14="http://schemas.microsoft.com/office/drawing/2010/main">
                 <a:solidFill>
                   <a:srgbClr val="FFFFFF"/>
                 </a:solidFill>
@@ -15793,7 +15793,7 @@
               </a:ln>
               <a:extLst>
                 <a:ext uri="{91240B29-F687-4f45-9708-019B960494DF}">
-                  <a14:hiddenLine xmlns:a14="http://schemas.microsoft.com/office/drawing/2010/main" xmlns="" w="9525">
+                  <a14:hiddenLine xmlns="" xmlns:a14="http://schemas.microsoft.com/office/drawing/2010/main" w="9525">
                     <a:solidFill>
                       <a:srgbClr val="000000"/>
                     </a:solidFill>
@@ -15883,7 +15883,7 @@
               </a:ln>
               <a:extLst>
                 <a:ext uri="{91240B29-F687-4f45-9708-019B960494DF}">
-                  <a14:hiddenLine xmlns:a14="http://schemas.microsoft.com/office/drawing/2010/main" xmlns="" w="9525">
+                  <a14:hiddenLine xmlns="" xmlns:a14="http://schemas.microsoft.com/office/drawing/2010/main" w="9525">
                     <a:solidFill>
                       <a:srgbClr val="000000"/>
                     </a:solidFill>
@@ -15973,7 +15973,7 @@
               </a:ln>
               <a:extLst>
                 <a:ext uri="{91240B29-F687-4f45-9708-019B960494DF}">
-                  <a14:hiddenLine xmlns:a14="http://schemas.microsoft.com/office/drawing/2010/main" xmlns="" w="9525">
+                  <a14:hiddenLine xmlns="" xmlns:a14="http://schemas.microsoft.com/office/drawing/2010/main" w="9525">
                     <a:solidFill>
                       <a:srgbClr val="000000"/>
                     </a:solidFill>
@@ -16035,7 +16035,7 @@
               </a:ln>
               <a:extLst>
                 <a:ext uri="{91240B29-F687-4f45-9708-019B960494DF}">
-                  <a14:hiddenLine xmlns:a14="http://schemas.microsoft.com/office/drawing/2010/main" xmlns="" w="9525">
+                  <a14:hiddenLine xmlns="" xmlns:a14="http://schemas.microsoft.com/office/drawing/2010/main" w="9525">
                     <a:solidFill>
                       <a:srgbClr val="000000"/>
                     </a:solidFill>
@@ -16125,7 +16125,7 @@
               </a:ln>
               <a:extLst>
                 <a:ext uri="{91240B29-F687-4f45-9708-019B960494DF}">
-                  <a14:hiddenLine xmlns:a14="http://schemas.microsoft.com/office/drawing/2010/main" xmlns="" w="9525">
+                  <a14:hiddenLine xmlns="" xmlns:a14="http://schemas.microsoft.com/office/drawing/2010/main" w="9525">
                     <a:solidFill>
                       <a:srgbClr val="000000"/>
                     </a:solidFill>
@@ -16187,7 +16187,7 @@
               </a:ln>
               <a:extLst>
                 <a:ext uri="{91240B29-F687-4f45-9708-019B960494DF}">
-                  <a14:hiddenLine xmlns:a14="http://schemas.microsoft.com/office/drawing/2010/main" xmlns="" w="9525">
+                  <a14:hiddenLine xmlns="" xmlns:a14="http://schemas.microsoft.com/office/drawing/2010/main" w="9525">
                     <a:solidFill>
                       <a:srgbClr val="000000"/>
                     </a:solidFill>
@@ -16249,7 +16249,7 @@
               </a:ln>
               <a:extLst>
                 <a:ext uri="{91240B29-F687-4f45-9708-019B960494DF}">
-                  <a14:hiddenLine xmlns:a14="http://schemas.microsoft.com/office/drawing/2010/main" xmlns="" w="9525">
+                  <a14:hiddenLine xmlns="" xmlns:a14="http://schemas.microsoft.com/office/drawing/2010/main" w="9525">
                     <a:solidFill>
                       <a:srgbClr val="000000"/>
                     </a:solidFill>
@@ -16339,7 +16339,7 @@
               </a:ln>
               <a:extLst>
                 <a:ext uri="{91240B29-F687-4f45-9708-019B960494DF}">
-                  <a14:hiddenLine xmlns:a14="http://schemas.microsoft.com/office/drawing/2010/main" xmlns="" w="9525">
+                  <a14:hiddenLine xmlns="" xmlns:a14="http://schemas.microsoft.com/office/drawing/2010/main" w="9525">
                     <a:solidFill>
                       <a:srgbClr val="000000"/>
                     </a:solidFill>
@@ -16429,7 +16429,7 @@
               </a:ln>
               <a:extLst>
                 <a:ext uri="{91240B29-F687-4f45-9708-019B960494DF}">
-                  <a14:hiddenLine xmlns:a14="http://schemas.microsoft.com/office/drawing/2010/main" xmlns="" w="9525">
+                  <a14:hiddenLine xmlns="" xmlns:a14="http://schemas.microsoft.com/office/drawing/2010/main" w="9525">
                     <a:solidFill>
                       <a:srgbClr val="000000"/>
                     </a:solidFill>
@@ -16491,7 +16491,7 @@
               </a:ln>
               <a:extLst>
                 <a:ext uri="{91240B29-F687-4f45-9708-019B960494DF}">
-                  <a14:hiddenLine xmlns:a14="http://schemas.microsoft.com/office/drawing/2010/main" xmlns="" w="9525">
+                  <a14:hiddenLine xmlns="" xmlns:a14="http://schemas.microsoft.com/office/drawing/2010/main" w="9525">
                     <a:solidFill>
                       <a:srgbClr val="000000"/>
                     </a:solidFill>
@@ -16601,7 +16601,7 @@
               </a:ln>
               <a:extLst>
                 <a:ext uri="{91240B29-F687-4f45-9708-019B960494DF}">
-                  <a14:hiddenLine xmlns:a14="http://schemas.microsoft.com/office/drawing/2010/main" xmlns="" w="9525">
+                  <a14:hiddenLine xmlns="" xmlns:a14="http://schemas.microsoft.com/office/drawing/2010/main" w="9525">
                     <a:solidFill>
                       <a:srgbClr val="000000"/>
                     </a:solidFill>
@@ -16685,7 +16685,7 @@
               </a:ln>
               <a:extLst>
                 <a:ext uri="{91240B29-F687-4f45-9708-019B960494DF}">
-                  <a14:hiddenLine xmlns:a14="http://schemas.microsoft.com/office/drawing/2010/main" xmlns="" w="9525">
+                  <a14:hiddenLine xmlns="" xmlns:a14="http://schemas.microsoft.com/office/drawing/2010/main" w="9525">
                     <a:solidFill>
                       <a:srgbClr val="000000"/>
                     </a:solidFill>
@@ -16747,7 +16747,7 @@
               </a:ln>
               <a:extLst>
                 <a:ext uri="{91240B29-F687-4f45-9708-019B960494DF}">
-                  <a14:hiddenLine xmlns:a14="http://schemas.microsoft.com/office/drawing/2010/main" xmlns="" w="9525">
+                  <a14:hiddenLine xmlns="" xmlns:a14="http://schemas.microsoft.com/office/drawing/2010/main" w="9525">
                     <a:solidFill>
                       <a:srgbClr val="000000"/>
                     </a:solidFill>
@@ -16809,7 +16809,7 @@
               </a:ln>
               <a:extLst>
                 <a:ext uri="{91240B29-F687-4f45-9708-019B960494DF}">
-                  <a14:hiddenLine xmlns:a14="http://schemas.microsoft.com/office/drawing/2010/main" xmlns="" w="9525">
+                  <a14:hiddenLine xmlns="" xmlns:a14="http://schemas.microsoft.com/office/drawing/2010/main" w="9525">
                     <a:solidFill>
                       <a:srgbClr val="000000"/>
                     </a:solidFill>
@@ -16899,7 +16899,7 @@
               </a:ln>
               <a:extLst>
                 <a:ext uri="{91240B29-F687-4f45-9708-019B960494DF}">
-                  <a14:hiddenLine xmlns:a14="http://schemas.microsoft.com/office/drawing/2010/main" xmlns="" w="9525">
+                  <a14:hiddenLine xmlns="" xmlns:a14="http://schemas.microsoft.com/office/drawing/2010/main" w="9525">
                     <a:solidFill>
                       <a:srgbClr val="000000"/>
                     </a:solidFill>
@@ -16933,7 +16933,7 @@
               </a:ln>
               <a:extLst>
                 <a:ext uri="{91240B29-F687-4f45-9708-019B960494DF}">
-                  <a14:hiddenLine xmlns:a14="http://schemas.microsoft.com/office/drawing/2010/main" xmlns="" w="9525">
+                  <a14:hiddenLine xmlns="" xmlns:a14="http://schemas.microsoft.com/office/drawing/2010/main" w="9525">
                     <a:solidFill>
                       <a:srgbClr val="000000"/>
                     </a:solidFill>
@@ -16998,7 +16998,7 @@
               </a:ln>
               <a:extLst>
                 <a:ext uri="{91240B29-F687-4f45-9708-019B960494DF}">
-                  <a14:hiddenLine xmlns:a14="http://schemas.microsoft.com/office/drawing/2010/main" xmlns="" w="9525">
+                  <a14:hiddenLine xmlns="" xmlns:a14="http://schemas.microsoft.com/office/drawing/2010/main" w="9525">
                     <a:solidFill>
                       <a:srgbClr val="000000"/>
                     </a:solidFill>
@@ -17088,7 +17088,7 @@
               </a:ln>
               <a:extLst>
                 <a:ext uri="{91240B29-F687-4f45-9708-019B960494DF}">
-                  <a14:hiddenLine xmlns:a14="http://schemas.microsoft.com/office/drawing/2010/main" xmlns="" w="9525">
+                  <a14:hiddenLine xmlns="" xmlns:a14="http://schemas.microsoft.com/office/drawing/2010/main" w="9525">
                     <a:solidFill>
                       <a:srgbClr val="000000"/>
                     </a:solidFill>
@@ -17150,7 +17150,7 @@
               </a:ln>
               <a:extLst>
                 <a:ext uri="{91240B29-F687-4f45-9708-019B960494DF}">
-                  <a14:hiddenLine xmlns:a14="http://schemas.microsoft.com/office/drawing/2010/main" xmlns="" w="9525">
+                  <a14:hiddenLine xmlns="" xmlns:a14="http://schemas.microsoft.com/office/drawing/2010/main" w="9525">
                     <a:solidFill>
                       <a:srgbClr val="000000"/>
                     </a:solidFill>
@@ -17240,7 +17240,7 @@
               </a:ln>
               <a:extLst>
                 <a:ext uri="{91240B29-F687-4f45-9708-019B960494DF}">
-                  <a14:hiddenLine xmlns:a14="http://schemas.microsoft.com/office/drawing/2010/main" xmlns="" w="9525">
+                  <a14:hiddenLine xmlns="" xmlns:a14="http://schemas.microsoft.com/office/drawing/2010/main" w="9525">
                     <a:solidFill>
                       <a:srgbClr val="000000"/>
                     </a:solidFill>
@@ -17305,7 +17305,7 @@
               </a:ln>
               <a:extLst>
                 <a:ext uri="{91240B29-F687-4f45-9708-019B960494DF}">
-                  <a14:hiddenLine xmlns:a14="http://schemas.microsoft.com/office/drawing/2010/main" xmlns="" w="9525">
+                  <a14:hiddenLine xmlns="" xmlns:a14="http://schemas.microsoft.com/office/drawing/2010/main" w="9525">
                     <a:solidFill>
                       <a:srgbClr val="000000"/>
                     </a:solidFill>
@@ -17367,7 +17367,7 @@
               </a:ln>
               <a:extLst>
                 <a:ext uri="{91240B29-F687-4f45-9708-019B960494DF}">
-                  <a14:hiddenLine xmlns:a14="http://schemas.microsoft.com/office/drawing/2010/main" xmlns="" w="9525">
+                  <a14:hiddenLine xmlns="" xmlns:a14="http://schemas.microsoft.com/office/drawing/2010/main" w="9525">
                     <a:solidFill>
                       <a:srgbClr val="000000"/>
                     </a:solidFill>
@@ -17457,7 +17457,7 @@
               </a:ln>
               <a:extLst>
                 <a:ext uri="{91240B29-F687-4f45-9708-019B960494DF}">
-                  <a14:hiddenLine xmlns:a14="http://schemas.microsoft.com/office/drawing/2010/main" xmlns="" w="9525">
+                  <a14:hiddenLine xmlns="" xmlns:a14="http://schemas.microsoft.com/office/drawing/2010/main" w="9525">
                     <a:solidFill>
                       <a:srgbClr val="000000"/>
                     </a:solidFill>
@@ -17547,7 +17547,7 @@
               </a:ln>
               <a:extLst>
                 <a:ext uri="{91240B29-F687-4f45-9708-019B960494DF}">
-                  <a14:hiddenLine xmlns:a14="http://schemas.microsoft.com/office/drawing/2010/main" xmlns="" w="9525">
+                  <a14:hiddenLine xmlns="" xmlns:a14="http://schemas.microsoft.com/office/drawing/2010/main" w="9525">
                     <a:solidFill>
                       <a:srgbClr val="000000"/>
                     </a:solidFill>
@@ -17612,7 +17612,7 @@
               </a:ln>
               <a:extLst>
                 <a:ext uri="{91240B29-F687-4f45-9708-019B960494DF}">
-                  <a14:hiddenLine xmlns:a14="http://schemas.microsoft.com/office/drawing/2010/main" xmlns="" w="9525">
+                  <a14:hiddenLine xmlns="" xmlns:a14="http://schemas.microsoft.com/office/drawing/2010/main" w="9525">
                     <a:solidFill>
                       <a:srgbClr val="000000"/>
                     </a:solidFill>
@@ -17732,7 +17732,7 @@
               </a:ln>
               <a:extLst>
                 <a:ext uri="{91240B29-F687-4f45-9708-019B960494DF}">
-                  <a14:hiddenLine xmlns:a14="http://schemas.microsoft.com/office/drawing/2010/main" xmlns="" w="9525">
+                  <a14:hiddenLine xmlns="" xmlns:a14="http://schemas.microsoft.com/office/drawing/2010/main" w="9525">
                     <a:solidFill>
                       <a:srgbClr val="000000"/>
                     </a:solidFill>
@@ -17813,7 +17813,7 @@
               </a:ln>
               <a:extLst>
                 <a:ext uri="{91240B29-F687-4f45-9708-019B960494DF}">
-                  <a14:hiddenLine xmlns:a14="http://schemas.microsoft.com/office/drawing/2010/main" xmlns="" w="9525">
+                  <a14:hiddenLine xmlns="" xmlns:a14="http://schemas.microsoft.com/office/drawing/2010/main" w="9525">
                     <a:solidFill>
                       <a:srgbClr val="000000"/>
                     </a:solidFill>
@@ -17928,7 +17928,7 @@
               </a:ln>
               <a:extLst>
                 <a:ext uri="{91240B29-F687-4f45-9708-019B960494DF}">
-                  <a14:hiddenLine xmlns:a14="http://schemas.microsoft.com/office/drawing/2010/main" xmlns="" w="9525">
+                  <a14:hiddenLine xmlns="" xmlns:a14="http://schemas.microsoft.com/office/drawing/2010/main" w="9525">
                     <a:solidFill>
                       <a:srgbClr val="000000"/>
                     </a:solidFill>
@@ -18018,7 +18018,7 @@
               </a:ln>
               <a:extLst>
                 <a:ext uri="{91240B29-F687-4f45-9708-019B960494DF}">
-                  <a14:hiddenLine xmlns:a14="http://schemas.microsoft.com/office/drawing/2010/main" xmlns="" w="9525">
+                  <a14:hiddenLine xmlns="" xmlns:a14="http://schemas.microsoft.com/office/drawing/2010/main" w="9525">
                     <a:solidFill>
                       <a:srgbClr val="000000"/>
                     </a:solidFill>
@@ -18083,7 +18083,7 @@
               </a:ln>
               <a:extLst>
                 <a:ext uri="{91240B29-F687-4f45-9708-019B960494DF}">
-                  <a14:hiddenLine xmlns:a14="http://schemas.microsoft.com/office/drawing/2010/main" xmlns="" w="9525">
+                  <a14:hiddenLine xmlns="" xmlns:a14="http://schemas.microsoft.com/office/drawing/2010/main" w="9525">
                     <a:solidFill>
                       <a:srgbClr val="000000"/>
                     </a:solidFill>
@@ -18173,7 +18173,7 @@
               </a:ln>
               <a:extLst>
                 <a:ext uri="{91240B29-F687-4f45-9708-019B960494DF}">
-                  <a14:hiddenLine xmlns:a14="http://schemas.microsoft.com/office/drawing/2010/main" xmlns="" w="9525">
+                  <a14:hiddenLine xmlns="" xmlns:a14="http://schemas.microsoft.com/office/drawing/2010/main" w="9525">
                     <a:solidFill>
                       <a:srgbClr val="000000"/>
                     </a:solidFill>
@@ -18241,7 +18241,7 @@
               </a:ln>
               <a:extLst>
                 <a:ext uri="{91240B29-F687-4f45-9708-019B960494DF}">
-                  <a14:hiddenLine xmlns:a14="http://schemas.microsoft.com/office/drawing/2010/main" xmlns="" w="9525">
+                  <a14:hiddenLine xmlns="" xmlns:a14="http://schemas.microsoft.com/office/drawing/2010/main" w="9525">
                     <a:solidFill>
                       <a:srgbClr val="000000"/>
                     </a:solidFill>
@@ -18331,7 +18331,7 @@
               </a:ln>
               <a:extLst>
                 <a:ext uri="{91240B29-F687-4f45-9708-019B960494DF}">
-                  <a14:hiddenLine xmlns:a14="http://schemas.microsoft.com/office/drawing/2010/main" xmlns="" w="9525">
+                  <a14:hiddenLine xmlns="" xmlns:a14="http://schemas.microsoft.com/office/drawing/2010/main" w="9525">
                     <a:solidFill>
                       <a:srgbClr val="000000"/>
                     </a:solidFill>
@@ -18399,7 +18399,7 @@
               </a:ln>
               <a:extLst>
                 <a:ext uri="{91240B29-F687-4f45-9708-019B960494DF}">
-                  <a14:hiddenLine xmlns:a14="http://schemas.microsoft.com/office/drawing/2010/main" xmlns="" w="9525">
+                  <a14:hiddenLine xmlns="" xmlns:a14="http://schemas.microsoft.com/office/drawing/2010/main" w="9525">
                     <a:solidFill>
                       <a:srgbClr val="000000"/>
                     </a:solidFill>
@@ -18489,7 +18489,7 @@
               </a:ln>
               <a:extLst>
                 <a:ext uri="{91240B29-F687-4f45-9708-019B960494DF}">
-                  <a14:hiddenLine xmlns:a14="http://schemas.microsoft.com/office/drawing/2010/main" xmlns="" w="9525">
+                  <a14:hiddenLine xmlns="" xmlns:a14="http://schemas.microsoft.com/office/drawing/2010/main" w="9525">
                     <a:solidFill>
                       <a:srgbClr val="000000"/>
                     </a:solidFill>
@@ -18523,7 +18523,7 @@
               </a:ln>
               <a:extLst>
                 <a:ext uri="{91240B29-F687-4f45-9708-019B960494DF}">
-                  <a14:hiddenLine xmlns:a14="http://schemas.microsoft.com/office/drawing/2010/main" xmlns="" w="9525">
+                  <a14:hiddenLine xmlns="" xmlns:a14="http://schemas.microsoft.com/office/drawing/2010/main" w="9525">
                     <a:solidFill>
                       <a:srgbClr val="000000"/>
                     </a:solidFill>
@@ -19139,7 +19139,7 @@
           <a:noFill/>
           <a:extLst>
             <a:ext uri="{909E8E84-426E-40dd-AFC4-6F175D3DCCD1}">
-              <a14:hiddenFill xmlns:a14="http://schemas.microsoft.com/office/drawing/2010/main" xmlns:a16="http://schemas.microsoft.com/office/drawing/2014/main" xmlns="">
+              <a14:hiddenFill xmlns="" xmlns:a16="http://schemas.microsoft.com/office/drawing/2014/main" xmlns:a14="http://schemas.microsoft.com/office/drawing/2010/main">
                 <a:solidFill>
                   <a:srgbClr val="FFFFFF"/>
                 </a:solidFill>
@@ -19260,7 +19260,7 @@
               </a:ln>
               <a:extLst>
                 <a:ext uri="{91240B29-F687-4f45-9708-019B960494DF}">
-                  <a14:hiddenLine xmlns:a14="http://schemas.microsoft.com/office/drawing/2010/main" xmlns:a16="http://schemas.microsoft.com/office/drawing/2014/main" xmlns="" w="9525">
+                  <a14:hiddenLine xmlns="" xmlns:a16="http://schemas.microsoft.com/office/drawing/2014/main" xmlns:a14="http://schemas.microsoft.com/office/drawing/2010/main" w="9525">
                     <a:solidFill>
                       <a:srgbClr val="000000"/>
                     </a:solidFill>
@@ -19372,7 +19372,7 @@
               </a:ln>
               <a:extLst>
                 <a:ext uri="{91240B29-F687-4f45-9708-019B960494DF}">
-                  <a14:hiddenLine xmlns:a14="http://schemas.microsoft.com/office/drawing/2010/main" xmlns:a16="http://schemas.microsoft.com/office/drawing/2014/main" xmlns="" w="9525">
+                  <a14:hiddenLine xmlns="" xmlns:a16="http://schemas.microsoft.com/office/drawing/2014/main" xmlns:a14="http://schemas.microsoft.com/office/drawing/2010/main" w="9525">
                     <a:solidFill>
                       <a:srgbClr val="000000"/>
                     </a:solidFill>
@@ -19484,7 +19484,7 @@
               </a:ln>
               <a:extLst>
                 <a:ext uri="{91240B29-F687-4f45-9708-019B960494DF}">
-                  <a14:hiddenLine xmlns:a14="http://schemas.microsoft.com/office/drawing/2010/main" xmlns:a16="http://schemas.microsoft.com/office/drawing/2014/main" xmlns="" w="9525">
+                  <a14:hiddenLine xmlns="" xmlns:a16="http://schemas.microsoft.com/office/drawing/2014/main" xmlns:a14="http://schemas.microsoft.com/office/drawing/2010/main" w="9525">
                     <a:solidFill>
                       <a:srgbClr val="000000"/>
                     </a:solidFill>
@@ -19568,7 +19568,7 @@
               </a:ln>
               <a:extLst>
                 <a:ext uri="{91240B29-F687-4f45-9708-019B960494DF}">
-                  <a14:hiddenLine xmlns:a14="http://schemas.microsoft.com/office/drawing/2010/main" xmlns:a16="http://schemas.microsoft.com/office/drawing/2014/main" xmlns="" w="9525">
+                  <a14:hiddenLine xmlns="" xmlns:a16="http://schemas.microsoft.com/office/drawing/2014/main" xmlns:a14="http://schemas.microsoft.com/office/drawing/2010/main" w="9525">
                     <a:solidFill>
                       <a:srgbClr val="000000"/>
                     </a:solidFill>
@@ -19680,7 +19680,7 @@
               </a:ln>
               <a:extLst>
                 <a:ext uri="{91240B29-F687-4f45-9708-019B960494DF}">
-                  <a14:hiddenLine xmlns:a14="http://schemas.microsoft.com/office/drawing/2010/main" xmlns:a16="http://schemas.microsoft.com/office/drawing/2014/main" xmlns="" w="9525">
+                  <a14:hiddenLine xmlns="" xmlns:a16="http://schemas.microsoft.com/office/drawing/2014/main" xmlns:a14="http://schemas.microsoft.com/office/drawing/2010/main" w="9525">
                     <a:solidFill>
                       <a:srgbClr val="000000"/>
                     </a:solidFill>
@@ -19764,7 +19764,7 @@
               </a:ln>
               <a:extLst>
                 <a:ext uri="{91240B29-F687-4f45-9708-019B960494DF}">
-                  <a14:hiddenLine xmlns:a14="http://schemas.microsoft.com/office/drawing/2010/main" xmlns:a16="http://schemas.microsoft.com/office/drawing/2014/main" xmlns="" w="9525">
+                  <a14:hiddenLine xmlns="" xmlns:a16="http://schemas.microsoft.com/office/drawing/2014/main" xmlns:a14="http://schemas.microsoft.com/office/drawing/2010/main" w="9525">
                     <a:solidFill>
                       <a:srgbClr val="000000"/>
                     </a:solidFill>
@@ -19848,7 +19848,7 @@
               </a:ln>
               <a:extLst>
                 <a:ext uri="{91240B29-F687-4f45-9708-019B960494DF}">
-                  <a14:hiddenLine xmlns:a14="http://schemas.microsoft.com/office/drawing/2010/main" xmlns:a16="http://schemas.microsoft.com/office/drawing/2014/main" xmlns="" w="9525">
+                  <a14:hiddenLine xmlns="" xmlns:a16="http://schemas.microsoft.com/office/drawing/2014/main" xmlns:a14="http://schemas.microsoft.com/office/drawing/2010/main" w="9525">
                     <a:solidFill>
                       <a:srgbClr val="000000"/>
                     </a:solidFill>
@@ -19960,7 +19960,7 @@
               </a:ln>
               <a:extLst>
                 <a:ext uri="{91240B29-F687-4f45-9708-019B960494DF}">
-                  <a14:hiddenLine xmlns:a14="http://schemas.microsoft.com/office/drawing/2010/main" xmlns:a16="http://schemas.microsoft.com/office/drawing/2014/main" xmlns="" w="9525">
+                  <a14:hiddenLine xmlns="" xmlns:a16="http://schemas.microsoft.com/office/drawing/2014/main" xmlns:a14="http://schemas.microsoft.com/office/drawing/2010/main" w="9525">
                     <a:solidFill>
                       <a:srgbClr val="000000"/>
                     </a:solidFill>
@@ -20072,7 +20072,7 @@
               </a:ln>
               <a:extLst>
                 <a:ext uri="{91240B29-F687-4f45-9708-019B960494DF}">
-                  <a14:hiddenLine xmlns:a14="http://schemas.microsoft.com/office/drawing/2010/main" xmlns:a16="http://schemas.microsoft.com/office/drawing/2014/main" xmlns="" w="9525">
+                  <a14:hiddenLine xmlns="" xmlns:a16="http://schemas.microsoft.com/office/drawing/2014/main" xmlns:a14="http://schemas.microsoft.com/office/drawing/2010/main" w="9525">
                     <a:solidFill>
                       <a:srgbClr val="000000"/>
                     </a:solidFill>
@@ -20156,7 +20156,7 @@
               </a:ln>
               <a:extLst>
                 <a:ext uri="{91240B29-F687-4f45-9708-019B960494DF}">
-                  <a14:hiddenLine xmlns:a14="http://schemas.microsoft.com/office/drawing/2010/main" xmlns:a16="http://schemas.microsoft.com/office/drawing/2014/main" xmlns="" w="9525">
+                  <a14:hiddenLine xmlns="" xmlns:a16="http://schemas.microsoft.com/office/drawing/2014/main" xmlns:a14="http://schemas.microsoft.com/office/drawing/2010/main" w="9525">
                     <a:solidFill>
                       <a:srgbClr val="000000"/>
                     </a:solidFill>
@@ -20288,7 +20288,7 @@
               </a:ln>
               <a:extLst>
                 <a:ext uri="{91240B29-F687-4f45-9708-019B960494DF}">
-                  <a14:hiddenLine xmlns:a14="http://schemas.microsoft.com/office/drawing/2010/main" xmlns:a16="http://schemas.microsoft.com/office/drawing/2014/main" xmlns="" w="9525">
+                  <a14:hiddenLine xmlns="" xmlns:a16="http://schemas.microsoft.com/office/drawing/2014/main" xmlns:a14="http://schemas.microsoft.com/office/drawing/2010/main" w="9525">
                     <a:solidFill>
                       <a:srgbClr val="000000"/>
                     </a:solidFill>
@@ -20416,7 +20416,7 @@
               </a:ln>
               <a:extLst>
                 <a:ext uri="{91240B29-F687-4f45-9708-019B960494DF}">
-                  <a14:hiddenLine xmlns:a14="http://schemas.microsoft.com/office/drawing/2010/main" xmlns:a16="http://schemas.microsoft.com/office/drawing/2014/main" xmlns="" w="9525">
+                  <a14:hiddenLine xmlns="" xmlns:a16="http://schemas.microsoft.com/office/drawing/2014/main" xmlns:a14="http://schemas.microsoft.com/office/drawing/2010/main" w="9525">
                     <a:solidFill>
                       <a:srgbClr val="000000"/>
                     </a:solidFill>
@@ -20500,7 +20500,7 @@
               </a:ln>
               <a:extLst>
                 <a:ext uri="{91240B29-F687-4f45-9708-019B960494DF}">
-                  <a14:hiddenLine xmlns:a14="http://schemas.microsoft.com/office/drawing/2010/main" xmlns:a16="http://schemas.microsoft.com/office/drawing/2014/main" xmlns="" w="9525">
+                  <a14:hiddenLine xmlns="" xmlns:a16="http://schemas.microsoft.com/office/drawing/2014/main" xmlns:a14="http://schemas.microsoft.com/office/drawing/2010/main" w="9525">
                     <a:solidFill>
                       <a:srgbClr val="000000"/>
                     </a:solidFill>
@@ -20584,7 +20584,7 @@
               </a:ln>
               <a:extLst>
                 <a:ext uri="{91240B29-F687-4f45-9708-019B960494DF}">
-                  <a14:hiddenLine xmlns:a14="http://schemas.microsoft.com/office/drawing/2010/main" xmlns:a16="http://schemas.microsoft.com/office/drawing/2014/main" xmlns="" w="9525">
+                  <a14:hiddenLine xmlns="" xmlns:a16="http://schemas.microsoft.com/office/drawing/2014/main" xmlns:a14="http://schemas.microsoft.com/office/drawing/2010/main" w="9525">
                     <a:solidFill>
                       <a:srgbClr val="000000"/>
                     </a:solidFill>
@@ -20696,7 +20696,7 @@
               </a:ln>
               <a:extLst>
                 <a:ext uri="{91240B29-F687-4f45-9708-019B960494DF}">
-                  <a14:hiddenLine xmlns:a14="http://schemas.microsoft.com/office/drawing/2010/main" xmlns:a16="http://schemas.microsoft.com/office/drawing/2014/main" xmlns="" w="9525">
+                  <a14:hiddenLine xmlns="" xmlns:a16="http://schemas.microsoft.com/office/drawing/2014/main" xmlns:a14="http://schemas.microsoft.com/office/drawing/2010/main" w="9525">
                     <a:solidFill>
                       <a:srgbClr val="000000"/>
                     </a:solidFill>
@@ -20752,7 +20752,7 @@
               </a:ln>
               <a:extLst>
                 <a:ext uri="{91240B29-F687-4f45-9708-019B960494DF}">
-                  <a14:hiddenLine xmlns:a14="http://schemas.microsoft.com/office/drawing/2010/main" xmlns:a16="http://schemas.microsoft.com/office/drawing/2014/main" xmlns="" w="9525">
+                  <a14:hiddenLine xmlns="" xmlns:a16="http://schemas.microsoft.com/office/drawing/2014/main" xmlns:a14="http://schemas.microsoft.com/office/drawing/2010/main" w="9525">
                     <a:solidFill>
                       <a:srgbClr val="000000"/>
                     </a:solidFill>
@@ -20839,7 +20839,7 @@
               </a:ln>
               <a:extLst>
                 <a:ext uri="{91240B29-F687-4f45-9708-019B960494DF}">
-                  <a14:hiddenLine xmlns:a14="http://schemas.microsoft.com/office/drawing/2010/main" xmlns:a16="http://schemas.microsoft.com/office/drawing/2014/main" xmlns="" w="9525">
+                  <a14:hiddenLine xmlns="" xmlns:a16="http://schemas.microsoft.com/office/drawing/2014/main" xmlns:a14="http://schemas.microsoft.com/office/drawing/2010/main" w="9525">
                     <a:solidFill>
                       <a:srgbClr val="000000"/>
                     </a:solidFill>
@@ -20951,7 +20951,7 @@
               </a:ln>
               <a:extLst>
                 <a:ext uri="{91240B29-F687-4f45-9708-019B960494DF}">
-                  <a14:hiddenLine xmlns:a14="http://schemas.microsoft.com/office/drawing/2010/main" xmlns:a16="http://schemas.microsoft.com/office/drawing/2014/main" xmlns="" w="9525">
+                  <a14:hiddenLine xmlns="" xmlns:a16="http://schemas.microsoft.com/office/drawing/2014/main" xmlns:a14="http://schemas.microsoft.com/office/drawing/2010/main" w="9525">
                     <a:solidFill>
                       <a:srgbClr val="000000"/>
                     </a:solidFill>
@@ -21035,7 +21035,7 @@
               </a:ln>
               <a:extLst>
                 <a:ext uri="{91240B29-F687-4f45-9708-019B960494DF}">
-                  <a14:hiddenLine xmlns:a14="http://schemas.microsoft.com/office/drawing/2010/main" xmlns:a16="http://schemas.microsoft.com/office/drawing/2014/main" xmlns="" w="9525">
+                  <a14:hiddenLine xmlns="" xmlns:a16="http://schemas.microsoft.com/office/drawing/2014/main" xmlns:a14="http://schemas.microsoft.com/office/drawing/2010/main" w="9525">
                     <a:solidFill>
                       <a:srgbClr val="000000"/>
                     </a:solidFill>
@@ -21147,7 +21147,7 @@
               </a:ln>
               <a:extLst>
                 <a:ext uri="{91240B29-F687-4f45-9708-019B960494DF}">
-                  <a14:hiddenLine xmlns:a14="http://schemas.microsoft.com/office/drawing/2010/main" xmlns:a16="http://schemas.microsoft.com/office/drawing/2014/main" xmlns="" w="9525">
+                  <a14:hiddenLine xmlns="" xmlns:a16="http://schemas.microsoft.com/office/drawing/2014/main" xmlns:a14="http://schemas.microsoft.com/office/drawing/2010/main" w="9525">
                     <a:solidFill>
                       <a:srgbClr val="000000"/>
                     </a:solidFill>
@@ -21234,7 +21234,7 @@
               </a:ln>
               <a:extLst>
                 <a:ext uri="{91240B29-F687-4f45-9708-019B960494DF}">
-                  <a14:hiddenLine xmlns:a14="http://schemas.microsoft.com/office/drawing/2010/main" xmlns:a16="http://schemas.microsoft.com/office/drawing/2014/main" xmlns="" w="9525">
+                  <a14:hiddenLine xmlns="" xmlns:a16="http://schemas.microsoft.com/office/drawing/2014/main" xmlns:a14="http://schemas.microsoft.com/office/drawing/2010/main" w="9525">
                     <a:solidFill>
                       <a:srgbClr val="000000"/>
                     </a:solidFill>
@@ -21318,7 +21318,7 @@
               </a:ln>
               <a:extLst>
                 <a:ext uri="{91240B29-F687-4f45-9708-019B960494DF}">
-                  <a14:hiddenLine xmlns:a14="http://schemas.microsoft.com/office/drawing/2010/main" xmlns:a16="http://schemas.microsoft.com/office/drawing/2014/main" xmlns="" w="9525">
+                  <a14:hiddenLine xmlns="" xmlns:a16="http://schemas.microsoft.com/office/drawing/2014/main" xmlns:a14="http://schemas.microsoft.com/office/drawing/2010/main" w="9525">
                     <a:solidFill>
                       <a:srgbClr val="000000"/>
                     </a:solidFill>
@@ -21430,7 +21430,7 @@
               </a:ln>
               <a:extLst>
                 <a:ext uri="{91240B29-F687-4f45-9708-019B960494DF}">
-                  <a14:hiddenLine xmlns:a14="http://schemas.microsoft.com/office/drawing/2010/main" xmlns:a16="http://schemas.microsoft.com/office/drawing/2014/main" xmlns="" w="9525">
+                  <a14:hiddenLine xmlns="" xmlns:a16="http://schemas.microsoft.com/office/drawing/2014/main" xmlns:a14="http://schemas.microsoft.com/office/drawing/2010/main" w="9525">
                     <a:solidFill>
                       <a:srgbClr val="000000"/>
                     </a:solidFill>
@@ -21542,7 +21542,7 @@
               </a:ln>
               <a:extLst>
                 <a:ext uri="{91240B29-F687-4f45-9708-019B960494DF}">
-                  <a14:hiddenLine xmlns:a14="http://schemas.microsoft.com/office/drawing/2010/main" xmlns:a16="http://schemas.microsoft.com/office/drawing/2014/main" xmlns="" w="9525">
+                  <a14:hiddenLine xmlns="" xmlns:a16="http://schemas.microsoft.com/office/drawing/2014/main" xmlns:a14="http://schemas.microsoft.com/office/drawing/2010/main" w="9525">
                     <a:solidFill>
                       <a:srgbClr val="000000"/>
                     </a:solidFill>
@@ -21629,7 +21629,7 @@
               </a:ln>
               <a:extLst>
                 <a:ext uri="{91240B29-F687-4f45-9708-019B960494DF}">
-                  <a14:hiddenLine xmlns:a14="http://schemas.microsoft.com/office/drawing/2010/main" xmlns:a16="http://schemas.microsoft.com/office/drawing/2014/main" xmlns="" w="9525">
+                  <a14:hiddenLine xmlns="" xmlns:a16="http://schemas.microsoft.com/office/drawing/2014/main" xmlns:a14="http://schemas.microsoft.com/office/drawing/2010/main" w="9525">
                     <a:solidFill>
                       <a:srgbClr val="000000"/>
                     </a:solidFill>
@@ -21771,7 +21771,7 @@
               </a:ln>
               <a:extLst>
                 <a:ext uri="{91240B29-F687-4f45-9708-019B960494DF}">
-                  <a14:hiddenLine xmlns:a14="http://schemas.microsoft.com/office/drawing/2010/main" xmlns:a16="http://schemas.microsoft.com/office/drawing/2014/main" xmlns="" w="9525">
+                  <a14:hiddenLine xmlns="" xmlns:a16="http://schemas.microsoft.com/office/drawing/2014/main" xmlns:a14="http://schemas.microsoft.com/office/drawing/2010/main" w="9525">
                     <a:solidFill>
                       <a:srgbClr val="000000"/>
                     </a:solidFill>
@@ -21906,7 +21906,7 @@
               </a:ln>
               <a:extLst>
                 <a:ext uri="{91240B29-F687-4f45-9708-019B960494DF}">
-                  <a14:hiddenLine xmlns:a14="http://schemas.microsoft.com/office/drawing/2010/main" xmlns:a16="http://schemas.microsoft.com/office/drawing/2014/main" xmlns="" w="9525">
+                  <a14:hiddenLine xmlns="" xmlns:a16="http://schemas.microsoft.com/office/drawing/2014/main" xmlns:a14="http://schemas.microsoft.com/office/drawing/2010/main" w="9525">
                     <a:solidFill>
                       <a:srgbClr val="000000"/>
                     </a:solidFill>
@@ -22043,7 +22043,7 @@
               </a:ln>
               <a:extLst>
                 <a:ext uri="{91240B29-F687-4f45-9708-019B960494DF}">
-                  <a14:hiddenLine xmlns:a14="http://schemas.microsoft.com/office/drawing/2010/main" xmlns:a16="http://schemas.microsoft.com/office/drawing/2014/main" xmlns="" w="9525">
+                  <a14:hiddenLine xmlns="" xmlns:a16="http://schemas.microsoft.com/office/drawing/2014/main" xmlns:a14="http://schemas.microsoft.com/office/drawing/2010/main" w="9525">
                     <a:solidFill>
                       <a:srgbClr val="000000"/>
                     </a:solidFill>
@@ -22155,7 +22155,7 @@
               </a:ln>
               <a:extLst>
                 <a:ext uri="{91240B29-F687-4f45-9708-019B960494DF}">
-                  <a14:hiddenLine xmlns:a14="http://schemas.microsoft.com/office/drawing/2010/main" xmlns:a16="http://schemas.microsoft.com/office/drawing/2014/main" xmlns="" w="9525">
+                  <a14:hiddenLine xmlns="" xmlns:a16="http://schemas.microsoft.com/office/drawing/2014/main" xmlns:a14="http://schemas.microsoft.com/office/drawing/2010/main" w="9525">
                     <a:solidFill>
                       <a:srgbClr val="000000"/>
                     </a:solidFill>
@@ -22242,7 +22242,7 @@
               </a:ln>
               <a:extLst>
                 <a:ext uri="{91240B29-F687-4f45-9708-019B960494DF}">
-                  <a14:hiddenLine xmlns:a14="http://schemas.microsoft.com/office/drawing/2010/main" xmlns:a16="http://schemas.microsoft.com/office/drawing/2014/main" xmlns="" w="9525">
+                  <a14:hiddenLine xmlns="" xmlns:a16="http://schemas.microsoft.com/office/drawing/2014/main" xmlns:a14="http://schemas.microsoft.com/office/drawing/2010/main" w="9525">
                     <a:solidFill>
                       <a:srgbClr val="000000"/>
                     </a:solidFill>
@@ -22354,7 +22354,7 @@
               </a:ln>
               <a:extLst>
                 <a:ext uri="{91240B29-F687-4f45-9708-019B960494DF}">
-                  <a14:hiddenLine xmlns:a14="http://schemas.microsoft.com/office/drawing/2010/main" xmlns:a16="http://schemas.microsoft.com/office/drawing/2014/main" xmlns="" w="9525">
+                  <a14:hiddenLine xmlns="" xmlns:a16="http://schemas.microsoft.com/office/drawing/2014/main" xmlns:a14="http://schemas.microsoft.com/office/drawing/2010/main" w="9525">
                     <a:solidFill>
                       <a:srgbClr val="000000"/>
                     </a:solidFill>
@@ -22444,7 +22444,7 @@
               </a:ln>
               <a:extLst>
                 <a:ext uri="{91240B29-F687-4f45-9708-019B960494DF}">
-                  <a14:hiddenLine xmlns:a14="http://schemas.microsoft.com/office/drawing/2010/main" xmlns:a16="http://schemas.microsoft.com/office/drawing/2014/main" xmlns="" w="9525">
+                  <a14:hiddenLine xmlns="" xmlns:a16="http://schemas.microsoft.com/office/drawing/2014/main" xmlns:a14="http://schemas.microsoft.com/office/drawing/2010/main" w="9525">
                     <a:solidFill>
                       <a:srgbClr val="000000"/>
                     </a:solidFill>
@@ -22556,7 +22556,7 @@
               </a:ln>
               <a:extLst>
                 <a:ext uri="{91240B29-F687-4f45-9708-019B960494DF}">
-                  <a14:hiddenLine xmlns:a14="http://schemas.microsoft.com/office/drawing/2010/main" xmlns:a16="http://schemas.microsoft.com/office/drawing/2014/main" xmlns="" w="9525">
+                  <a14:hiddenLine xmlns="" xmlns:a16="http://schemas.microsoft.com/office/drawing/2014/main" xmlns:a14="http://schemas.microsoft.com/office/drawing/2010/main" w="9525">
                     <a:solidFill>
                       <a:srgbClr val="000000"/>
                     </a:solidFill>
@@ -22646,7 +22646,7 @@
               </a:ln>
               <a:extLst>
                 <a:ext uri="{91240B29-F687-4f45-9708-019B960494DF}">
-                  <a14:hiddenLine xmlns:a14="http://schemas.microsoft.com/office/drawing/2010/main" xmlns:a16="http://schemas.microsoft.com/office/drawing/2014/main" xmlns="" w="9525">
+                  <a14:hiddenLine xmlns="" xmlns:a16="http://schemas.microsoft.com/office/drawing/2014/main" xmlns:a14="http://schemas.microsoft.com/office/drawing/2010/main" w="9525">
                     <a:solidFill>
                       <a:srgbClr val="000000"/>
                     </a:solidFill>
@@ -22758,7 +22758,7 @@
               </a:ln>
               <a:extLst>
                 <a:ext uri="{91240B29-F687-4f45-9708-019B960494DF}">
-                  <a14:hiddenLine xmlns:a14="http://schemas.microsoft.com/office/drawing/2010/main" xmlns:a16="http://schemas.microsoft.com/office/drawing/2014/main" xmlns="" w="9525">
+                  <a14:hiddenLine xmlns="" xmlns:a16="http://schemas.microsoft.com/office/drawing/2014/main" xmlns:a14="http://schemas.microsoft.com/office/drawing/2010/main" w="9525">
                     <a:solidFill>
                       <a:srgbClr val="000000"/>
                     </a:solidFill>
@@ -22814,7 +22814,7 @@
               </a:ln>
               <a:extLst>
                 <a:ext uri="{91240B29-F687-4f45-9708-019B960494DF}">
-                  <a14:hiddenLine xmlns:a14="http://schemas.microsoft.com/office/drawing/2010/main" xmlns:a16="http://schemas.microsoft.com/office/drawing/2014/main" xmlns="" w="9525">
+                  <a14:hiddenLine xmlns="" xmlns:a16="http://schemas.microsoft.com/office/drawing/2014/main" xmlns:a14="http://schemas.microsoft.com/office/drawing/2010/main" w="9525">
                     <a:solidFill>
                       <a:srgbClr val="000000"/>
                     </a:solidFill>
@@ -22976,7 +22976,7 @@
             </a:ln>
             <a:extLst>
               <a:ext uri="{91240B29-F687-4f45-9708-019B960494DF}">
-                <a14:hiddenLine xmlns:a14="http://schemas.microsoft.com/office/drawing/2010/main" xmlns:p14="http://schemas.microsoft.com/office/powerpoint/2010/main" xmlns:a16="http://schemas.microsoft.com/office/drawing/2014/main" xmlns="" w="9525">
+                <a14:hiddenLine xmlns="" xmlns:a16="http://schemas.microsoft.com/office/drawing/2014/main" xmlns:p14="http://schemas.microsoft.com/office/powerpoint/2010/main" xmlns:a14="http://schemas.microsoft.com/office/drawing/2010/main" w="9525">
                   <a:solidFill>
                     <a:srgbClr val="000000"/>
                   </a:solidFill>
@@ -23088,7 +23088,7 @@
             </a:ln>
             <a:extLst>
               <a:ext uri="{91240B29-F687-4f45-9708-019B960494DF}">
-                <a14:hiddenLine xmlns:a14="http://schemas.microsoft.com/office/drawing/2010/main" xmlns:p14="http://schemas.microsoft.com/office/powerpoint/2010/main" xmlns:a16="http://schemas.microsoft.com/office/drawing/2014/main" xmlns="" w="9525">
+                <a14:hiddenLine xmlns="" xmlns:a16="http://schemas.microsoft.com/office/drawing/2014/main" xmlns:p14="http://schemas.microsoft.com/office/powerpoint/2010/main" xmlns:a14="http://schemas.microsoft.com/office/drawing/2010/main" w="9525">
                   <a:solidFill>
                     <a:srgbClr val="000000"/>
                   </a:solidFill>
@@ -23200,7 +23200,7 @@
             </a:ln>
             <a:extLst>
               <a:ext uri="{91240B29-F687-4f45-9708-019B960494DF}">
-                <a14:hiddenLine xmlns:a14="http://schemas.microsoft.com/office/drawing/2010/main" xmlns:p14="http://schemas.microsoft.com/office/powerpoint/2010/main" xmlns:a16="http://schemas.microsoft.com/office/drawing/2014/main" xmlns="" w="9525">
+                <a14:hiddenLine xmlns="" xmlns:a16="http://schemas.microsoft.com/office/drawing/2014/main" xmlns:p14="http://schemas.microsoft.com/office/powerpoint/2010/main" xmlns:a14="http://schemas.microsoft.com/office/drawing/2010/main" w="9525">
                   <a:solidFill>
                     <a:srgbClr val="000000"/>
                   </a:solidFill>
@@ -23284,7 +23284,7 @@
             </a:ln>
             <a:extLst>
               <a:ext uri="{91240B29-F687-4f45-9708-019B960494DF}">
-                <a14:hiddenLine xmlns:a14="http://schemas.microsoft.com/office/drawing/2010/main" xmlns:p14="http://schemas.microsoft.com/office/powerpoint/2010/main" xmlns:a16="http://schemas.microsoft.com/office/drawing/2014/main" xmlns="" w="9525">
+                <a14:hiddenLine xmlns="" xmlns:a16="http://schemas.microsoft.com/office/drawing/2014/main" xmlns:p14="http://schemas.microsoft.com/office/powerpoint/2010/main" xmlns:a14="http://schemas.microsoft.com/office/drawing/2010/main" w="9525">
                   <a:solidFill>
                     <a:srgbClr val="000000"/>
                   </a:solidFill>
@@ -23396,7 +23396,7 @@
             </a:ln>
             <a:extLst>
               <a:ext uri="{91240B29-F687-4f45-9708-019B960494DF}">
-                <a14:hiddenLine xmlns:a14="http://schemas.microsoft.com/office/drawing/2010/main" xmlns:p14="http://schemas.microsoft.com/office/powerpoint/2010/main" xmlns:a16="http://schemas.microsoft.com/office/drawing/2014/main" xmlns="" w="9525">
+                <a14:hiddenLine xmlns="" xmlns:a16="http://schemas.microsoft.com/office/drawing/2014/main" xmlns:p14="http://schemas.microsoft.com/office/powerpoint/2010/main" xmlns:a14="http://schemas.microsoft.com/office/drawing/2010/main" w="9525">
                   <a:solidFill>
                     <a:srgbClr val="000000"/>
                   </a:solidFill>
@@ -23480,7 +23480,7 @@
             </a:ln>
             <a:extLst>
               <a:ext uri="{91240B29-F687-4f45-9708-019B960494DF}">
-                <a14:hiddenLine xmlns:a14="http://schemas.microsoft.com/office/drawing/2010/main" xmlns:p14="http://schemas.microsoft.com/office/powerpoint/2010/main" xmlns:a16="http://schemas.microsoft.com/office/drawing/2014/main" xmlns="" w="9525">
+                <a14:hiddenLine xmlns="" xmlns:a16="http://schemas.microsoft.com/office/drawing/2014/main" xmlns:p14="http://schemas.microsoft.com/office/powerpoint/2010/main" xmlns:a14="http://schemas.microsoft.com/office/drawing/2010/main" w="9525">
                   <a:solidFill>
                     <a:srgbClr val="000000"/>
                   </a:solidFill>
@@ -23564,7 +23564,7 @@
             </a:ln>
             <a:extLst>
               <a:ext uri="{91240B29-F687-4f45-9708-019B960494DF}">
-                <a14:hiddenLine xmlns:a14="http://schemas.microsoft.com/office/drawing/2010/main" xmlns:p14="http://schemas.microsoft.com/office/powerpoint/2010/main" xmlns:a16="http://schemas.microsoft.com/office/drawing/2014/main" xmlns="" w="9525">
+                <a14:hiddenLine xmlns="" xmlns:a16="http://schemas.microsoft.com/office/drawing/2014/main" xmlns:p14="http://schemas.microsoft.com/office/powerpoint/2010/main" xmlns:a14="http://schemas.microsoft.com/office/drawing/2010/main" w="9525">
                   <a:solidFill>
                     <a:srgbClr val="000000"/>
                   </a:solidFill>
@@ -23676,7 +23676,7 @@
             </a:ln>
             <a:extLst>
               <a:ext uri="{91240B29-F687-4f45-9708-019B960494DF}">
-                <a14:hiddenLine xmlns:a14="http://schemas.microsoft.com/office/drawing/2010/main" xmlns:p14="http://schemas.microsoft.com/office/powerpoint/2010/main" xmlns:a16="http://schemas.microsoft.com/office/drawing/2014/main" xmlns="" w="9525">
+                <a14:hiddenLine xmlns="" xmlns:a16="http://schemas.microsoft.com/office/drawing/2014/main" xmlns:p14="http://schemas.microsoft.com/office/powerpoint/2010/main" xmlns:a14="http://schemas.microsoft.com/office/drawing/2010/main" w="9525">
                   <a:solidFill>
                     <a:srgbClr val="000000"/>
                   </a:solidFill>
@@ -23788,7 +23788,7 @@
             </a:ln>
             <a:extLst>
               <a:ext uri="{91240B29-F687-4f45-9708-019B960494DF}">
-                <a14:hiddenLine xmlns:a14="http://schemas.microsoft.com/office/drawing/2010/main" xmlns:p14="http://schemas.microsoft.com/office/powerpoint/2010/main" xmlns:a16="http://schemas.microsoft.com/office/drawing/2014/main" xmlns="" w="9525">
+                <a14:hiddenLine xmlns="" xmlns:a16="http://schemas.microsoft.com/office/drawing/2014/main" xmlns:p14="http://schemas.microsoft.com/office/powerpoint/2010/main" xmlns:a14="http://schemas.microsoft.com/office/drawing/2010/main" w="9525">
                   <a:solidFill>
                     <a:srgbClr val="000000"/>
                   </a:solidFill>
@@ -23872,7 +23872,7 @@
             </a:ln>
             <a:extLst>
               <a:ext uri="{91240B29-F687-4f45-9708-019B960494DF}">
-                <a14:hiddenLine xmlns:a14="http://schemas.microsoft.com/office/drawing/2010/main" xmlns:p14="http://schemas.microsoft.com/office/powerpoint/2010/main" xmlns:a16="http://schemas.microsoft.com/office/drawing/2014/main" xmlns="" w="9525">
+                <a14:hiddenLine xmlns="" xmlns:a16="http://schemas.microsoft.com/office/drawing/2014/main" xmlns:p14="http://schemas.microsoft.com/office/powerpoint/2010/main" xmlns:a14="http://schemas.microsoft.com/office/drawing/2010/main" w="9525">
                   <a:solidFill>
                     <a:srgbClr val="000000"/>
                   </a:solidFill>
@@ -24004,7 +24004,7 @@
             </a:ln>
             <a:extLst>
               <a:ext uri="{91240B29-F687-4f45-9708-019B960494DF}">
-                <a14:hiddenLine xmlns:a14="http://schemas.microsoft.com/office/drawing/2010/main" xmlns:p14="http://schemas.microsoft.com/office/powerpoint/2010/main" xmlns:a16="http://schemas.microsoft.com/office/drawing/2014/main" xmlns="" w="9525">
+                <a14:hiddenLine xmlns="" xmlns:a16="http://schemas.microsoft.com/office/drawing/2014/main" xmlns:p14="http://schemas.microsoft.com/office/powerpoint/2010/main" xmlns:a14="http://schemas.microsoft.com/office/drawing/2010/main" w="9525">
                   <a:solidFill>
                     <a:srgbClr val="000000"/>
                   </a:solidFill>
@@ -24132,7 +24132,7 @@
             </a:ln>
             <a:extLst>
               <a:ext uri="{91240B29-F687-4f45-9708-019B960494DF}">
-                <a14:hiddenLine xmlns:a14="http://schemas.microsoft.com/office/drawing/2010/main" xmlns:p14="http://schemas.microsoft.com/office/powerpoint/2010/main" xmlns:a16="http://schemas.microsoft.com/office/drawing/2014/main" xmlns="" w="9525">
+                <a14:hiddenLine xmlns="" xmlns:a16="http://schemas.microsoft.com/office/drawing/2014/main" xmlns:p14="http://schemas.microsoft.com/office/powerpoint/2010/main" xmlns:a14="http://schemas.microsoft.com/office/drawing/2010/main" w="9525">
                   <a:solidFill>
                     <a:srgbClr val="000000"/>
                   </a:solidFill>
@@ -24216,7 +24216,7 @@
             </a:ln>
             <a:extLst>
               <a:ext uri="{91240B29-F687-4f45-9708-019B960494DF}">
-                <a14:hiddenLine xmlns:a14="http://schemas.microsoft.com/office/drawing/2010/main" xmlns:p14="http://schemas.microsoft.com/office/powerpoint/2010/main" xmlns:a16="http://schemas.microsoft.com/office/drawing/2014/main" xmlns="" w="9525">
+                <a14:hiddenLine xmlns="" xmlns:a16="http://schemas.microsoft.com/office/drawing/2014/main" xmlns:p14="http://schemas.microsoft.com/office/powerpoint/2010/main" xmlns:a14="http://schemas.microsoft.com/office/drawing/2010/main" w="9525">
                   <a:solidFill>
                     <a:srgbClr val="000000"/>
                   </a:solidFill>
@@ -24300,7 +24300,7 @@
             </a:ln>
             <a:extLst>
               <a:ext uri="{91240B29-F687-4f45-9708-019B960494DF}">
-                <a14:hiddenLine xmlns:a14="http://schemas.microsoft.com/office/drawing/2010/main" xmlns:p14="http://schemas.microsoft.com/office/powerpoint/2010/main" xmlns:a16="http://schemas.microsoft.com/office/drawing/2014/main" xmlns="" w="9525">
+                <a14:hiddenLine xmlns="" xmlns:a16="http://schemas.microsoft.com/office/drawing/2014/main" xmlns:p14="http://schemas.microsoft.com/office/powerpoint/2010/main" xmlns:a14="http://schemas.microsoft.com/office/drawing/2010/main" w="9525">
                   <a:solidFill>
                     <a:srgbClr val="000000"/>
                   </a:solidFill>
@@ -24412,7 +24412,7 @@
             </a:ln>
             <a:extLst>
               <a:ext uri="{91240B29-F687-4f45-9708-019B960494DF}">
-                <a14:hiddenLine xmlns:a14="http://schemas.microsoft.com/office/drawing/2010/main" xmlns:p14="http://schemas.microsoft.com/office/powerpoint/2010/main" xmlns:a16="http://schemas.microsoft.com/office/drawing/2014/main" xmlns="" w="9525">
+                <a14:hiddenLine xmlns="" xmlns:a16="http://schemas.microsoft.com/office/drawing/2014/main" xmlns:p14="http://schemas.microsoft.com/office/powerpoint/2010/main" xmlns:a14="http://schemas.microsoft.com/office/drawing/2010/main" w="9525">
                   <a:solidFill>
                     <a:srgbClr val="000000"/>
                   </a:solidFill>
@@ -24468,7 +24468,7 @@
             </a:ln>
             <a:extLst>
               <a:ext uri="{91240B29-F687-4f45-9708-019B960494DF}">
-                <a14:hiddenLine xmlns:a14="http://schemas.microsoft.com/office/drawing/2010/main" xmlns:p14="http://schemas.microsoft.com/office/powerpoint/2010/main" xmlns:a16="http://schemas.microsoft.com/office/drawing/2014/main" xmlns="" w="9525">
+                <a14:hiddenLine xmlns="" xmlns:a16="http://schemas.microsoft.com/office/drawing/2014/main" xmlns:p14="http://schemas.microsoft.com/office/powerpoint/2010/main" xmlns:a14="http://schemas.microsoft.com/office/drawing/2010/main" w="9525">
                   <a:solidFill>
                     <a:srgbClr val="000000"/>
                   </a:solidFill>
@@ -24555,7 +24555,7 @@
             </a:ln>
             <a:extLst>
               <a:ext uri="{91240B29-F687-4f45-9708-019B960494DF}">
-                <a14:hiddenLine xmlns:a14="http://schemas.microsoft.com/office/drawing/2010/main" xmlns:p14="http://schemas.microsoft.com/office/powerpoint/2010/main" xmlns:a16="http://schemas.microsoft.com/office/drawing/2014/main" xmlns="" w="9525">
+                <a14:hiddenLine xmlns="" xmlns:a16="http://schemas.microsoft.com/office/drawing/2014/main" xmlns:p14="http://schemas.microsoft.com/office/powerpoint/2010/main" xmlns:a14="http://schemas.microsoft.com/office/drawing/2010/main" w="9525">
                   <a:solidFill>
                     <a:srgbClr val="000000"/>
                   </a:solidFill>
@@ -24667,7 +24667,7 @@
             </a:ln>
             <a:extLst>
               <a:ext uri="{91240B29-F687-4f45-9708-019B960494DF}">
-                <a14:hiddenLine xmlns:a14="http://schemas.microsoft.com/office/drawing/2010/main" xmlns:p14="http://schemas.microsoft.com/office/powerpoint/2010/main" xmlns:a16="http://schemas.microsoft.com/office/drawing/2014/main" xmlns="" w="9525">
+                <a14:hiddenLine xmlns="" xmlns:a16="http://schemas.microsoft.com/office/drawing/2014/main" xmlns:p14="http://schemas.microsoft.com/office/powerpoint/2010/main" xmlns:a14="http://schemas.microsoft.com/office/drawing/2010/main" w="9525">
                   <a:solidFill>
                     <a:srgbClr val="000000"/>
                   </a:solidFill>
@@ -24751,7 +24751,7 @@
             </a:ln>
             <a:extLst>
               <a:ext uri="{91240B29-F687-4f45-9708-019B960494DF}">
-                <a14:hiddenLine xmlns:a14="http://schemas.microsoft.com/office/drawing/2010/main" xmlns:p14="http://schemas.microsoft.com/office/powerpoint/2010/main" xmlns:a16="http://schemas.microsoft.com/office/drawing/2014/main" xmlns="" w="9525">
+                <a14:hiddenLine xmlns="" xmlns:a16="http://schemas.microsoft.com/office/drawing/2014/main" xmlns:p14="http://schemas.microsoft.com/office/powerpoint/2010/main" xmlns:a14="http://schemas.microsoft.com/office/drawing/2010/main" w="9525">
                   <a:solidFill>
                     <a:srgbClr val="000000"/>
                   </a:solidFill>
@@ -24863,7 +24863,7 @@
             </a:ln>
             <a:extLst>
               <a:ext uri="{91240B29-F687-4f45-9708-019B960494DF}">
-                <a14:hiddenLine xmlns:a14="http://schemas.microsoft.com/office/drawing/2010/main" xmlns:p14="http://schemas.microsoft.com/office/powerpoint/2010/main" xmlns:a16="http://schemas.microsoft.com/office/drawing/2014/main" xmlns="" w="9525">
+                <a14:hiddenLine xmlns="" xmlns:a16="http://schemas.microsoft.com/office/drawing/2014/main" xmlns:p14="http://schemas.microsoft.com/office/powerpoint/2010/main" xmlns:a14="http://schemas.microsoft.com/office/drawing/2010/main" w="9525">
                   <a:solidFill>
                     <a:srgbClr val="000000"/>
                   </a:solidFill>
@@ -24950,7 +24950,7 @@
             </a:ln>
             <a:extLst>
               <a:ext uri="{91240B29-F687-4f45-9708-019B960494DF}">
-                <a14:hiddenLine xmlns:a14="http://schemas.microsoft.com/office/drawing/2010/main" xmlns:p14="http://schemas.microsoft.com/office/powerpoint/2010/main" xmlns:a16="http://schemas.microsoft.com/office/drawing/2014/main" xmlns="" w="9525">
+                <a14:hiddenLine xmlns="" xmlns:a16="http://schemas.microsoft.com/office/drawing/2014/main" xmlns:p14="http://schemas.microsoft.com/office/powerpoint/2010/main" xmlns:a14="http://schemas.microsoft.com/office/drawing/2010/main" w="9525">
                   <a:solidFill>
                     <a:srgbClr val="000000"/>
                   </a:solidFill>
@@ -25034,7 +25034,7 @@
             </a:ln>
             <a:extLst>
               <a:ext uri="{91240B29-F687-4f45-9708-019B960494DF}">
-                <a14:hiddenLine xmlns:a14="http://schemas.microsoft.com/office/drawing/2010/main" xmlns:p14="http://schemas.microsoft.com/office/powerpoint/2010/main" xmlns:a16="http://schemas.microsoft.com/office/drawing/2014/main" xmlns="" w="9525">
+                <a14:hiddenLine xmlns="" xmlns:a16="http://schemas.microsoft.com/office/drawing/2014/main" xmlns:p14="http://schemas.microsoft.com/office/powerpoint/2010/main" xmlns:a14="http://schemas.microsoft.com/office/drawing/2010/main" w="9525">
                   <a:solidFill>
                     <a:srgbClr val="000000"/>
                   </a:solidFill>
@@ -25146,7 +25146,7 @@
             </a:ln>
             <a:extLst>
               <a:ext uri="{91240B29-F687-4f45-9708-019B960494DF}">
-                <a14:hiddenLine xmlns:a14="http://schemas.microsoft.com/office/drawing/2010/main" xmlns:p14="http://schemas.microsoft.com/office/powerpoint/2010/main" xmlns:a16="http://schemas.microsoft.com/office/drawing/2014/main" xmlns="" w="9525">
+                <a14:hiddenLine xmlns="" xmlns:a16="http://schemas.microsoft.com/office/drawing/2014/main" xmlns:p14="http://schemas.microsoft.com/office/powerpoint/2010/main" xmlns:a14="http://schemas.microsoft.com/office/drawing/2010/main" w="9525">
                   <a:solidFill>
                     <a:srgbClr val="000000"/>
                   </a:solidFill>
@@ -25258,7 +25258,7 @@
             </a:ln>
             <a:extLst>
               <a:ext uri="{91240B29-F687-4f45-9708-019B960494DF}">
-                <a14:hiddenLine xmlns:a14="http://schemas.microsoft.com/office/drawing/2010/main" xmlns:p14="http://schemas.microsoft.com/office/powerpoint/2010/main" xmlns:a16="http://schemas.microsoft.com/office/drawing/2014/main" xmlns="" w="9525">
+                <a14:hiddenLine xmlns="" xmlns:a16="http://schemas.microsoft.com/office/drawing/2014/main" xmlns:p14="http://schemas.microsoft.com/office/powerpoint/2010/main" xmlns:a14="http://schemas.microsoft.com/office/drawing/2010/main" w="9525">
                   <a:solidFill>
                     <a:srgbClr val="000000"/>
                   </a:solidFill>
@@ -25345,7 +25345,7 @@
             </a:ln>
             <a:extLst>
               <a:ext uri="{91240B29-F687-4f45-9708-019B960494DF}">
-                <a14:hiddenLine xmlns:a14="http://schemas.microsoft.com/office/drawing/2010/main" xmlns:p14="http://schemas.microsoft.com/office/powerpoint/2010/main" xmlns:a16="http://schemas.microsoft.com/office/drawing/2014/main" xmlns="" w="9525">
+                <a14:hiddenLine xmlns="" xmlns:a16="http://schemas.microsoft.com/office/drawing/2014/main" xmlns:p14="http://schemas.microsoft.com/office/powerpoint/2010/main" xmlns:a14="http://schemas.microsoft.com/office/drawing/2010/main" w="9525">
                   <a:solidFill>
                     <a:srgbClr val="000000"/>
                   </a:solidFill>
@@ -25487,7 +25487,7 @@
             </a:ln>
             <a:extLst>
               <a:ext uri="{91240B29-F687-4f45-9708-019B960494DF}">
-                <a14:hiddenLine xmlns:a14="http://schemas.microsoft.com/office/drawing/2010/main" xmlns:p14="http://schemas.microsoft.com/office/powerpoint/2010/main" xmlns:a16="http://schemas.microsoft.com/office/drawing/2014/main" xmlns="" w="9525">
+                <a14:hiddenLine xmlns="" xmlns:a16="http://schemas.microsoft.com/office/drawing/2014/main" xmlns:p14="http://schemas.microsoft.com/office/powerpoint/2010/main" xmlns:a14="http://schemas.microsoft.com/office/drawing/2010/main" w="9525">
                   <a:solidFill>
                     <a:srgbClr val="000000"/>
                   </a:solidFill>
@@ -26640,7 +26640,7 @@
             </a:ln>
             <a:extLst>
               <a:ext uri="{91240B29-F687-4f45-9708-019B960494DF}">
-                <a14:hiddenLine xmlns:a14="http://schemas.microsoft.com/office/drawing/2010/main" xmlns:p14="http://schemas.microsoft.com/office/powerpoint/2010/main" xmlns:a16="http://schemas.microsoft.com/office/drawing/2014/main" xmlns="" w="9525">
+                <a14:hiddenLine xmlns="" xmlns:a16="http://schemas.microsoft.com/office/drawing/2014/main" xmlns:p14="http://schemas.microsoft.com/office/powerpoint/2010/main" xmlns:a14="http://schemas.microsoft.com/office/drawing/2010/main" w="9525">
                   <a:solidFill>
                     <a:srgbClr val="000000"/>
                   </a:solidFill>
@@ -26752,7 +26752,7 @@
             </a:ln>
             <a:extLst>
               <a:ext uri="{91240B29-F687-4f45-9708-019B960494DF}">
-                <a14:hiddenLine xmlns:a14="http://schemas.microsoft.com/office/drawing/2010/main" xmlns:p14="http://schemas.microsoft.com/office/powerpoint/2010/main" xmlns:a16="http://schemas.microsoft.com/office/drawing/2014/main" xmlns="" w="9525">
+                <a14:hiddenLine xmlns="" xmlns:a16="http://schemas.microsoft.com/office/drawing/2014/main" xmlns:p14="http://schemas.microsoft.com/office/powerpoint/2010/main" xmlns:a14="http://schemas.microsoft.com/office/drawing/2010/main" w="9525">
                   <a:solidFill>
                     <a:srgbClr val="000000"/>
                   </a:solidFill>
@@ -26864,7 +26864,7 @@
             </a:ln>
             <a:extLst>
               <a:ext uri="{91240B29-F687-4f45-9708-019B960494DF}">
-                <a14:hiddenLine xmlns:a14="http://schemas.microsoft.com/office/drawing/2010/main" xmlns:p14="http://schemas.microsoft.com/office/powerpoint/2010/main" xmlns:a16="http://schemas.microsoft.com/office/drawing/2014/main" xmlns="" w="9525">
+                <a14:hiddenLine xmlns="" xmlns:a16="http://schemas.microsoft.com/office/drawing/2014/main" xmlns:p14="http://schemas.microsoft.com/office/powerpoint/2010/main" xmlns:a14="http://schemas.microsoft.com/office/drawing/2010/main" w="9525">
                   <a:solidFill>
                     <a:srgbClr val="000000"/>
                   </a:solidFill>
@@ -26948,7 +26948,7 @@
             </a:ln>
             <a:extLst>
               <a:ext uri="{91240B29-F687-4f45-9708-019B960494DF}">
-                <a14:hiddenLine xmlns:a14="http://schemas.microsoft.com/office/drawing/2010/main" xmlns:p14="http://schemas.microsoft.com/office/powerpoint/2010/main" xmlns:a16="http://schemas.microsoft.com/office/drawing/2014/main" xmlns="" w="9525">
+                <a14:hiddenLine xmlns="" xmlns:a16="http://schemas.microsoft.com/office/drawing/2014/main" xmlns:p14="http://schemas.microsoft.com/office/powerpoint/2010/main" xmlns:a14="http://schemas.microsoft.com/office/drawing/2010/main" w="9525">
                   <a:solidFill>
                     <a:srgbClr val="000000"/>
                   </a:solidFill>
@@ -27060,7 +27060,7 @@
             </a:ln>
             <a:extLst>
               <a:ext uri="{91240B29-F687-4f45-9708-019B960494DF}">
-                <a14:hiddenLine xmlns:a14="http://schemas.microsoft.com/office/drawing/2010/main" xmlns:p14="http://schemas.microsoft.com/office/powerpoint/2010/main" xmlns:a16="http://schemas.microsoft.com/office/drawing/2014/main" xmlns="" w="9525">
+                <a14:hiddenLine xmlns="" xmlns:a16="http://schemas.microsoft.com/office/drawing/2014/main" xmlns:p14="http://schemas.microsoft.com/office/powerpoint/2010/main" xmlns:a14="http://schemas.microsoft.com/office/drawing/2010/main" w="9525">
                   <a:solidFill>
                     <a:srgbClr val="000000"/>
                   </a:solidFill>
@@ -27144,7 +27144,7 @@
             </a:ln>
             <a:extLst>
               <a:ext uri="{91240B29-F687-4f45-9708-019B960494DF}">
-                <a14:hiddenLine xmlns:a14="http://schemas.microsoft.com/office/drawing/2010/main" xmlns:p14="http://schemas.microsoft.com/office/powerpoint/2010/main" xmlns:a16="http://schemas.microsoft.com/office/drawing/2014/main" xmlns="" w="9525">
+                <a14:hiddenLine xmlns="" xmlns:a16="http://schemas.microsoft.com/office/drawing/2014/main" xmlns:p14="http://schemas.microsoft.com/office/powerpoint/2010/main" xmlns:a14="http://schemas.microsoft.com/office/drawing/2010/main" w="9525">
                   <a:solidFill>
                     <a:srgbClr val="000000"/>
                   </a:solidFill>
@@ -27228,7 +27228,7 @@
             </a:ln>
             <a:extLst>
               <a:ext uri="{91240B29-F687-4f45-9708-019B960494DF}">
-                <a14:hiddenLine xmlns:a14="http://schemas.microsoft.com/office/drawing/2010/main" xmlns:p14="http://schemas.microsoft.com/office/powerpoint/2010/main" xmlns:a16="http://schemas.microsoft.com/office/drawing/2014/main" xmlns="" w="9525">
+                <a14:hiddenLine xmlns="" xmlns:a16="http://schemas.microsoft.com/office/drawing/2014/main" xmlns:p14="http://schemas.microsoft.com/office/powerpoint/2010/main" xmlns:a14="http://schemas.microsoft.com/office/drawing/2010/main" w="9525">
                   <a:solidFill>
                     <a:srgbClr val="000000"/>
                   </a:solidFill>
@@ -27340,7 +27340,7 @@
             </a:ln>
             <a:extLst>
               <a:ext uri="{91240B29-F687-4f45-9708-019B960494DF}">
-                <a14:hiddenLine xmlns:a14="http://schemas.microsoft.com/office/drawing/2010/main" xmlns:p14="http://schemas.microsoft.com/office/powerpoint/2010/main" xmlns:a16="http://schemas.microsoft.com/office/drawing/2014/main" xmlns="" w="9525">
+                <a14:hiddenLine xmlns="" xmlns:a16="http://schemas.microsoft.com/office/drawing/2014/main" xmlns:p14="http://schemas.microsoft.com/office/powerpoint/2010/main" xmlns:a14="http://schemas.microsoft.com/office/drawing/2010/main" w="9525">
                   <a:solidFill>
                     <a:srgbClr val="000000"/>
                   </a:solidFill>
@@ -27452,7 +27452,7 @@
             </a:ln>
             <a:extLst>
               <a:ext uri="{91240B29-F687-4f45-9708-019B960494DF}">
-                <a14:hiddenLine xmlns:a14="http://schemas.microsoft.com/office/drawing/2010/main" xmlns:p14="http://schemas.microsoft.com/office/powerpoint/2010/main" xmlns:a16="http://schemas.microsoft.com/office/drawing/2014/main" xmlns="" w="9525">
+                <a14:hiddenLine xmlns="" xmlns:a16="http://schemas.microsoft.com/office/drawing/2014/main" xmlns:p14="http://schemas.microsoft.com/office/powerpoint/2010/main" xmlns:a14="http://schemas.microsoft.com/office/drawing/2010/main" w="9525">
                   <a:solidFill>
                     <a:srgbClr val="000000"/>
                   </a:solidFill>
@@ -27536,7 +27536,7 @@
             </a:ln>
             <a:extLst>
               <a:ext uri="{91240B29-F687-4f45-9708-019B960494DF}">
-                <a14:hiddenLine xmlns:a14="http://schemas.microsoft.com/office/drawing/2010/main" xmlns:p14="http://schemas.microsoft.com/office/powerpoint/2010/main" xmlns:a16="http://schemas.microsoft.com/office/drawing/2014/main" xmlns="" w="9525">
+                <a14:hiddenLine xmlns="" xmlns:a16="http://schemas.microsoft.com/office/drawing/2014/main" xmlns:p14="http://schemas.microsoft.com/office/powerpoint/2010/main" xmlns:a14="http://schemas.microsoft.com/office/drawing/2010/main" w="9525">
                   <a:solidFill>
                     <a:srgbClr val="000000"/>
                   </a:solidFill>
@@ -27668,7 +27668,7 @@
             </a:ln>
             <a:extLst>
               <a:ext uri="{91240B29-F687-4f45-9708-019B960494DF}">
-                <a14:hiddenLine xmlns:a14="http://schemas.microsoft.com/office/drawing/2010/main" xmlns:p14="http://schemas.microsoft.com/office/powerpoint/2010/main" xmlns:a16="http://schemas.microsoft.com/office/drawing/2014/main" xmlns="" w="9525">
+                <a14:hiddenLine xmlns="" xmlns:a16="http://schemas.microsoft.com/office/drawing/2014/main" xmlns:p14="http://schemas.microsoft.com/office/powerpoint/2010/main" xmlns:a14="http://schemas.microsoft.com/office/drawing/2010/main" w="9525">
                   <a:solidFill>
                     <a:srgbClr val="000000"/>
                   </a:solidFill>
@@ -27796,7 +27796,7 @@
             </a:ln>
             <a:extLst>
               <a:ext uri="{91240B29-F687-4f45-9708-019B960494DF}">
-                <a14:hiddenLine xmlns:a14="http://schemas.microsoft.com/office/drawing/2010/main" xmlns:p14="http://schemas.microsoft.com/office/powerpoint/2010/main" xmlns:a16="http://schemas.microsoft.com/office/drawing/2014/main" xmlns="" w="9525">
+                <a14:hiddenLine xmlns="" xmlns:a16="http://schemas.microsoft.com/office/drawing/2014/main" xmlns:p14="http://schemas.microsoft.com/office/powerpoint/2010/main" xmlns:a14="http://schemas.microsoft.com/office/drawing/2010/main" w="9525">
                   <a:solidFill>
                     <a:srgbClr val="000000"/>
                   </a:solidFill>
@@ -27880,7 +27880,7 @@
             </a:ln>
             <a:extLst>
               <a:ext uri="{91240B29-F687-4f45-9708-019B960494DF}">
-                <a14:hiddenLine xmlns:a14="http://schemas.microsoft.com/office/drawing/2010/main" xmlns:p14="http://schemas.microsoft.com/office/powerpoint/2010/main" xmlns:a16="http://schemas.microsoft.com/office/drawing/2014/main" xmlns="" w="9525">
+                <a14:hiddenLine xmlns="" xmlns:a16="http://schemas.microsoft.com/office/drawing/2014/main" xmlns:p14="http://schemas.microsoft.com/office/powerpoint/2010/main" xmlns:a14="http://schemas.microsoft.com/office/drawing/2010/main" w="9525">
                   <a:solidFill>
                     <a:srgbClr val="000000"/>
                   </a:solidFill>
@@ -27964,7 +27964,7 @@
             </a:ln>
             <a:extLst>
               <a:ext uri="{91240B29-F687-4f45-9708-019B960494DF}">
-                <a14:hiddenLine xmlns:a14="http://schemas.microsoft.com/office/drawing/2010/main" xmlns:p14="http://schemas.microsoft.com/office/powerpoint/2010/main" xmlns:a16="http://schemas.microsoft.com/office/drawing/2014/main" xmlns="" w="9525">
+                <a14:hiddenLine xmlns="" xmlns:a16="http://schemas.microsoft.com/office/drawing/2014/main" xmlns:p14="http://schemas.microsoft.com/office/powerpoint/2010/main" xmlns:a14="http://schemas.microsoft.com/office/drawing/2010/main" w="9525">
                   <a:solidFill>
                     <a:srgbClr val="000000"/>
                   </a:solidFill>
@@ -28076,7 +28076,7 @@
             </a:ln>
             <a:extLst>
               <a:ext uri="{91240B29-F687-4f45-9708-019B960494DF}">
-                <a14:hiddenLine xmlns:a14="http://schemas.microsoft.com/office/drawing/2010/main" xmlns:p14="http://schemas.microsoft.com/office/powerpoint/2010/main" xmlns:a16="http://schemas.microsoft.com/office/drawing/2014/main" xmlns="" w="9525">
+                <a14:hiddenLine xmlns="" xmlns:a16="http://schemas.microsoft.com/office/drawing/2014/main" xmlns:p14="http://schemas.microsoft.com/office/powerpoint/2010/main" xmlns:a14="http://schemas.microsoft.com/office/drawing/2010/main" w="9525">
                   <a:solidFill>
                     <a:srgbClr val="000000"/>
                   </a:solidFill>
@@ -28132,7 +28132,7 @@
             </a:ln>
             <a:extLst>
               <a:ext uri="{91240B29-F687-4f45-9708-019B960494DF}">
-                <a14:hiddenLine xmlns:a14="http://schemas.microsoft.com/office/drawing/2010/main" xmlns:p14="http://schemas.microsoft.com/office/powerpoint/2010/main" xmlns:a16="http://schemas.microsoft.com/office/drawing/2014/main" xmlns="" w="9525">
+                <a14:hiddenLine xmlns="" xmlns:a16="http://schemas.microsoft.com/office/drawing/2014/main" xmlns:p14="http://schemas.microsoft.com/office/powerpoint/2010/main" xmlns:a14="http://schemas.microsoft.com/office/drawing/2010/main" w="9525">
                   <a:solidFill>
                     <a:srgbClr val="000000"/>
                   </a:solidFill>
@@ -28219,7 +28219,7 @@
             </a:ln>
             <a:extLst>
               <a:ext uri="{91240B29-F687-4f45-9708-019B960494DF}">
-                <a14:hiddenLine xmlns:a14="http://schemas.microsoft.com/office/drawing/2010/main" xmlns:p14="http://schemas.microsoft.com/office/powerpoint/2010/main" xmlns:a16="http://schemas.microsoft.com/office/drawing/2014/main" xmlns="" w="9525">
+                <a14:hiddenLine xmlns="" xmlns:a16="http://schemas.microsoft.com/office/drawing/2014/main" xmlns:p14="http://schemas.microsoft.com/office/powerpoint/2010/main" xmlns:a14="http://schemas.microsoft.com/office/drawing/2010/main" w="9525">
                   <a:solidFill>
                     <a:srgbClr val="000000"/>
                   </a:solidFill>
@@ -28331,7 +28331,7 @@
             </a:ln>
             <a:extLst>
               <a:ext uri="{91240B29-F687-4f45-9708-019B960494DF}">
-                <a14:hiddenLine xmlns:a14="http://schemas.microsoft.com/office/drawing/2010/main" xmlns:p14="http://schemas.microsoft.com/office/powerpoint/2010/main" xmlns:a16="http://schemas.microsoft.com/office/drawing/2014/main" xmlns="" w="9525">
+                <a14:hiddenLine xmlns="" xmlns:a16="http://schemas.microsoft.com/office/drawing/2014/main" xmlns:p14="http://schemas.microsoft.com/office/powerpoint/2010/main" xmlns:a14="http://schemas.microsoft.com/office/drawing/2010/main" w="9525">
                   <a:solidFill>
                     <a:srgbClr val="000000"/>
                   </a:solidFill>
@@ -28415,7 +28415,7 @@
             </a:ln>
             <a:extLst>
               <a:ext uri="{91240B29-F687-4f45-9708-019B960494DF}">
-                <a14:hiddenLine xmlns:a14="http://schemas.microsoft.com/office/drawing/2010/main" xmlns:p14="http://schemas.microsoft.com/office/powerpoint/2010/main" xmlns:a16="http://schemas.microsoft.com/office/drawing/2014/main" xmlns="" w="9525">
+                <a14:hiddenLine xmlns="" xmlns:a16="http://schemas.microsoft.com/office/drawing/2014/main" xmlns:p14="http://schemas.microsoft.com/office/powerpoint/2010/main" xmlns:a14="http://schemas.microsoft.com/office/drawing/2010/main" w="9525">
                   <a:solidFill>
                     <a:srgbClr val="000000"/>
                   </a:solidFill>
@@ -28527,7 +28527,7 @@
             </a:ln>
             <a:extLst>
               <a:ext uri="{91240B29-F687-4f45-9708-019B960494DF}">
-                <a14:hiddenLine xmlns:a14="http://schemas.microsoft.com/office/drawing/2010/main" xmlns:p14="http://schemas.microsoft.com/office/powerpoint/2010/main" xmlns:a16="http://schemas.microsoft.com/office/drawing/2014/main" xmlns="" w="9525">
+                <a14:hiddenLine xmlns="" xmlns:a16="http://schemas.microsoft.com/office/drawing/2014/main" xmlns:p14="http://schemas.microsoft.com/office/powerpoint/2010/main" xmlns:a14="http://schemas.microsoft.com/office/drawing/2010/main" w="9525">
                   <a:solidFill>
                     <a:srgbClr val="000000"/>
                   </a:solidFill>
@@ -28614,7 +28614,7 @@
             </a:ln>
             <a:extLst>
               <a:ext uri="{91240B29-F687-4f45-9708-019B960494DF}">
-                <a14:hiddenLine xmlns:a14="http://schemas.microsoft.com/office/drawing/2010/main" xmlns:p14="http://schemas.microsoft.com/office/powerpoint/2010/main" xmlns:a16="http://schemas.microsoft.com/office/drawing/2014/main" xmlns="" w="9525">
+                <a14:hiddenLine xmlns="" xmlns:a16="http://schemas.microsoft.com/office/drawing/2014/main" xmlns:p14="http://schemas.microsoft.com/office/powerpoint/2010/main" xmlns:a14="http://schemas.microsoft.com/office/drawing/2010/main" w="9525">
                   <a:solidFill>
                     <a:srgbClr val="000000"/>
                   </a:solidFill>
@@ -28698,7 +28698,7 @@
             </a:ln>
             <a:extLst>
               <a:ext uri="{91240B29-F687-4f45-9708-019B960494DF}">
-                <a14:hiddenLine xmlns:a14="http://schemas.microsoft.com/office/drawing/2010/main" xmlns:p14="http://schemas.microsoft.com/office/powerpoint/2010/main" xmlns:a16="http://schemas.microsoft.com/office/drawing/2014/main" xmlns="" w="9525">
+                <a14:hiddenLine xmlns="" xmlns:a16="http://schemas.microsoft.com/office/drawing/2014/main" xmlns:p14="http://schemas.microsoft.com/office/powerpoint/2010/main" xmlns:a14="http://schemas.microsoft.com/office/drawing/2010/main" w="9525">
                   <a:solidFill>
                     <a:srgbClr val="000000"/>
                   </a:solidFill>
@@ -28810,7 +28810,7 @@
             </a:ln>
             <a:extLst>
               <a:ext uri="{91240B29-F687-4f45-9708-019B960494DF}">
-                <a14:hiddenLine xmlns:a14="http://schemas.microsoft.com/office/drawing/2010/main" xmlns:p14="http://schemas.microsoft.com/office/powerpoint/2010/main" xmlns:a16="http://schemas.microsoft.com/office/drawing/2014/main" xmlns="" w="9525">
+                <a14:hiddenLine xmlns="" xmlns:a16="http://schemas.microsoft.com/office/drawing/2014/main" xmlns:p14="http://schemas.microsoft.com/office/powerpoint/2010/main" xmlns:a14="http://schemas.microsoft.com/office/drawing/2010/main" w="9525">
                   <a:solidFill>
                     <a:srgbClr val="000000"/>
                   </a:solidFill>
@@ -28922,7 +28922,7 @@
             </a:ln>
             <a:extLst>
               <a:ext uri="{91240B29-F687-4f45-9708-019B960494DF}">
-                <a14:hiddenLine xmlns:a14="http://schemas.microsoft.com/office/drawing/2010/main" xmlns:p14="http://schemas.microsoft.com/office/powerpoint/2010/main" xmlns:a16="http://schemas.microsoft.com/office/drawing/2014/main" xmlns="" w="9525">
+                <a14:hiddenLine xmlns="" xmlns:a16="http://schemas.microsoft.com/office/drawing/2014/main" xmlns:p14="http://schemas.microsoft.com/office/powerpoint/2010/main" xmlns:a14="http://schemas.microsoft.com/office/drawing/2010/main" w="9525">
                   <a:solidFill>
                     <a:srgbClr val="000000"/>
                   </a:solidFill>
@@ -29009,7 +29009,7 @@
             </a:ln>
             <a:extLst>
               <a:ext uri="{91240B29-F687-4f45-9708-019B960494DF}">
-                <a14:hiddenLine xmlns:a14="http://schemas.microsoft.com/office/drawing/2010/main" xmlns:p14="http://schemas.microsoft.com/office/powerpoint/2010/main" xmlns:a16="http://schemas.microsoft.com/office/drawing/2014/main" xmlns="" w="9525">
+                <a14:hiddenLine xmlns="" xmlns:a16="http://schemas.microsoft.com/office/drawing/2014/main" xmlns:p14="http://schemas.microsoft.com/office/powerpoint/2010/main" xmlns:a14="http://schemas.microsoft.com/office/drawing/2010/main" w="9525">
                   <a:solidFill>
                     <a:srgbClr val="000000"/>
                   </a:solidFill>
@@ -29151,7 +29151,7 @@
             </a:ln>
             <a:extLst>
               <a:ext uri="{91240B29-F687-4f45-9708-019B960494DF}">
-                <a14:hiddenLine xmlns:a14="http://schemas.microsoft.com/office/drawing/2010/main" xmlns:p14="http://schemas.microsoft.com/office/powerpoint/2010/main" xmlns:a16="http://schemas.microsoft.com/office/drawing/2014/main" xmlns="" w="9525">
+                <a14:hiddenLine xmlns="" xmlns:a16="http://schemas.microsoft.com/office/drawing/2014/main" xmlns:p14="http://schemas.microsoft.com/office/powerpoint/2010/main" xmlns:a14="http://schemas.microsoft.com/office/drawing/2010/main" w="9525">
                   <a:solidFill>
                     <a:srgbClr val="000000"/>
                   </a:solidFill>

</xml_diff>